<commit_message>
added slide to my repo
</commit_message>
<xml_diff>
--- a/slide/abdul_presentation.pptx
+++ b/slide/abdul_presentation.pptx
@@ -5,19 +5,20 @@
     <p:sldMasterId id="2147483648" r:id="rId1"/>
   </p:sldMasterIdLst>
   <p:notesMasterIdLst>
-    <p:notesMasterId r:id="rId12"/>
+    <p:notesMasterId r:id="rId13"/>
   </p:notesMasterIdLst>
   <p:sldIdLst>
     <p:sldId id="256" r:id="rId2"/>
     <p:sldId id="257" r:id="rId3"/>
-    <p:sldId id="258" r:id="rId4"/>
-    <p:sldId id="260" r:id="rId5"/>
-    <p:sldId id="259" r:id="rId6"/>
-    <p:sldId id="262" r:id="rId7"/>
-    <p:sldId id="261" r:id="rId8"/>
-    <p:sldId id="263" r:id="rId9"/>
-    <p:sldId id="265" r:id="rId10"/>
-    <p:sldId id="264" r:id="rId11"/>
+    <p:sldId id="267" r:id="rId4"/>
+    <p:sldId id="258" r:id="rId5"/>
+    <p:sldId id="260" r:id="rId6"/>
+    <p:sldId id="268" r:id="rId7"/>
+    <p:sldId id="259" r:id="rId8"/>
+    <p:sldId id="261" r:id="rId9"/>
+    <p:sldId id="263" r:id="rId10"/>
+    <p:sldId id="265" r:id="rId11"/>
+    <p:sldId id="264" r:id="rId12"/>
   </p:sldIdLst>
   <p:sldSz cx="12192000" cy="6858000"/>
   <p:notesSz cx="6858000" cy="9144000"/>
@@ -1668,7 +1669,1147 @@
 </dgm:colorsDef>
 </file>
 
+<file path=ppt/diagrams/colors2.xml><?xml version="1.0" encoding="utf-8"?>
+<dgm:colorsDef xmlns:dgm="http://schemas.openxmlformats.org/drawingml/2006/diagram" xmlns:a="http://schemas.openxmlformats.org/drawingml/2006/main" uniqueId="urn:microsoft.com/office/officeart/2005/8/colors/accent1_2">
+  <dgm:title val=""/>
+  <dgm:desc val=""/>
+  <dgm:catLst>
+    <dgm:cat type="accent1" pri="11200"/>
+  </dgm:catLst>
+  <dgm:styleLbl name="node0">
+    <dgm:fillClrLst meth="repeat">
+      <a:schemeClr val="accent1"/>
+    </dgm:fillClrLst>
+    <dgm:linClrLst meth="repeat">
+      <a:schemeClr val="lt1"/>
+    </dgm:linClrLst>
+    <dgm:effectClrLst/>
+    <dgm:txLinClrLst/>
+    <dgm:txFillClrLst/>
+    <dgm:txEffectClrLst/>
+  </dgm:styleLbl>
+  <dgm:styleLbl name="alignNode1">
+    <dgm:fillClrLst meth="repeat">
+      <a:schemeClr val="accent1"/>
+    </dgm:fillClrLst>
+    <dgm:linClrLst meth="repeat">
+      <a:schemeClr val="accent1"/>
+    </dgm:linClrLst>
+    <dgm:effectClrLst/>
+    <dgm:txLinClrLst/>
+    <dgm:txFillClrLst/>
+    <dgm:txEffectClrLst/>
+  </dgm:styleLbl>
+  <dgm:styleLbl name="node1">
+    <dgm:fillClrLst meth="repeat">
+      <a:schemeClr val="accent1"/>
+    </dgm:fillClrLst>
+    <dgm:linClrLst meth="repeat">
+      <a:schemeClr val="lt1"/>
+    </dgm:linClrLst>
+    <dgm:effectClrLst/>
+    <dgm:txLinClrLst/>
+    <dgm:txFillClrLst/>
+    <dgm:txEffectClrLst/>
+  </dgm:styleLbl>
+  <dgm:styleLbl name="lnNode1">
+    <dgm:fillClrLst meth="repeat">
+      <a:schemeClr val="accent1"/>
+    </dgm:fillClrLst>
+    <dgm:linClrLst meth="repeat">
+      <a:schemeClr val="lt1"/>
+    </dgm:linClrLst>
+    <dgm:effectClrLst/>
+    <dgm:txLinClrLst/>
+    <dgm:txFillClrLst/>
+    <dgm:txEffectClrLst/>
+  </dgm:styleLbl>
+  <dgm:styleLbl name="vennNode1">
+    <dgm:fillClrLst meth="repeat">
+      <a:schemeClr val="accent1">
+        <a:alpha val="50000"/>
+      </a:schemeClr>
+    </dgm:fillClrLst>
+    <dgm:linClrLst meth="repeat">
+      <a:schemeClr val="lt1"/>
+    </dgm:linClrLst>
+    <dgm:effectClrLst/>
+    <dgm:txLinClrLst/>
+    <dgm:txFillClrLst/>
+    <dgm:txEffectClrLst/>
+  </dgm:styleLbl>
+  <dgm:styleLbl name="node2">
+    <dgm:fillClrLst meth="repeat">
+      <a:schemeClr val="accent1"/>
+    </dgm:fillClrLst>
+    <dgm:linClrLst meth="repeat">
+      <a:schemeClr val="lt1"/>
+    </dgm:linClrLst>
+    <dgm:effectClrLst/>
+    <dgm:txLinClrLst/>
+    <dgm:txFillClrLst/>
+    <dgm:txEffectClrLst/>
+  </dgm:styleLbl>
+  <dgm:styleLbl name="node3">
+    <dgm:fillClrLst meth="repeat">
+      <a:schemeClr val="accent1"/>
+    </dgm:fillClrLst>
+    <dgm:linClrLst meth="repeat">
+      <a:schemeClr val="lt1"/>
+    </dgm:linClrLst>
+    <dgm:effectClrLst/>
+    <dgm:txLinClrLst/>
+    <dgm:txFillClrLst/>
+    <dgm:txEffectClrLst/>
+  </dgm:styleLbl>
+  <dgm:styleLbl name="node4">
+    <dgm:fillClrLst meth="repeat">
+      <a:schemeClr val="accent1"/>
+    </dgm:fillClrLst>
+    <dgm:linClrLst meth="repeat">
+      <a:schemeClr val="lt1"/>
+    </dgm:linClrLst>
+    <dgm:effectClrLst/>
+    <dgm:txLinClrLst/>
+    <dgm:txFillClrLst/>
+    <dgm:txEffectClrLst/>
+  </dgm:styleLbl>
+  <dgm:styleLbl name="fgImgPlace1">
+    <dgm:fillClrLst meth="repeat">
+      <a:schemeClr val="accent1">
+        <a:tint val="50000"/>
+      </a:schemeClr>
+    </dgm:fillClrLst>
+    <dgm:linClrLst meth="repeat">
+      <a:schemeClr val="lt1"/>
+    </dgm:linClrLst>
+    <dgm:effectClrLst/>
+    <dgm:txLinClrLst/>
+    <dgm:txFillClrLst meth="repeat">
+      <a:schemeClr val="lt1"/>
+    </dgm:txFillClrLst>
+    <dgm:txEffectClrLst/>
+  </dgm:styleLbl>
+  <dgm:styleLbl name="alignImgPlace1">
+    <dgm:fillClrLst meth="repeat">
+      <a:schemeClr val="accent1">
+        <a:tint val="50000"/>
+      </a:schemeClr>
+    </dgm:fillClrLst>
+    <dgm:linClrLst meth="repeat">
+      <a:schemeClr val="lt1"/>
+    </dgm:linClrLst>
+    <dgm:effectClrLst/>
+    <dgm:txLinClrLst/>
+    <dgm:txFillClrLst meth="repeat">
+      <a:schemeClr val="lt1"/>
+    </dgm:txFillClrLst>
+    <dgm:txEffectClrLst/>
+  </dgm:styleLbl>
+  <dgm:styleLbl name="bgImgPlace1">
+    <dgm:fillClrLst meth="repeat">
+      <a:schemeClr val="accent1">
+        <a:tint val="50000"/>
+      </a:schemeClr>
+    </dgm:fillClrLst>
+    <dgm:linClrLst meth="repeat">
+      <a:schemeClr val="lt1"/>
+    </dgm:linClrLst>
+    <dgm:effectClrLst/>
+    <dgm:txLinClrLst/>
+    <dgm:txFillClrLst meth="repeat">
+      <a:schemeClr val="lt1"/>
+    </dgm:txFillClrLst>
+    <dgm:txEffectClrLst/>
+  </dgm:styleLbl>
+  <dgm:styleLbl name="sibTrans2D1">
+    <dgm:fillClrLst meth="repeat">
+      <a:schemeClr val="accent1">
+        <a:tint val="60000"/>
+      </a:schemeClr>
+    </dgm:fillClrLst>
+    <dgm:linClrLst meth="repeat">
+      <a:schemeClr val="accent1">
+        <a:tint val="60000"/>
+      </a:schemeClr>
+    </dgm:linClrLst>
+    <dgm:effectClrLst/>
+    <dgm:txLinClrLst/>
+    <dgm:txFillClrLst/>
+    <dgm:txEffectClrLst/>
+  </dgm:styleLbl>
+  <dgm:styleLbl name="fgSibTrans2D1">
+    <dgm:fillClrLst meth="repeat">
+      <a:schemeClr val="accent1">
+        <a:tint val="60000"/>
+      </a:schemeClr>
+    </dgm:fillClrLst>
+    <dgm:linClrLst meth="repeat">
+      <a:schemeClr val="accent1">
+        <a:tint val="60000"/>
+      </a:schemeClr>
+    </dgm:linClrLst>
+    <dgm:effectClrLst/>
+    <dgm:txLinClrLst/>
+    <dgm:txFillClrLst/>
+    <dgm:txEffectClrLst/>
+  </dgm:styleLbl>
+  <dgm:styleLbl name="bgSibTrans2D1">
+    <dgm:fillClrLst meth="repeat">
+      <a:schemeClr val="accent1">
+        <a:tint val="60000"/>
+      </a:schemeClr>
+    </dgm:fillClrLst>
+    <dgm:linClrLst meth="repeat">
+      <a:schemeClr val="accent1">
+        <a:tint val="60000"/>
+      </a:schemeClr>
+    </dgm:linClrLst>
+    <dgm:effectClrLst/>
+    <dgm:txLinClrLst/>
+    <dgm:txFillClrLst/>
+    <dgm:txEffectClrLst/>
+  </dgm:styleLbl>
+  <dgm:styleLbl name="sibTrans1D1">
+    <dgm:fillClrLst meth="repeat">
+      <a:schemeClr val="accent1"/>
+    </dgm:fillClrLst>
+    <dgm:linClrLst meth="repeat">
+      <a:schemeClr val="accent1"/>
+    </dgm:linClrLst>
+    <dgm:effectClrLst/>
+    <dgm:txLinClrLst/>
+    <dgm:txFillClrLst meth="repeat">
+      <a:schemeClr val="tx1"/>
+    </dgm:txFillClrLst>
+    <dgm:txEffectClrLst/>
+  </dgm:styleLbl>
+  <dgm:styleLbl name="callout">
+    <dgm:fillClrLst meth="repeat">
+      <a:schemeClr val="accent1"/>
+    </dgm:fillClrLst>
+    <dgm:linClrLst meth="repeat">
+      <a:schemeClr val="accent1">
+        <a:tint val="50000"/>
+      </a:schemeClr>
+    </dgm:linClrLst>
+    <dgm:effectClrLst/>
+    <dgm:txLinClrLst/>
+    <dgm:txFillClrLst meth="repeat">
+      <a:schemeClr val="tx1"/>
+    </dgm:txFillClrLst>
+    <dgm:txEffectClrLst/>
+  </dgm:styleLbl>
+  <dgm:styleLbl name="asst0">
+    <dgm:fillClrLst meth="repeat">
+      <a:schemeClr val="accent1"/>
+    </dgm:fillClrLst>
+    <dgm:linClrLst meth="repeat">
+      <a:schemeClr val="lt1"/>
+    </dgm:linClrLst>
+    <dgm:effectClrLst/>
+    <dgm:txLinClrLst/>
+    <dgm:txFillClrLst/>
+    <dgm:txEffectClrLst/>
+  </dgm:styleLbl>
+  <dgm:styleLbl name="asst1">
+    <dgm:fillClrLst meth="repeat">
+      <a:schemeClr val="accent1"/>
+    </dgm:fillClrLst>
+    <dgm:linClrLst meth="repeat">
+      <a:schemeClr val="lt1"/>
+    </dgm:linClrLst>
+    <dgm:effectClrLst/>
+    <dgm:txLinClrLst/>
+    <dgm:txFillClrLst/>
+    <dgm:txEffectClrLst/>
+  </dgm:styleLbl>
+  <dgm:styleLbl name="asst2">
+    <dgm:fillClrLst meth="repeat">
+      <a:schemeClr val="accent1"/>
+    </dgm:fillClrLst>
+    <dgm:linClrLst meth="repeat">
+      <a:schemeClr val="lt1"/>
+    </dgm:linClrLst>
+    <dgm:effectClrLst/>
+    <dgm:txLinClrLst/>
+    <dgm:txFillClrLst/>
+    <dgm:txEffectClrLst/>
+  </dgm:styleLbl>
+  <dgm:styleLbl name="asst3">
+    <dgm:fillClrLst meth="repeat">
+      <a:schemeClr val="accent1"/>
+    </dgm:fillClrLst>
+    <dgm:linClrLst meth="repeat">
+      <a:schemeClr val="lt1"/>
+    </dgm:linClrLst>
+    <dgm:effectClrLst/>
+    <dgm:txLinClrLst/>
+    <dgm:txFillClrLst/>
+    <dgm:txEffectClrLst/>
+  </dgm:styleLbl>
+  <dgm:styleLbl name="asst4">
+    <dgm:fillClrLst meth="repeat">
+      <a:schemeClr val="accent1"/>
+    </dgm:fillClrLst>
+    <dgm:linClrLst meth="repeat">
+      <a:schemeClr val="lt1"/>
+    </dgm:linClrLst>
+    <dgm:effectClrLst/>
+    <dgm:txLinClrLst/>
+    <dgm:txFillClrLst/>
+    <dgm:txEffectClrLst/>
+  </dgm:styleLbl>
+  <dgm:styleLbl name="parChTrans2D1">
+    <dgm:fillClrLst meth="repeat">
+      <a:schemeClr val="accent1">
+        <a:tint val="60000"/>
+      </a:schemeClr>
+    </dgm:fillClrLst>
+    <dgm:linClrLst meth="repeat">
+      <a:schemeClr val="accent1">
+        <a:tint val="60000"/>
+      </a:schemeClr>
+    </dgm:linClrLst>
+    <dgm:effectClrLst/>
+    <dgm:txLinClrLst/>
+    <dgm:txFillClrLst meth="repeat">
+      <a:schemeClr val="lt1"/>
+    </dgm:txFillClrLst>
+    <dgm:txEffectClrLst/>
+  </dgm:styleLbl>
+  <dgm:styleLbl name="parChTrans2D2">
+    <dgm:fillClrLst meth="repeat">
+      <a:schemeClr val="accent1"/>
+    </dgm:fillClrLst>
+    <dgm:linClrLst meth="repeat">
+      <a:schemeClr val="accent1"/>
+    </dgm:linClrLst>
+    <dgm:effectClrLst/>
+    <dgm:txLinClrLst/>
+    <dgm:txFillClrLst meth="repeat">
+      <a:schemeClr val="lt1"/>
+    </dgm:txFillClrLst>
+    <dgm:txEffectClrLst/>
+  </dgm:styleLbl>
+  <dgm:styleLbl name="parChTrans2D3">
+    <dgm:fillClrLst meth="repeat">
+      <a:schemeClr val="accent1"/>
+    </dgm:fillClrLst>
+    <dgm:linClrLst meth="repeat">
+      <a:schemeClr val="accent1"/>
+    </dgm:linClrLst>
+    <dgm:effectClrLst/>
+    <dgm:txLinClrLst/>
+    <dgm:txFillClrLst meth="repeat">
+      <a:schemeClr val="lt1"/>
+    </dgm:txFillClrLst>
+    <dgm:txEffectClrLst/>
+  </dgm:styleLbl>
+  <dgm:styleLbl name="parChTrans2D4">
+    <dgm:fillClrLst meth="repeat">
+      <a:schemeClr val="accent1"/>
+    </dgm:fillClrLst>
+    <dgm:linClrLst meth="repeat">
+      <a:schemeClr val="accent1"/>
+    </dgm:linClrLst>
+    <dgm:effectClrLst/>
+    <dgm:txLinClrLst/>
+    <dgm:txFillClrLst meth="repeat">
+      <a:schemeClr val="lt1"/>
+    </dgm:txFillClrLst>
+    <dgm:txEffectClrLst/>
+  </dgm:styleLbl>
+  <dgm:styleLbl name="parChTrans1D1">
+    <dgm:fillClrLst meth="repeat">
+      <a:schemeClr val="accent1"/>
+    </dgm:fillClrLst>
+    <dgm:linClrLst meth="repeat">
+      <a:schemeClr val="accent1">
+        <a:shade val="60000"/>
+      </a:schemeClr>
+    </dgm:linClrLst>
+    <dgm:effectClrLst/>
+    <dgm:txLinClrLst/>
+    <dgm:txFillClrLst meth="repeat">
+      <a:schemeClr val="tx1"/>
+    </dgm:txFillClrLst>
+    <dgm:txEffectClrLst/>
+  </dgm:styleLbl>
+  <dgm:styleLbl name="parChTrans1D2">
+    <dgm:fillClrLst meth="repeat">
+      <a:schemeClr val="accent1"/>
+    </dgm:fillClrLst>
+    <dgm:linClrLst meth="repeat">
+      <a:schemeClr val="accent1">
+        <a:shade val="60000"/>
+      </a:schemeClr>
+    </dgm:linClrLst>
+    <dgm:effectClrLst/>
+    <dgm:txLinClrLst/>
+    <dgm:txFillClrLst meth="repeat">
+      <a:schemeClr val="tx1"/>
+    </dgm:txFillClrLst>
+    <dgm:txEffectClrLst/>
+  </dgm:styleLbl>
+  <dgm:styleLbl name="parChTrans1D3">
+    <dgm:fillClrLst meth="repeat">
+      <a:schemeClr val="accent1"/>
+    </dgm:fillClrLst>
+    <dgm:linClrLst meth="repeat">
+      <a:schemeClr val="accent1">
+        <a:shade val="80000"/>
+      </a:schemeClr>
+    </dgm:linClrLst>
+    <dgm:effectClrLst/>
+    <dgm:txLinClrLst/>
+    <dgm:txFillClrLst meth="repeat">
+      <a:schemeClr val="tx1"/>
+    </dgm:txFillClrLst>
+    <dgm:txEffectClrLst/>
+  </dgm:styleLbl>
+  <dgm:styleLbl name="parChTrans1D4">
+    <dgm:fillClrLst meth="repeat">
+      <a:schemeClr val="accent1"/>
+    </dgm:fillClrLst>
+    <dgm:linClrLst meth="repeat">
+      <a:schemeClr val="accent1">
+        <a:shade val="80000"/>
+      </a:schemeClr>
+    </dgm:linClrLst>
+    <dgm:effectClrLst/>
+    <dgm:txLinClrLst/>
+    <dgm:txFillClrLst meth="repeat">
+      <a:schemeClr val="tx1"/>
+    </dgm:txFillClrLst>
+    <dgm:txEffectClrLst/>
+  </dgm:styleLbl>
+  <dgm:styleLbl name="fgAcc1">
+    <dgm:fillClrLst meth="repeat">
+      <a:schemeClr val="lt1">
+        <a:alpha val="90000"/>
+      </a:schemeClr>
+    </dgm:fillClrLst>
+    <dgm:linClrLst meth="repeat">
+      <a:schemeClr val="accent1"/>
+    </dgm:linClrLst>
+    <dgm:effectClrLst/>
+    <dgm:txLinClrLst/>
+    <dgm:txFillClrLst meth="repeat">
+      <a:schemeClr val="dk1"/>
+    </dgm:txFillClrLst>
+    <dgm:txEffectClrLst/>
+  </dgm:styleLbl>
+  <dgm:styleLbl name="conFgAcc1">
+    <dgm:fillClrLst meth="repeat">
+      <a:schemeClr val="lt1">
+        <a:alpha val="90000"/>
+      </a:schemeClr>
+    </dgm:fillClrLst>
+    <dgm:linClrLst meth="repeat">
+      <a:schemeClr val="accent1"/>
+    </dgm:linClrLst>
+    <dgm:effectClrLst/>
+    <dgm:txLinClrLst/>
+    <dgm:txFillClrLst meth="repeat">
+      <a:schemeClr val="dk1"/>
+    </dgm:txFillClrLst>
+    <dgm:txEffectClrLst/>
+  </dgm:styleLbl>
+  <dgm:styleLbl name="alignAcc1">
+    <dgm:fillClrLst meth="repeat">
+      <a:schemeClr val="lt1">
+        <a:alpha val="90000"/>
+      </a:schemeClr>
+    </dgm:fillClrLst>
+    <dgm:linClrLst meth="repeat">
+      <a:schemeClr val="accent1"/>
+    </dgm:linClrLst>
+    <dgm:effectClrLst/>
+    <dgm:txLinClrLst/>
+    <dgm:txFillClrLst meth="repeat">
+      <a:schemeClr val="dk1"/>
+    </dgm:txFillClrLst>
+    <dgm:txEffectClrLst/>
+  </dgm:styleLbl>
+  <dgm:styleLbl name="trAlignAcc1">
+    <dgm:fillClrLst meth="repeat">
+      <a:schemeClr val="lt1">
+        <a:alpha val="40000"/>
+      </a:schemeClr>
+    </dgm:fillClrLst>
+    <dgm:linClrLst meth="repeat">
+      <a:schemeClr val="accent1"/>
+    </dgm:linClrLst>
+    <dgm:effectClrLst/>
+    <dgm:txLinClrLst/>
+    <dgm:txFillClrLst meth="repeat">
+      <a:schemeClr val="dk1"/>
+    </dgm:txFillClrLst>
+    <dgm:txEffectClrLst/>
+  </dgm:styleLbl>
+  <dgm:styleLbl name="bgAcc1">
+    <dgm:fillClrLst meth="repeat">
+      <a:schemeClr val="lt1">
+        <a:alpha val="90000"/>
+      </a:schemeClr>
+    </dgm:fillClrLst>
+    <dgm:linClrLst meth="repeat">
+      <a:schemeClr val="accent1"/>
+    </dgm:linClrLst>
+    <dgm:effectClrLst/>
+    <dgm:txLinClrLst/>
+    <dgm:txFillClrLst meth="repeat">
+      <a:schemeClr val="dk1"/>
+    </dgm:txFillClrLst>
+    <dgm:txEffectClrLst/>
+  </dgm:styleLbl>
+  <dgm:styleLbl name="solidFgAcc1">
+    <dgm:fillClrLst meth="repeat">
+      <a:schemeClr val="lt1"/>
+    </dgm:fillClrLst>
+    <dgm:linClrLst meth="repeat">
+      <a:schemeClr val="accent1"/>
+    </dgm:linClrLst>
+    <dgm:effectClrLst/>
+    <dgm:txLinClrLst/>
+    <dgm:txFillClrLst meth="repeat">
+      <a:schemeClr val="dk1"/>
+    </dgm:txFillClrLst>
+    <dgm:txEffectClrLst/>
+  </dgm:styleLbl>
+  <dgm:styleLbl name="solidAlignAcc1">
+    <dgm:fillClrLst meth="repeat">
+      <a:schemeClr val="lt1"/>
+    </dgm:fillClrLst>
+    <dgm:linClrLst meth="repeat">
+      <a:schemeClr val="accent1"/>
+    </dgm:linClrLst>
+    <dgm:effectClrLst/>
+    <dgm:txLinClrLst/>
+    <dgm:txFillClrLst meth="repeat">
+      <a:schemeClr val="dk1"/>
+    </dgm:txFillClrLst>
+    <dgm:txEffectClrLst/>
+  </dgm:styleLbl>
+  <dgm:styleLbl name="solidBgAcc1">
+    <dgm:fillClrLst meth="repeat">
+      <a:schemeClr val="lt1"/>
+    </dgm:fillClrLst>
+    <dgm:linClrLst meth="repeat">
+      <a:schemeClr val="accent1"/>
+    </dgm:linClrLst>
+    <dgm:effectClrLst/>
+    <dgm:txLinClrLst/>
+    <dgm:txFillClrLst meth="repeat">
+      <a:schemeClr val="dk1"/>
+    </dgm:txFillClrLst>
+    <dgm:txEffectClrLst/>
+  </dgm:styleLbl>
+  <dgm:styleLbl name="fgAccFollowNode1">
+    <dgm:fillClrLst meth="repeat">
+      <a:schemeClr val="accent1">
+        <a:alpha val="90000"/>
+        <a:tint val="40000"/>
+      </a:schemeClr>
+    </dgm:fillClrLst>
+    <dgm:linClrLst meth="repeat">
+      <a:schemeClr val="accent1">
+        <a:alpha val="90000"/>
+        <a:tint val="40000"/>
+      </a:schemeClr>
+    </dgm:linClrLst>
+    <dgm:effectClrLst/>
+    <dgm:txLinClrLst/>
+    <dgm:txFillClrLst meth="repeat">
+      <a:schemeClr val="dk1"/>
+    </dgm:txFillClrLst>
+    <dgm:txEffectClrLst/>
+  </dgm:styleLbl>
+  <dgm:styleLbl name="alignAccFollowNode1">
+    <dgm:fillClrLst meth="repeat">
+      <a:schemeClr val="accent1">
+        <a:alpha val="90000"/>
+        <a:tint val="40000"/>
+      </a:schemeClr>
+    </dgm:fillClrLst>
+    <dgm:linClrLst meth="repeat">
+      <a:schemeClr val="accent1">
+        <a:alpha val="90000"/>
+        <a:tint val="40000"/>
+      </a:schemeClr>
+    </dgm:linClrLst>
+    <dgm:effectClrLst/>
+    <dgm:txLinClrLst/>
+    <dgm:txFillClrLst meth="repeat">
+      <a:schemeClr val="dk1"/>
+    </dgm:txFillClrLst>
+    <dgm:txEffectClrLst/>
+  </dgm:styleLbl>
+  <dgm:styleLbl name="bgAccFollowNode1">
+    <dgm:fillClrLst meth="repeat">
+      <a:schemeClr val="accent1">
+        <a:alpha val="90000"/>
+        <a:tint val="40000"/>
+      </a:schemeClr>
+    </dgm:fillClrLst>
+    <dgm:linClrLst meth="repeat">
+      <a:schemeClr val="accent1">
+        <a:alpha val="90000"/>
+        <a:tint val="40000"/>
+      </a:schemeClr>
+    </dgm:linClrLst>
+    <dgm:effectClrLst/>
+    <dgm:txLinClrLst/>
+    <dgm:txFillClrLst meth="repeat">
+      <a:schemeClr val="dk1"/>
+    </dgm:txFillClrLst>
+    <dgm:txEffectClrLst/>
+  </dgm:styleLbl>
+  <dgm:styleLbl name="fgAcc0">
+    <dgm:fillClrLst meth="repeat">
+      <a:schemeClr val="lt1">
+        <a:alpha val="90000"/>
+      </a:schemeClr>
+    </dgm:fillClrLst>
+    <dgm:linClrLst meth="repeat">
+      <a:schemeClr val="accent1"/>
+    </dgm:linClrLst>
+    <dgm:effectClrLst/>
+    <dgm:txLinClrLst/>
+    <dgm:txFillClrLst meth="repeat">
+      <a:schemeClr val="dk1"/>
+    </dgm:txFillClrLst>
+    <dgm:txEffectClrLst/>
+  </dgm:styleLbl>
+  <dgm:styleLbl name="fgAcc2">
+    <dgm:fillClrLst meth="repeat">
+      <a:schemeClr val="lt1">
+        <a:alpha val="90000"/>
+      </a:schemeClr>
+    </dgm:fillClrLst>
+    <dgm:linClrLst meth="repeat">
+      <a:schemeClr val="accent1"/>
+    </dgm:linClrLst>
+    <dgm:effectClrLst/>
+    <dgm:txLinClrLst/>
+    <dgm:txFillClrLst meth="repeat">
+      <a:schemeClr val="dk1"/>
+    </dgm:txFillClrLst>
+    <dgm:txEffectClrLst/>
+  </dgm:styleLbl>
+  <dgm:styleLbl name="fgAcc3">
+    <dgm:fillClrLst meth="repeat">
+      <a:schemeClr val="lt1">
+        <a:alpha val="90000"/>
+      </a:schemeClr>
+    </dgm:fillClrLst>
+    <dgm:linClrLst meth="repeat">
+      <a:schemeClr val="accent1"/>
+    </dgm:linClrLst>
+    <dgm:effectClrLst/>
+    <dgm:txLinClrLst/>
+    <dgm:txFillClrLst meth="repeat">
+      <a:schemeClr val="dk1"/>
+    </dgm:txFillClrLst>
+    <dgm:txEffectClrLst/>
+  </dgm:styleLbl>
+  <dgm:styleLbl name="fgAcc4">
+    <dgm:fillClrLst meth="repeat">
+      <a:schemeClr val="lt1">
+        <a:alpha val="90000"/>
+      </a:schemeClr>
+    </dgm:fillClrLst>
+    <dgm:linClrLst meth="repeat">
+      <a:schemeClr val="accent1"/>
+    </dgm:linClrLst>
+    <dgm:effectClrLst/>
+    <dgm:txLinClrLst/>
+    <dgm:txFillClrLst meth="repeat">
+      <a:schemeClr val="dk1"/>
+    </dgm:txFillClrLst>
+    <dgm:txEffectClrLst/>
+  </dgm:styleLbl>
+  <dgm:styleLbl name="bgShp">
+    <dgm:fillClrLst meth="repeat">
+      <a:schemeClr val="accent1">
+        <a:tint val="40000"/>
+      </a:schemeClr>
+    </dgm:fillClrLst>
+    <dgm:linClrLst meth="repeat">
+      <a:schemeClr val="accent1"/>
+    </dgm:linClrLst>
+    <dgm:effectClrLst/>
+    <dgm:txLinClrLst/>
+    <dgm:txFillClrLst meth="repeat">
+      <a:schemeClr val="dk1"/>
+    </dgm:txFillClrLst>
+    <dgm:txEffectClrLst/>
+  </dgm:styleLbl>
+  <dgm:styleLbl name="dkBgShp">
+    <dgm:fillClrLst meth="repeat">
+      <a:schemeClr val="accent1">
+        <a:shade val="80000"/>
+      </a:schemeClr>
+    </dgm:fillClrLst>
+    <dgm:linClrLst meth="repeat">
+      <a:schemeClr val="accent1"/>
+    </dgm:linClrLst>
+    <dgm:effectClrLst/>
+    <dgm:txLinClrLst/>
+    <dgm:txFillClrLst meth="repeat">
+      <a:schemeClr val="lt1"/>
+    </dgm:txFillClrLst>
+    <dgm:txEffectClrLst/>
+  </dgm:styleLbl>
+  <dgm:styleLbl name="trBgShp">
+    <dgm:fillClrLst meth="repeat">
+      <a:schemeClr val="accent1">
+        <a:tint val="50000"/>
+        <a:alpha val="40000"/>
+      </a:schemeClr>
+    </dgm:fillClrLst>
+    <dgm:linClrLst meth="repeat">
+      <a:schemeClr val="accent1"/>
+    </dgm:linClrLst>
+    <dgm:effectClrLst/>
+    <dgm:txLinClrLst/>
+    <dgm:txFillClrLst meth="repeat">
+      <a:schemeClr val="lt1"/>
+    </dgm:txFillClrLst>
+    <dgm:txEffectClrLst/>
+  </dgm:styleLbl>
+  <dgm:styleLbl name="fgShp">
+    <dgm:fillClrLst meth="repeat">
+      <a:schemeClr val="accent1">
+        <a:tint val="60000"/>
+      </a:schemeClr>
+    </dgm:fillClrLst>
+    <dgm:linClrLst meth="repeat">
+      <a:schemeClr val="lt1"/>
+    </dgm:linClrLst>
+    <dgm:effectClrLst/>
+    <dgm:txLinClrLst/>
+    <dgm:txFillClrLst meth="repeat">
+      <a:schemeClr val="dk1"/>
+    </dgm:txFillClrLst>
+    <dgm:txEffectClrLst/>
+  </dgm:styleLbl>
+  <dgm:styleLbl name="revTx">
+    <dgm:fillClrLst meth="repeat">
+      <a:schemeClr val="lt1">
+        <a:alpha val="0"/>
+      </a:schemeClr>
+    </dgm:fillClrLst>
+    <dgm:linClrLst meth="repeat">
+      <a:schemeClr val="dk1">
+        <a:alpha val="0"/>
+      </a:schemeClr>
+    </dgm:linClrLst>
+    <dgm:effectClrLst/>
+    <dgm:txLinClrLst/>
+    <dgm:txFillClrLst meth="repeat">
+      <a:schemeClr val="tx1"/>
+    </dgm:txFillClrLst>
+    <dgm:txEffectClrLst/>
+  </dgm:styleLbl>
+</dgm:colorsDef>
+</file>
+
 <file path=ppt/diagrams/data1.xml><?xml version="1.0" encoding="utf-8"?>
+<dgm:dataModel xmlns:dgm="http://schemas.openxmlformats.org/drawingml/2006/diagram" xmlns:a="http://schemas.openxmlformats.org/drawingml/2006/main">
+  <dgm:ptLst>
+    <dgm:pt modelId="{20634C97-492B-D94A-A8D7-F9A44ACD7F47}" type="doc">
+      <dgm:prSet loTypeId="urn:microsoft.com/office/officeart/2005/8/layout/vList6" loCatId="" qsTypeId="urn:microsoft.com/office/officeart/2005/8/quickstyle/simple1" qsCatId="simple" csTypeId="urn:microsoft.com/office/officeart/2005/8/colors/accent1_2" csCatId="accent1" phldr="1"/>
+      <dgm:spPr/>
+      <dgm:t>
+        <a:bodyPr/>
+        <a:lstStyle/>
+        <a:p>
+          <a:endParaRPr lang="en-US"/>
+        </a:p>
+      </dgm:t>
+    </dgm:pt>
+    <dgm:pt modelId="{658B4F08-C872-734E-BD97-69F1739367CF}">
+      <dgm:prSet phldrT="[Text]"/>
+      <dgm:spPr/>
+      <dgm:t>
+        <a:bodyPr/>
+        <a:lstStyle/>
+        <a:p>
+          <a:r>
+            <a:rPr lang="en-US" dirty="0"/>
+            <a:t>New Features </a:t>
+          </a:r>
+        </a:p>
+      </dgm:t>
+    </dgm:pt>
+    <dgm:pt modelId="{E6079897-8E47-E645-B26E-0232B4A4836B}" type="parTrans" cxnId="{84A23698-C71F-BE45-8E23-CA54BF2F31D0}">
+      <dgm:prSet/>
+      <dgm:spPr/>
+      <dgm:t>
+        <a:bodyPr/>
+        <a:lstStyle/>
+        <a:p>
+          <a:endParaRPr lang="en-US"/>
+        </a:p>
+      </dgm:t>
+    </dgm:pt>
+    <dgm:pt modelId="{5B93659C-980E-4643-83CC-BB506C873A2F}" type="sibTrans" cxnId="{84A23698-C71F-BE45-8E23-CA54BF2F31D0}">
+      <dgm:prSet/>
+      <dgm:spPr/>
+      <dgm:t>
+        <a:bodyPr/>
+        <a:lstStyle/>
+        <a:p>
+          <a:endParaRPr lang="en-US"/>
+        </a:p>
+      </dgm:t>
+    </dgm:pt>
+    <dgm:pt modelId="{24EB0C44-26B0-B149-A763-BC94B8A9C69F}">
+      <dgm:prSet phldrT="[Text]"/>
+      <dgm:spPr/>
+      <dgm:t>
+        <a:bodyPr/>
+        <a:lstStyle/>
+        <a:p>
+          <a:r>
+            <a:rPr lang="en-US" dirty="0"/>
+            <a:t>Transaction Agent</a:t>
+          </a:r>
+        </a:p>
+      </dgm:t>
+    </dgm:pt>
+    <dgm:pt modelId="{C998E606-1319-7A4B-BC98-A99B12F0B6EA}" type="parTrans" cxnId="{A541D93F-6FAB-4440-85E7-522D3C95D225}">
+      <dgm:prSet/>
+      <dgm:spPr/>
+      <dgm:t>
+        <a:bodyPr/>
+        <a:lstStyle/>
+        <a:p>
+          <a:endParaRPr lang="en-US"/>
+        </a:p>
+      </dgm:t>
+    </dgm:pt>
+    <dgm:pt modelId="{120CA8E1-1238-A949-BFBD-22D0F25C9FC7}" type="sibTrans" cxnId="{A541D93F-6FAB-4440-85E7-522D3C95D225}">
+      <dgm:prSet/>
+      <dgm:spPr/>
+      <dgm:t>
+        <a:bodyPr/>
+        <a:lstStyle/>
+        <a:p>
+          <a:endParaRPr lang="en-US"/>
+        </a:p>
+      </dgm:t>
+    </dgm:pt>
+    <dgm:pt modelId="{138B6103-C97A-7046-8519-87A2D20F8A82}">
+      <dgm:prSet phldrT="[Text]"/>
+      <dgm:spPr/>
+      <dgm:t>
+        <a:bodyPr/>
+        <a:lstStyle/>
+        <a:p>
+          <a:r>
+            <a:rPr lang="en-US" dirty="0"/>
+            <a:t>Transaction direction</a:t>
+          </a:r>
+        </a:p>
+      </dgm:t>
+    </dgm:pt>
+    <dgm:pt modelId="{FA3C4856-B4E4-8A4E-9B2A-9CC05B508FAB}" type="parTrans" cxnId="{A6A84262-4540-7841-8AA5-74B3F65423A0}">
+      <dgm:prSet/>
+      <dgm:spPr/>
+      <dgm:t>
+        <a:bodyPr/>
+        <a:lstStyle/>
+        <a:p>
+          <a:endParaRPr lang="en-US"/>
+        </a:p>
+      </dgm:t>
+    </dgm:pt>
+    <dgm:pt modelId="{2869D1AB-3D4D-DC42-A9FA-8C5BBE3ADB38}" type="sibTrans" cxnId="{A6A84262-4540-7841-8AA5-74B3F65423A0}">
+      <dgm:prSet/>
+      <dgm:spPr/>
+      <dgm:t>
+        <a:bodyPr/>
+        <a:lstStyle/>
+        <a:p>
+          <a:endParaRPr lang="en-US"/>
+        </a:p>
+      </dgm:t>
+    </dgm:pt>
+    <dgm:pt modelId="{51B6A137-7EEE-7F41-B0CA-1D89F2CB6529}">
+      <dgm:prSet phldrT="[Text]"/>
+      <dgm:spPr/>
+      <dgm:t>
+        <a:bodyPr/>
+        <a:lstStyle/>
+        <a:p>
+          <a:r>
+            <a:rPr lang="en-US" dirty="0"/>
+            <a:t>Feature preprocessing </a:t>
+          </a:r>
+        </a:p>
+      </dgm:t>
+    </dgm:pt>
+    <dgm:pt modelId="{C5F0C606-DE4C-DD4A-8866-211997270E91}" type="parTrans" cxnId="{A6D61893-02CA-974C-A32E-7E40E0C31ED1}">
+      <dgm:prSet/>
+      <dgm:spPr/>
+      <dgm:t>
+        <a:bodyPr/>
+        <a:lstStyle/>
+        <a:p>
+          <a:endParaRPr lang="en-US"/>
+        </a:p>
+      </dgm:t>
+    </dgm:pt>
+    <dgm:pt modelId="{28A7DB95-151E-BD4E-89E8-AEE99598D6C9}" type="sibTrans" cxnId="{A6D61893-02CA-974C-A32E-7E40E0C31ED1}">
+      <dgm:prSet/>
+      <dgm:spPr/>
+      <dgm:t>
+        <a:bodyPr/>
+        <a:lstStyle/>
+        <a:p>
+          <a:endParaRPr lang="en-US"/>
+        </a:p>
+      </dgm:t>
+    </dgm:pt>
+    <dgm:pt modelId="{02B922AD-1500-C94C-9AFC-CC301BD940D0}">
+      <dgm:prSet phldrT="[Text]"/>
+      <dgm:spPr/>
+      <dgm:t>
+        <a:bodyPr/>
+        <a:lstStyle/>
+        <a:p>
+          <a:r>
+            <a:rPr lang="en-US" dirty="0"/>
+            <a:t>Encoding categorical features </a:t>
+          </a:r>
+        </a:p>
+      </dgm:t>
+    </dgm:pt>
+    <dgm:pt modelId="{FF220F5F-0A44-3B42-AF47-E461A4478ADC}" type="parTrans" cxnId="{98152CBB-5E41-0743-BF73-C7A6FCC72B90}">
+      <dgm:prSet/>
+      <dgm:spPr/>
+      <dgm:t>
+        <a:bodyPr/>
+        <a:lstStyle/>
+        <a:p>
+          <a:endParaRPr lang="en-US"/>
+        </a:p>
+      </dgm:t>
+    </dgm:pt>
+    <dgm:pt modelId="{3C36D70E-422F-9841-AEFA-7C1BCC09EF33}" type="sibTrans" cxnId="{98152CBB-5E41-0743-BF73-C7A6FCC72B90}">
+      <dgm:prSet/>
+      <dgm:spPr/>
+      <dgm:t>
+        <a:bodyPr/>
+        <a:lstStyle/>
+        <a:p>
+          <a:endParaRPr lang="en-US"/>
+        </a:p>
+      </dgm:t>
+    </dgm:pt>
+    <dgm:pt modelId="{923C7675-EE9F-F849-89E9-B25E43F8A8C9}">
+      <dgm:prSet phldrT="[Text]"/>
+      <dgm:spPr/>
+      <dgm:t>
+        <a:bodyPr/>
+        <a:lstStyle/>
+        <a:p>
+          <a:r>
+            <a:rPr lang="en-US" dirty="0"/>
+            <a:t>Normalization </a:t>
+          </a:r>
+        </a:p>
+      </dgm:t>
+    </dgm:pt>
+    <dgm:pt modelId="{FB44B86B-60F5-F14C-A593-7C488666C626}" type="parTrans" cxnId="{CB6B1563-234B-F542-9639-BBC24DBC9851}">
+      <dgm:prSet/>
+      <dgm:spPr/>
+      <dgm:t>
+        <a:bodyPr/>
+        <a:lstStyle/>
+        <a:p>
+          <a:endParaRPr lang="en-US"/>
+        </a:p>
+      </dgm:t>
+    </dgm:pt>
+    <dgm:pt modelId="{5A845FBA-F93A-3B41-B497-E262E74C6D88}" type="sibTrans" cxnId="{CB6B1563-234B-F542-9639-BBC24DBC9851}">
+      <dgm:prSet/>
+      <dgm:spPr/>
+      <dgm:t>
+        <a:bodyPr/>
+        <a:lstStyle/>
+        <a:p>
+          <a:endParaRPr lang="en-US"/>
+        </a:p>
+      </dgm:t>
+    </dgm:pt>
+    <dgm:pt modelId="{E09F0744-8865-D047-A0D3-606A74459234}">
+      <dgm:prSet phldrT="[Text]"/>
+      <dgm:spPr/>
+      <dgm:t>
+        <a:bodyPr/>
+        <a:lstStyle/>
+        <a:p>
+          <a:r>
+            <a:rPr lang="en-US" dirty="0"/>
+            <a:t>Transaction month and day</a:t>
+          </a:r>
+        </a:p>
+      </dgm:t>
+    </dgm:pt>
+    <dgm:pt modelId="{170E49E2-7F10-5548-B206-23A18A146C05}" type="parTrans" cxnId="{D0FA9209-AD41-9340-9AC8-AB83B2A9FB54}">
+      <dgm:prSet/>
+      <dgm:spPr/>
+      <dgm:t>
+        <a:bodyPr/>
+        <a:lstStyle/>
+        <a:p>
+          <a:endParaRPr lang="en-US"/>
+        </a:p>
+      </dgm:t>
+    </dgm:pt>
+    <dgm:pt modelId="{51C299D0-B846-3D43-8EEC-59494D76CB1D}" type="sibTrans" cxnId="{D0FA9209-AD41-9340-9AC8-AB83B2A9FB54}">
+      <dgm:prSet/>
+      <dgm:spPr/>
+      <dgm:t>
+        <a:bodyPr/>
+        <a:lstStyle/>
+        <a:p>
+          <a:endParaRPr lang="en-US"/>
+        </a:p>
+      </dgm:t>
+    </dgm:pt>
+    <dgm:pt modelId="{EF008C8E-AF20-3545-BBF3-183FCD55C45F}">
+      <dgm:prSet phldrT="[Text]"/>
+      <dgm:spPr/>
+      <dgm:t>
+        <a:bodyPr/>
+        <a:lstStyle/>
+        <a:p>
+          <a:r>
+            <a:rPr lang="en-US" dirty="0"/>
+            <a:t>Train/valid/test split</a:t>
+          </a:r>
+        </a:p>
+      </dgm:t>
+    </dgm:pt>
+    <dgm:pt modelId="{B0AB75B0-EDB0-904F-882B-57596F3E11F9}" type="parTrans" cxnId="{CED3C0A2-7163-EB48-AAF1-D493050C5B39}">
+      <dgm:prSet/>
+      <dgm:spPr/>
+      <dgm:t>
+        <a:bodyPr/>
+        <a:lstStyle/>
+        <a:p>
+          <a:endParaRPr lang="en-US"/>
+        </a:p>
+      </dgm:t>
+    </dgm:pt>
+    <dgm:pt modelId="{50C35B99-3504-9C45-81BC-C6672EF1F14D}" type="sibTrans" cxnId="{CED3C0A2-7163-EB48-AAF1-D493050C5B39}">
+      <dgm:prSet/>
+      <dgm:spPr/>
+      <dgm:t>
+        <a:bodyPr/>
+        <a:lstStyle/>
+        <a:p>
+          <a:endParaRPr lang="en-US"/>
+        </a:p>
+      </dgm:t>
+    </dgm:pt>
+    <dgm:pt modelId="{AA153D4A-2E16-7945-B763-27B675165588}" type="pres">
+      <dgm:prSet presAssocID="{20634C97-492B-D94A-A8D7-F9A44ACD7F47}" presName="Name0" presStyleCnt="0">
+        <dgm:presLayoutVars>
+          <dgm:dir/>
+          <dgm:animLvl val="lvl"/>
+          <dgm:resizeHandles/>
+        </dgm:presLayoutVars>
+      </dgm:prSet>
+      <dgm:spPr/>
+    </dgm:pt>
+    <dgm:pt modelId="{ACD822B0-7B29-9742-AB90-E6C2ED7CE7AD}" type="pres">
+      <dgm:prSet presAssocID="{658B4F08-C872-734E-BD97-69F1739367CF}" presName="linNode" presStyleCnt="0"/>
+      <dgm:spPr/>
+    </dgm:pt>
+    <dgm:pt modelId="{E12E0DB3-76D1-C640-95ED-AE5221DBD1F1}" type="pres">
+      <dgm:prSet presAssocID="{658B4F08-C872-734E-BD97-69F1739367CF}" presName="parentShp" presStyleLbl="node1" presStyleIdx="0" presStyleCnt="2">
+        <dgm:presLayoutVars>
+          <dgm:bulletEnabled val="1"/>
+        </dgm:presLayoutVars>
+      </dgm:prSet>
+      <dgm:spPr/>
+    </dgm:pt>
+    <dgm:pt modelId="{299CD7F1-FA8A-B444-98FC-37679C878521}" type="pres">
+      <dgm:prSet presAssocID="{658B4F08-C872-734E-BD97-69F1739367CF}" presName="childShp" presStyleLbl="bgAccFollowNode1" presStyleIdx="0" presStyleCnt="2">
+        <dgm:presLayoutVars>
+          <dgm:bulletEnabled val="1"/>
+        </dgm:presLayoutVars>
+      </dgm:prSet>
+      <dgm:spPr/>
+    </dgm:pt>
+    <dgm:pt modelId="{FBC33261-15D7-5145-983C-E478FC126126}" type="pres">
+      <dgm:prSet presAssocID="{5B93659C-980E-4643-83CC-BB506C873A2F}" presName="spacing" presStyleCnt="0"/>
+      <dgm:spPr/>
+    </dgm:pt>
+    <dgm:pt modelId="{E5F8C9F5-3C40-C841-9718-27050204926B}" type="pres">
+      <dgm:prSet presAssocID="{51B6A137-7EEE-7F41-B0CA-1D89F2CB6529}" presName="linNode" presStyleCnt="0"/>
+      <dgm:spPr/>
+    </dgm:pt>
+    <dgm:pt modelId="{894952C4-259C-DB46-B943-08D6C7D6CF04}" type="pres">
+      <dgm:prSet presAssocID="{51B6A137-7EEE-7F41-B0CA-1D89F2CB6529}" presName="parentShp" presStyleLbl="node1" presStyleIdx="1" presStyleCnt="2">
+        <dgm:presLayoutVars>
+          <dgm:bulletEnabled val="1"/>
+        </dgm:presLayoutVars>
+      </dgm:prSet>
+      <dgm:spPr/>
+    </dgm:pt>
+    <dgm:pt modelId="{7E660546-332B-3E46-AB04-1BDBAC41D906}" type="pres">
+      <dgm:prSet presAssocID="{51B6A137-7EEE-7F41-B0CA-1D89F2CB6529}" presName="childShp" presStyleLbl="bgAccFollowNode1" presStyleIdx="1" presStyleCnt="2">
+        <dgm:presLayoutVars>
+          <dgm:bulletEnabled val="1"/>
+        </dgm:presLayoutVars>
+      </dgm:prSet>
+      <dgm:spPr/>
+    </dgm:pt>
+  </dgm:ptLst>
+  <dgm:cxnLst>
+    <dgm:cxn modelId="{D0FA9209-AD41-9340-9AC8-AB83B2A9FB54}" srcId="{658B4F08-C872-734E-BD97-69F1739367CF}" destId="{E09F0744-8865-D047-A0D3-606A74459234}" srcOrd="2" destOrd="0" parTransId="{170E49E2-7F10-5548-B206-23A18A146C05}" sibTransId="{51C299D0-B846-3D43-8EEC-59494D76CB1D}"/>
+    <dgm:cxn modelId="{5A077431-5B80-954E-A73C-3F78F5516BC4}" type="presOf" srcId="{658B4F08-C872-734E-BD97-69F1739367CF}" destId="{E12E0DB3-76D1-C640-95ED-AE5221DBD1F1}" srcOrd="0" destOrd="0" presId="urn:microsoft.com/office/officeart/2005/8/layout/vList6"/>
+    <dgm:cxn modelId="{A541D93F-6FAB-4440-85E7-522D3C95D225}" srcId="{658B4F08-C872-734E-BD97-69F1739367CF}" destId="{24EB0C44-26B0-B149-A763-BC94B8A9C69F}" srcOrd="0" destOrd="0" parTransId="{C998E606-1319-7A4B-BC98-A99B12F0B6EA}" sibTransId="{120CA8E1-1238-A949-BFBD-22D0F25C9FC7}"/>
+    <dgm:cxn modelId="{7CD4A242-468E-4846-8DEF-021E0A8C7BBB}" type="presOf" srcId="{EF008C8E-AF20-3545-BBF3-183FCD55C45F}" destId="{7E660546-332B-3E46-AB04-1BDBAC41D906}" srcOrd="0" destOrd="2" presId="urn:microsoft.com/office/officeart/2005/8/layout/vList6"/>
+    <dgm:cxn modelId="{17787461-648D-4F46-8D94-D0CAAD292337}" type="presOf" srcId="{51B6A137-7EEE-7F41-B0CA-1D89F2CB6529}" destId="{894952C4-259C-DB46-B943-08D6C7D6CF04}" srcOrd="0" destOrd="0" presId="urn:microsoft.com/office/officeart/2005/8/layout/vList6"/>
+    <dgm:cxn modelId="{A6A84262-4540-7841-8AA5-74B3F65423A0}" srcId="{658B4F08-C872-734E-BD97-69F1739367CF}" destId="{138B6103-C97A-7046-8519-87A2D20F8A82}" srcOrd="1" destOrd="0" parTransId="{FA3C4856-B4E4-8A4E-9B2A-9CC05B508FAB}" sibTransId="{2869D1AB-3D4D-DC42-A9FA-8C5BBE3ADB38}"/>
+    <dgm:cxn modelId="{CB6B1563-234B-F542-9639-BBC24DBC9851}" srcId="{51B6A137-7EEE-7F41-B0CA-1D89F2CB6529}" destId="{923C7675-EE9F-F849-89E9-B25E43F8A8C9}" srcOrd="1" destOrd="0" parTransId="{FB44B86B-60F5-F14C-A593-7C488666C626}" sibTransId="{5A845FBA-F93A-3B41-B497-E262E74C6D88}"/>
+    <dgm:cxn modelId="{3177E567-F967-5C4B-8499-916E4B3C74AB}" type="presOf" srcId="{20634C97-492B-D94A-A8D7-F9A44ACD7F47}" destId="{AA153D4A-2E16-7945-B763-27B675165588}" srcOrd="0" destOrd="0" presId="urn:microsoft.com/office/officeart/2005/8/layout/vList6"/>
+    <dgm:cxn modelId="{A6D61893-02CA-974C-A32E-7E40E0C31ED1}" srcId="{20634C97-492B-D94A-A8D7-F9A44ACD7F47}" destId="{51B6A137-7EEE-7F41-B0CA-1D89F2CB6529}" srcOrd="1" destOrd="0" parTransId="{C5F0C606-DE4C-DD4A-8866-211997270E91}" sibTransId="{28A7DB95-151E-BD4E-89E8-AEE99598D6C9}"/>
+    <dgm:cxn modelId="{84A23698-C71F-BE45-8E23-CA54BF2F31D0}" srcId="{20634C97-492B-D94A-A8D7-F9A44ACD7F47}" destId="{658B4F08-C872-734E-BD97-69F1739367CF}" srcOrd="0" destOrd="0" parTransId="{E6079897-8E47-E645-B26E-0232B4A4836B}" sibTransId="{5B93659C-980E-4643-83CC-BB506C873A2F}"/>
+    <dgm:cxn modelId="{CED3C0A2-7163-EB48-AAF1-D493050C5B39}" srcId="{51B6A137-7EEE-7F41-B0CA-1D89F2CB6529}" destId="{EF008C8E-AF20-3545-BBF3-183FCD55C45F}" srcOrd="2" destOrd="0" parTransId="{B0AB75B0-EDB0-904F-882B-57596F3E11F9}" sibTransId="{50C35B99-3504-9C45-81BC-C6672EF1F14D}"/>
+    <dgm:cxn modelId="{31F472A3-625F-BD46-9AA9-CA6465AE2D12}" type="presOf" srcId="{138B6103-C97A-7046-8519-87A2D20F8A82}" destId="{299CD7F1-FA8A-B444-98FC-37679C878521}" srcOrd="0" destOrd="1" presId="urn:microsoft.com/office/officeart/2005/8/layout/vList6"/>
+    <dgm:cxn modelId="{09E2A1A5-4D66-5B4C-971C-5AB706563248}" type="presOf" srcId="{24EB0C44-26B0-B149-A763-BC94B8A9C69F}" destId="{299CD7F1-FA8A-B444-98FC-37679C878521}" srcOrd="0" destOrd="0" presId="urn:microsoft.com/office/officeart/2005/8/layout/vList6"/>
+    <dgm:cxn modelId="{1588F9AC-E893-8744-BFE5-D7B5FF1D2CB7}" type="presOf" srcId="{923C7675-EE9F-F849-89E9-B25E43F8A8C9}" destId="{7E660546-332B-3E46-AB04-1BDBAC41D906}" srcOrd="0" destOrd="1" presId="urn:microsoft.com/office/officeart/2005/8/layout/vList6"/>
+    <dgm:cxn modelId="{2F2C78AE-4328-DC4E-985E-92666E9433A3}" type="presOf" srcId="{E09F0744-8865-D047-A0D3-606A74459234}" destId="{299CD7F1-FA8A-B444-98FC-37679C878521}" srcOrd="0" destOrd="2" presId="urn:microsoft.com/office/officeart/2005/8/layout/vList6"/>
+    <dgm:cxn modelId="{98152CBB-5E41-0743-BF73-C7A6FCC72B90}" srcId="{51B6A137-7EEE-7F41-B0CA-1D89F2CB6529}" destId="{02B922AD-1500-C94C-9AFC-CC301BD940D0}" srcOrd="0" destOrd="0" parTransId="{FF220F5F-0A44-3B42-AF47-E461A4478ADC}" sibTransId="{3C36D70E-422F-9841-AEFA-7C1BCC09EF33}"/>
+    <dgm:cxn modelId="{9A19F4F7-3A1A-EE49-AA1E-5947D998AC8B}" type="presOf" srcId="{02B922AD-1500-C94C-9AFC-CC301BD940D0}" destId="{7E660546-332B-3E46-AB04-1BDBAC41D906}" srcOrd="0" destOrd="0" presId="urn:microsoft.com/office/officeart/2005/8/layout/vList6"/>
+    <dgm:cxn modelId="{AFC25EE4-B981-AB43-8D9E-93E39EE62506}" type="presParOf" srcId="{AA153D4A-2E16-7945-B763-27B675165588}" destId="{ACD822B0-7B29-9742-AB90-E6C2ED7CE7AD}" srcOrd="0" destOrd="0" presId="urn:microsoft.com/office/officeart/2005/8/layout/vList6"/>
+    <dgm:cxn modelId="{A0CC39C6-964E-1A45-94D9-7D0525CBCC4E}" type="presParOf" srcId="{ACD822B0-7B29-9742-AB90-E6C2ED7CE7AD}" destId="{E12E0DB3-76D1-C640-95ED-AE5221DBD1F1}" srcOrd="0" destOrd="0" presId="urn:microsoft.com/office/officeart/2005/8/layout/vList6"/>
+    <dgm:cxn modelId="{4CC3BEFC-4572-D443-B32E-464323C963EB}" type="presParOf" srcId="{ACD822B0-7B29-9742-AB90-E6C2ED7CE7AD}" destId="{299CD7F1-FA8A-B444-98FC-37679C878521}" srcOrd="1" destOrd="0" presId="urn:microsoft.com/office/officeart/2005/8/layout/vList6"/>
+    <dgm:cxn modelId="{0232B93D-3441-D64D-BBF8-EC8F09EAC2F2}" type="presParOf" srcId="{AA153D4A-2E16-7945-B763-27B675165588}" destId="{FBC33261-15D7-5145-983C-E478FC126126}" srcOrd="1" destOrd="0" presId="urn:microsoft.com/office/officeart/2005/8/layout/vList6"/>
+    <dgm:cxn modelId="{C19D5230-728F-7148-81E5-ACCA86584E4E}" type="presParOf" srcId="{AA153D4A-2E16-7945-B763-27B675165588}" destId="{E5F8C9F5-3C40-C841-9718-27050204926B}" srcOrd="2" destOrd="0" presId="urn:microsoft.com/office/officeart/2005/8/layout/vList6"/>
+    <dgm:cxn modelId="{B72DFCC8-8235-C744-8D21-A6E496042525}" type="presParOf" srcId="{E5F8C9F5-3C40-C841-9718-27050204926B}" destId="{894952C4-259C-DB46-B943-08D6C7D6CF04}" srcOrd="0" destOrd="0" presId="urn:microsoft.com/office/officeart/2005/8/layout/vList6"/>
+    <dgm:cxn modelId="{3474A861-0B72-2042-9021-50928F4B11C4}" type="presParOf" srcId="{E5F8C9F5-3C40-C841-9718-27050204926B}" destId="{7E660546-332B-3E46-AB04-1BDBAC41D906}" srcOrd="1" destOrd="0" presId="urn:microsoft.com/office/officeart/2005/8/layout/vList6"/>
+  </dgm:cxnLst>
+  <dgm:bg/>
+  <dgm:whole/>
+  <dgm:extLst>
+    <a:ext uri="http://schemas.microsoft.com/office/drawing/2008/diagram">
+      <dsp:dataModelExt xmlns:dsp="http://schemas.microsoft.com/office/drawing/2008/diagram" relId="rId6" minVer="http://schemas.openxmlformats.org/drawingml/2006/diagram"/>
+    </a:ext>
+  </dgm:extLst>
+</dgm:dataModel>
+</file>
+
+<file path=ppt/diagrams/data2.xml><?xml version="1.0" encoding="utf-8"?>
 <dgm:dataModel xmlns:dgm="http://schemas.openxmlformats.org/drawingml/2006/diagram" xmlns:a="http://schemas.openxmlformats.org/drawingml/2006/main">
   <dgm:ptLst>
     <dgm:pt modelId="{385E395B-DF6F-4747-A145-03B8C41B3EA6}" type="doc">
@@ -2286,6 +3427,412 @@
 </file>
 
 <file path=ppt/diagrams/drawing1.xml><?xml version="1.0" encoding="utf-8"?>
+<dsp:drawing xmlns:dgm="http://schemas.openxmlformats.org/drawingml/2006/diagram" xmlns:dsp="http://schemas.microsoft.com/office/drawing/2008/diagram" xmlns:a="http://schemas.openxmlformats.org/drawingml/2006/main">
+  <dsp:spTree>
+    <dsp:nvGrpSpPr>
+      <dsp:cNvPr id="0" name=""/>
+      <dsp:cNvGrpSpPr/>
+    </dsp:nvGrpSpPr>
+    <dsp:grpSpPr/>
+    <dsp:sp modelId="{299CD7F1-FA8A-B444-98FC-37679C878521}">
+      <dsp:nvSpPr>
+        <dsp:cNvPr id="0" name=""/>
+        <dsp:cNvSpPr/>
+      </dsp:nvSpPr>
+      <dsp:spPr>
+        <a:xfrm>
+          <a:off x="4206240" y="531"/>
+          <a:ext cx="6309360" cy="2071559"/>
+        </a:xfrm>
+        <a:prstGeom prst="rightArrow">
+          <a:avLst>
+            <a:gd name="adj1" fmla="val 75000"/>
+            <a:gd name="adj2" fmla="val 50000"/>
+          </a:avLst>
+        </a:prstGeom>
+        <a:solidFill>
+          <a:schemeClr val="accent1">
+            <a:alpha val="90000"/>
+            <a:tint val="40000"/>
+            <a:hueOff val="0"/>
+            <a:satOff val="0"/>
+            <a:lumOff val="0"/>
+            <a:alphaOff val="0"/>
+          </a:schemeClr>
+        </a:solidFill>
+        <a:ln w="12700" cap="flat" cmpd="sng" algn="ctr">
+          <a:solidFill>
+            <a:schemeClr val="accent1">
+              <a:alpha val="90000"/>
+              <a:tint val="40000"/>
+              <a:hueOff val="0"/>
+              <a:satOff val="0"/>
+              <a:lumOff val="0"/>
+              <a:alphaOff val="0"/>
+            </a:schemeClr>
+          </a:solidFill>
+          <a:prstDash val="solid"/>
+          <a:miter lim="800000"/>
+        </a:ln>
+        <a:effectLst/>
+      </dsp:spPr>
+      <dsp:style>
+        <a:lnRef idx="2">
+          <a:scrgbClr r="0" g="0" b="0"/>
+        </a:lnRef>
+        <a:fillRef idx="1">
+          <a:scrgbClr r="0" g="0" b="0"/>
+        </a:fillRef>
+        <a:effectRef idx="0">
+          <a:scrgbClr r="0" g="0" b="0"/>
+        </a:effectRef>
+        <a:fontRef idx="minor"/>
+      </dsp:style>
+      <dsp:txBody>
+        <a:bodyPr spcFirstLastPara="0" vert="horz" wrap="square" lIns="20320" tIns="20320" rIns="20320" bIns="20320" numCol="1" spcCol="1270" anchor="t" anchorCtr="0">
+          <a:noAutofit/>
+        </a:bodyPr>
+        <a:lstStyle/>
+        <a:p>
+          <a:pPr marL="285750" lvl="1" indent="-285750" algn="l" defTabSz="1422400">
+            <a:lnSpc>
+              <a:spcPct val="90000"/>
+            </a:lnSpc>
+            <a:spcBef>
+              <a:spcPct val="0"/>
+            </a:spcBef>
+            <a:spcAft>
+              <a:spcPct val="15000"/>
+            </a:spcAft>
+            <a:buChar char="•"/>
+          </a:pPr>
+          <a:r>
+            <a:rPr lang="en-US" sz="3200" kern="1200" dirty="0"/>
+            <a:t>Transaction Agent</a:t>
+          </a:r>
+        </a:p>
+        <a:p>
+          <a:pPr marL="285750" lvl="1" indent="-285750" algn="l" defTabSz="1422400">
+            <a:lnSpc>
+              <a:spcPct val="90000"/>
+            </a:lnSpc>
+            <a:spcBef>
+              <a:spcPct val="0"/>
+            </a:spcBef>
+            <a:spcAft>
+              <a:spcPct val="15000"/>
+            </a:spcAft>
+            <a:buChar char="•"/>
+          </a:pPr>
+          <a:r>
+            <a:rPr lang="en-US" sz="3200" kern="1200" dirty="0"/>
+            <a:t>Transaction direction</a:t>
+          </a:r>
+        </a:p>
+        <a:p>
+          <a:pPr marL="285750" lvl="1" indent="-285750" algn="l" defTabSz="1422400">
+            <a:lnSpc>
+              <a:spcPct val="90000"/>
+            </a:lnSpc>
+            <a:spcBef>
+              <a:spcPct val="0"/>
+            </a:spcBef>
+            <a:spcAft>
+              <a:spcPct val="15000"/>
+            </a:spcAft>
+            <a:buChar char="•"/>
+          </a:pPr>
+          <a:r>
+            <a:rPr lang="en-US" sz="3200" kern="1200" dirty="0"/>
+            <a:t>Transaction month and day</a:t>
+          </a:r>
+        </a:p>
+      </dsp:txBody>
+      <dsp:txXfrm>
+        <a:off x="4206240" y="259476"/>
+        <a:ext cx="5532525" cy="1553669"/>
+      </dsp:txXfrm>
+    </dsp:sp>
+    <dsp:sp modelId="{E12E0DB3-76D1-C640-95ED-AE5221DBD1F1}">
+      <dsp:nvSpPr>
+        <dsp:cNvPr id="0" name=""/>
+        <dsp:cNvSpPr/>
+      </dsp:nvSpPr>
+      <dsp:spPr>
+        <a:xfrm>
+          <a:off x="0" y="531"/>
+          <a:ext cx="4206240" cy="2071559"/>
+        </a:xfrm>
+        <a:prstGeom prst="roundRect">
+          <a:avLst/>
+        </a:prstGeom>
+        <a:solidFill>
+          <a:schemeClr val="accent1">
+            <a:hueOff val="0"/>
+            <a:satOff val="0"/>
+            <a:lumOff val="0"/>
+            <a:alphaOff val="0"/>
+          </a:schemeClr>
+        </a:solidFill>
+        <a:ln w="12700" cap="flat" cmpd="sng" algn="ctr">
+          <a:solidFill>
+            <a:schemeClr val="lt1">
+              <a:hueOff val="0"/>
+              <a:satOff val="0"/>
+              <a:lumOff val="0"/>
+              <a:alphaOff val="0"/>
+            </a:schemeClr>
+          </a:solidFill>
+          <a:prstDash val="solid"/>
+          <a:miter lim="800000"/>
+        </a:ln>
+        <a:effectLst/>
+      </dsp:spPr>
+      <dsp:style>
+        <a:lnRef idx="2">
+          <a:scrgbClr r="0" g="0" b="0"/>
+        </a:lnRef>
+        <a:fillRef idx="1">
+          <a:scrgbClr r="0" g="0" b="0"/>
+        </a:fillRef>
+        <a:effectRef idx="0">
+          <a:scrgbClr r="0" g="0" b="0"/>
+        </a:effectRef>
+        <a:fontRef idx="minor">
+          <a:schemeClr val="lt1"/>
+        </a:fontRef>
+      </dsp:style>
+      <dsp:txBody>
+        <a:bodyPr spcFirstLastPara="0" vert="horz" wrap="square" lIns="179070" tIns="89535" rIns="179070" bIns="89535" numCol="1" spcCol="1270" anchor="ctr" anchorCtr="0">
+          <a:noAutofit/>
+        </a:bodyPr>
+        <a:lstStyle/>
+        <a:p>
+          <a:pPr marL="0" lvl="0" indent="0" algn="ctr" defTabSz="2089150">
+            <a:lnSpc>
+              <a:spcPct val="90000"/>
+            </a:lnSpc>
+            <a:spcBef>
+              <a:spcPct val="0"/>
+            </a:spcBef>
+            <a:spcAft>
+              <a:spcPct val="35000"/>
+            </a:spcAft>
+            <a:buNone/>
+          </a:pPr>
+          <a:r>
+            <a:rPr lang="en-US" sz="4700" kern="1200" dirty="0"/>
+            <a:t>New Features </a:t>
+          </a:r>
+        </a:p>
+      </dsp:txBody>
+      <dsp:txXfrm>
+        <a:off x="101125" y="101656"/>
+        <a:ext cx="4003990" cy="1869309"/>
+      </dsp:txXfrm>
+    </dsp:sp>
+    <dsp:sp modelId="{7E660546-332B-3E46-AB04-1BDBAC41D906}">
+      <dsp:nvSpPr>
+        <dsp:cNvPr id="0" name=""/>
+        <dsp:cNvSpPr/>
+      </dsp:nvSpPr>
+      <dsp:spPr>
+        <a:xfrm>
+          <a:off x="4206240" y="2279246"/>
+          <a:ext cx="6309360" cy="2071559"/>
+        </a:xfrm>
+        <a:prstGeom prst="rightArrow">
+          <a:avLst>
+            <a:gd name="adj1" fmla="val 75000"/>
+            <a:gd name="adj2" fmla="val 50000"/>
+          </a:avLst>
+        </a:prstGeom>
+        <a:solidFill>
+          <a:schemeClr val="accent1">
+            <a:alpha val="90000"/>
+            <a:tint val="40000"/>
+            <a:hueOff val="0"/>
+            <a:satOff val="0"/>
+            <a:lumOff val="0"/>
+            <a:alphaOff val="0"/>
+          </a:schemeClr>
+        </a:solidFill>
+        <a:ln w="12700" cap="flat" cmpd="sng" algn="ctr">
+          <a:solidFill>
+            <a:schemeClr val="accent1">
+              <a:alpha val="90000"/>
+              <a:tint val="40000"/>
+              <a:hueOff val="0"/>
+              <a:satOff val="0"/>
+              <a:lumOff val="0"/>
+              <a:alphaOff val="0"/>
+            </a:schemeClr>
+          </a:solidFill>
+          <a:prstDash val="solid"/>
+          <a:miter lim="800000"/>
+        </a:ln>
+        <a:effectLst/>
+      </dsp:spPr>
+      <dsp:style>
+        <a:lnRef idx="2">
+          <a:scrgbClr r="0" g="0" b="0"/>
+        </a:lnRef>
+        <a:fillRef idx="1">
+          <a:scrgbClr r="0" g="0" b="0"/>
+        </a:fillRef>
+        <a:effectRef idx="0">
+          <a:scrgbClr r="0" g="0" b="0"/>
+        </a:effectRef>
+        <a:fontRef idx="minor"/>
+      </dsp:style>
+      <dsp:txBody>
+        <a:bodyPr spcFirstLastPara="0" vert="horz" wrap="square" lIns="20320" tIns="20320" rIns="20320" bIns="20320" numCol="1" spcCol="1270" anchor="t" anchorCtr="0">
+          <a:noAutofit/>
+        </a:bodyPr>
+        <a:lstStyle/>
+        <a:p>
+          <a:pPr marL="285750" lvl="1" indent="-285750" algn="l" defTabSz="1422400">
+            <a:lnSpc>
+              <a:spcPct val="90000"/>
+            </a:lnSpc>
+            <a:spcBef>
+              <a:spcPct val="0"/>
+            </a:spcBef>
+            <a:spcAft>
+              <a:spcPct val="15000"/>
+            </a:spcAft>
+            <a:buChar char="•"/>
+          </a:pPr>
+          <a:r>
+            <a:rPr lang="en-US" sz="3200" kern="1200" dirty="0"/>
+            <a:t>Encoding categorical features </a:t>
+          </a:r>
+        </a:p>
+        <a:p>
+          <a:pPr marL="285750" lvl="1" indent="-285750" algn="l" defTabSz="1422400">
+            <a:lnSpc>
+              <a:spcPct val="90000"/>
+            </a:lnSpc>
+            <a:spcBef>
+              <a:spcPct val="0"/>
+            </a:spcBef>
+            <a:spcAft>
+              <a:spcPct val="15000"/>
+            </a:spcAft>
+            <a:buChar char="•"/>
+          </a:pPr>
+          <a:r>
+            <a:rPr lang="en-US" sz="3200" kern="1200" dirty="0"/>
+            <a:t>Normalization </a:t>
+          </a:r>
+        </a:p>
+        <a:p>
+          <a:pPr marL="285750" lvl="1" indent="-285750" algn="l" defTabSz="1422400">
+            <a:lnSpc>
+              <a:spcPct val="90000"/>
+            </a:lnSpc>
+            <a:spcBef>
+              <a:spcPct val="0"/>
+            </a:spcBef>
+            <a:spcAft>
+              <a:spcPct val="15000"/>
+            </a:spcAft>
+            <a:buChar char="•"/>
+          </a:pPr>
+          <a:r>
+            <a:rPr lang="en-US" sz="3200" kern="1200" dirty="0"/>
+            <a:t>Train/valid/test split</a:t>
+          </a:r>
+        </a:p>
+      </dsp:txBody>
+      <dsp:txXfrm>
+        <a:off x="4206240" y="2538191"/>
+        <a:ext cx="5532525" cy="1553669"/>
+      </dsp:txXfrm>
+    </dsp:sp>
+    <dsp:sp modelId="{894952C4-259C-DB46-B943-08D6C7D6CF04}">
+      <dsp:nvSpPr>
+        <dsp:cNvPr id="0" name=""/>
+        <dsp:cNvSpPr/>
+      </dsp:nvSpPr>
+      <dsp:spPr>
+        <a:xfrm>
+          <a:off x="0" y="2279246"/>
+          <a:ext cx="4206240" cy="2071559"/>
+        </a:xfrm>
+        <a:prstGeom prst="roundRect">
+          <a:avLst/>
+        </a:prstGeom>
+        <a:solidFill>
+          <a:schemeClr val="accent1">
+            <a:hueOff val="0"/>
+            <a:satOff val="0"/>
+            <a:lumOff val="0"/>
+            <a:alphaOff val="0"/>
+          </a:schemeClr>
+        </a:solidFill>
+        <a:ln w="12700" cap="flat" cmpd="sng" algn="ctr">
+          <a:solidFill>
+            <a:schemeClr val="lt1">
+              <a:hueOff val="0"/>
+              <a:satOff val="0"/>
+              <a:lumOff val="0"/>
+              <a:alphaOff val="0"/>
+            </a:schemeClr>
+          </a:solidFill>
+          <a:prstDash val="solid"/>
+          <a:miter lim="800000"/>
+        </a:ln>
+        <a:effectLst/>
+      </dsp:spPr>
+      <dsp:style>
+        <a:lnRef idx="2">
+          <a:scrgbClr r="0" g="0" b="0"/>
+        </a:lnRef>
+        <a:fillRef idx="1">
+          <a:scrgbClr r="0" g="0" b="0"/>
+        </a:fillRef>
+        <a:effectRef idx="0">
+          <a:scrgbClr r="0" g="0" b="0"/>
+        </a:effectRef>
+        <a:fontRef idx="minor">
+          <a:schemeClr val="lt1"/>
+        </a:fontRef>
+      </dsp:style>
+      <dsp:txBody>
+        <a:bodyPr spcFirstLastPara="0" vert="horz" wrap="square" lIns="179070" tIns="89535" rIns="179070" bIns="89535" numCol="1" spcCol="1270" anchor="ctr" anchorCtr="0">
+          <a:noAutofit/>
+        </a:bodyPr>
+        <a:lstStyle/>
+        <a:p>
+          <a:pPr marL="0" lvl="0" indent="0" algn="ctr" defTabSz="2089150">
+            <a:lnSpc>
+              <a:spcPct val="90000"/>
+            </a:lnSpc>
+            <a:spcBef>
+              <a:spcPct val="0"/>
+            </a:spcBef>
+            <a:spcAft>
+              <a:spcPct val="35000"/>
+            </a:spcAft>
+            <a:buNone/>
+          </a:pPr>
+          <a:r>
+            <a:rPr lang="en-US" sz="4700" kern="1200" dirty="0"/>
+            <a:t>Feature preprocessing </a:t>
+          </a:r>
+        </a:p>
+      </dsp:txBody>
+      <dsp:txXfrm>
+        <a:off x="101125" y="2380371"/>
+        <a:ext cx="4003990" cy="1869309"/>
+      </dsp:txXfrm>
+    </dsp:sp>
+  </dsp:spTree>
+</dsp:drawing>
+</file>
+
+<file path=ppt/diagrams/drawing2.xml><?xml version="1.0" encoding="utf-8"?>
 <dsp:drawing xmlns:dgm="http://schemas.openxmlformats.org/drawingml/2006/diagram" xmlns:dsp="http://schemas.microsoft.com/office/drawing/2008/diagram" xmlns:a="http://schemas.openxmlformats.org/drawingml/2006/main">
   <dsp:spTree>
     <dsp:nvGrpSpPr>
@@ -3479,6 +5026,212 @@
 </file>
 
 <file path=ppt/diagrams/layout1.xml><?xml version="1.0" encoding="utf-8"?>
+<dgm:layoutDef xmlns:dgm="http://schemas.openxmlformats.org/drawingml/2006/diagram" xmlns:a="http://schemas.openxmlformats.org/drawingml/2006/main" uniqueId="urn:microsoft.com/office/officeart/2005/8/layout/vList6">
+  <dgm:title val=""/>
+  <dgm:desc val=""/>
+  <dgm:catLst>
+    <dgm:cat type="process" pri="22000"/>
+    <dgm:cat type="list" pri="17000"/>
+  </dgm:catLst>
+  <dgm:sampData>
+    <dgm:dataModel>
+      <dgm:ptLst>
+        <dgm:pt modelId="0" type="doc"/>
+        <dgm:pt modelId="1">
+          <dgm:prSet phldr="1"/>
+        </dgm:pt>
+        <dgm:pt modelId="11">
+          <dgm:prSet phldr="1"/>
+        </dgm:pt>
+        <dgm:pt modelId="12">
+          <dgm:prSet phldr="1"/>
+        </dgm:pt>
+        <dgm:pt modelId="2">
+          <dgm:prSet phldr="1"/>
+        </dgm:pt>
+        <dgm:pt modelId="21">
+          <dgm:prSet phldr="1"/>
+        </dgm:pt>
+        <dgm:pt modelId="22">
+          <dgm:prSet phldr="1"/>
+        </dgm:pt>
+      </dgm:ptLst>
+      <dgm:cxnLst>
+        <dgm:cxn modelId="4" srcId="0" destId="1" srcOrd="0" destOrd="0"/>
+        <dgm:cxn modelId="5" srcId="0" destId="2" srcOrd="1" destOrd="0"/>
+        <dgm:cxn modelId="13" srcId="1" destId="11" srcOrd="0" destOrd="0"/>
+        <dgm:cxn modelId="14" srcId="1" destId="12" srcOrd="0" destOrd="0"/>
+        <dgm:cxn modelId="23" srcId="2" destId="21" srcOrd="0" destOrd="0"/>
+        <dgm:cxn modelId="24" srcId="2" destId="22" srcOrd="0" destOrd="0"/>
+      </dgm:cxnLst>
+      <dgm:bg/>
+      <dgm:whole/>
+    </dgm:dataModel>
+  </dgm:sampData>
+  <dgm:styleData>
+    <dgm:dataModel>
+      <dgm:ptLst>
+        <dgm:pt modelId="0" type="doc"/>
+        <dgm:pt modelId="1"/>
+        <dgm:pt modelId="2"/>
+      </dgm:ptLst>
+      <dgm:cxnLst>
+        <dgm:cxn modelId="3" srcId="0" destId="1" srcOrd="0" destOrd="0"/>
+        <dgm:cxn modelId="4" srcId="0" destId="2" srcOrd="1" destOrd="0"/>
+      </dgm:cxnLst>
+      <dgm:bg/>
+      <dgm:whole/>
+    </dgm:dataModel>
+  </dgm:styleData>
+  <dgm:clrData>
+    <dgm:dataModel>
+      <dgm:ptLst>
+        <dgm:pt modelId="0" type="doc"/>
+        <dgm:pt modelId="1"/>
+        <dgm:pt modelId="2"/>
+        <dgm:pt modelId="3"/>
+        <dgm:pt modelId="4"/>
+      </dgm:ptLst>
+      <dgm:cxnLst>
+        <dgm:cxn modelId="5" srcId="0" destId="1" srcOrd="0" destOrd="0"/>
+        <dgm:cxn modelId="6" srcId="0" destId="2" srcOrd="1" destOrd="0"/>
+        <dgm:cxn modelId="7" srcId="0" destId="3" srcOrd="2" destOrd="0"/>
+        <dgm:cxn modelId="8" srcId="0" destId="4" srcOrd="3" destOrd="0"/>
+      </dgm:cxnLst>
+      <dgm:bg/>
+      <dgm:whole/>
+    </dgm:dataModel>
+  </dgm:clrData>
+  <dgm:layoutNode name="Name0">
+    <dgm:varLst>
+      <dgm:dir/>
+      <dgm:animLvl val="lvl"/>
+      <dgm:resizeHandles/>
+    </dgm:varLst>
+    <dgm:alg type="lin">
+      <dgm:param type="linDir" val="fromT"/>
+    </dgm:alg>
+    <dgm:shape xmlns:r="http://schemas.openxmlformats.org/officeDocument/2006/relationships" r:blip="">
+      <dgm:adjLst/>
+    </dgm:shape>
+    <dgm:presOf/>
+    <dgm:constrLst>
+      <dgm:constr type="w" for="ch" forName="linNode" refType="w"/>
+      <dgm:constr type="h" for="ch" forName="linNode" refType="h"/>
+      <dgm:constr type="h" for="ch" forName="spacing" refType="h" refFor="ch" refForName="linNode" fact="0.1"/>
+      <dgm:constr type="primFontSz" for="des" forName="parentShp" op="equ" val="65"/>
+      <dgm:constr type="primFontSz" for="des" forName="childShp" op="equ" val="65"/>
+    </dgm:constrLst>
+    <dgm:ruleLst/>
+    <dgm:forEach name="Name1" axis="ch" ptType="node">
+      <dgm:layoutNode name="linNode">
+        <dgm:choose name="Name2">
+          <dgm:if name="Name3" func="var" arg="dir" op="equ" val="norm">
+            <dgm:alg type="lin">
+              <dgm:param type="linDir" val="fromL"/>
+            </dgm:alg>
+          </dgm:if>
+          <dgm:else name="Name4">
+            <dgm:alg type="lin">
+              <dgm:param type="linDir" val="fromR"/>
+            </dgm:alg>
+          </dgm:else>
+        </dgm:choose>
+        <dgm:shape xmlns:r="http://schemas.openxmlformats.org/officeDocument/2006/relationships" r:blip="">
+          <dgm:adjLst/>
+        </dgm:shape>
+        <dgm:presOf/>
+        <dgm:choose name="Name5">
+          <dgm:if name="Name6" func="var" arg="dir" op="equ" val="norm">
+            <dgm:constrLst>
+              <dgm:constr type="w" for="ch" forName="parentShp" refType="w" fact="0.4"/>
+              <dgm:constr type="h" for="ch" forName="parentShp" refType="h"/>
+              <dgm:constr type="w" for="ch" forName="childShp" refType="w" fact="0.6"/>
+              <dgm:constr type="h" for="ch" forName="childShp" refType="h" refFor="ch" refForName="parentShp"/>
+            </dgm:constrLst>
+          </dgm:if>
+          <dgm:else name="Name7">
+            <dgm:constrLst>
+              <dgm:constr type="w" for="ch" forName="parentShp" refType="w" fact="0.4"/>
+              <dgm:constr type="h" for="ch" forName="parentShp" refType="h"/>
+              <dgm:constr type="w" for="ch" forName="childShp" refType="w" fact="0.6"/>
+              <dgm:constr type="h" for="ch" forName="childShp" refType="h" refFor="ch" refForName="parentShp"/>
+            </dgm:constrLst>
+          </dgm:else>
+        </dgm:choose>
+        <dgm:ruleLst/>
+        <dgm:layoutNode name="parentShp" styleLbl="node1">
+          <dgm:varLst>
+            <dgm:bulletEnabled val="1"/>
+          </dgm:varLst>
+          <dgm:alg type="tx"/>
+          <dgm:shape xmlns:r="http://schemas.openxmlformats.org/officeDocument/2006/relationships" type="roundRect" r:blip="">
+            <dgm:adjLst/>
+          </dgm:shape>
+          <dgm:presOf axis="self" ptType="node"/>
+          <dgm:constrLst>
+            <dgm:constr type="tMarg" refType="primFontSz" fact="0.15"/>
+            <dgm:constr type="bMarg" refType="primFontSz" fact="0.15"/>
+            <dgm:constr type="lMarg" refType="primFontSz" fact="0.3"/>
+            <dgm:constr type="rMarg" refType="primFontSz" fact="0.3"/>
+          </dgm:constrLst>
+          <dgm:ruleLst>
+            <dgm:rule type="primFontSz" val="5" fact="NaN" max="NaN"/>
+          </dgm:ruleLst>
+        </dgm:layoutNode>
+        <dgm:layoutNode name="childShp" styleLbl="bgAccFollowNode1">
+          <dgm:varLst>
+            <dgm:bulletEnabled val="1"/>
+          </dgm:varLst>
+          <dgm:alg type="tx">
+            <dgm:param type="stBulletLvl" val="1"/>
+          </dgm:alg>
+          <dgm:choose name="Name8">
+            <dgm:if name="Name9" func="var" arg="dir" op="equ" val="norm">
+              <dgm:shape xmlns:r="http://schemas.openxmlformats.org/officeDocument/2006/relationships" type="rightArrow" r:blip="" zOrderOff="-2">
+                <dgm:adjLst>
+                  <dgm:adj idx="1" val="0.75"/>
+                </dgm:adjLst>
+              </dgm:shape>
+            </dgm:if>
+            <dgm:else name="Name10">
+              <dgm:shape xmlns:r="http://schemas.openxmlformats.org/officeDocument/2006/relationships" rot="180" type="rightArrow" r:blip="" zOrderOff="-2">
+                <dgm:adjLst>
+                  <dgm:adj idx="1" val="0.75"/>
+                </dgm:adjLst>
+              </dgm:shape>
+            </dgm:else>
+          </dgm:choose>
+          <dgm:presOf axis="des" ptType="node"/>
+          <dgm:constrLst>
+            <dgm:constr type="secFontSz" refType="primFontSz"/>
+            <dgm:constr type="tMarg" refType="primFontSz" fact="0.05"/>
+            <dgm:constr type="bMarg" refType="primFontSz" fact="0.05"/>
+            <dgm:constr type="lMarg" refType="primFontSz" fact="0.05"/>
+            <dgm:constr type="rMarg" refType="primFontSz" fact="0.05"/>
+          </dgm:constrLst>
+          <dgm:ruleLst>
+            <dgm:rule type="primFontSz" val="5" fact="NaN" max="NaN"/>
+          </dgm:ruleLst>
+        </dgm:layoutNode>
+      </dgm:layoutNode>
+      <dgm:forEach name="Name11" axis="followSib" ptType="sibTrans" cnt="1">
+        <dgm:layoutNode name="spacing">
+          <dgm:alg type="sp"/>
+          <dgm:shape xmlns:r="http://schemas.openxmlformats.org/officeDocument/2006/relationships" r:blip="">
+            <dgm:adjLst/>
+          </dgm:shape>
+          <dgm:presOf/>
+          <dgm:constrLst/>
+          <dgm:ruleLst/>
+        </dgm:layoutNode>
+      </dgm:forEach>
+    </dgm:forEach>
+  </dgm:layoutNode>
+</dgm:layoutDef>
+</file>
+
+<file path=ppt/diagrams/layout2.xml><?xml version="1.0" encoding="utf-8"?>
 <dgm:layoutDef xmlns:dgm="http://schemas.openxmlformats.org/drawingml/2006/diagram" xmlns:a="http://schemas.openxmlformats.org/drawingml/2006/main" uniqueId="urn:microsoft.com/office/officeart/2005/8/layout/hierarchy2">
   <dgm:title val=""/>
   <dgm:desc val=""/>
@@ -4832,6 +6585,1040 @@
 </dgm:styleDef>
 </file>
 
+<file path=ppt/diagrams/quickStyle2.xml><?xml version="1.0" encoding="utf-8"?>
+<dgm:styleDef xmlns:dgm="http://schemas.openxmlformats.org/drawingml/2006/diagram" xmlns:a="http://schemas.openxmlformats.org/drawingml/2006/main" uniqueId="urn:microsoft.com/office/officeart/2005/8/quickstyle/simple1">
+  <dgm:title val=""/>
+  <dgm:desc val=""/>
+  <dgm:catLst>
+    <dgm:cat type="simple" pri="10100"/>
+  </dgm:catLst>
+  <dgm:scene3d>
+    <a:camera prst="orthographicFront"/>
+    <a:lightRig rig="threePt" dir="t"/>
+  </dgm:scene3d>
+  <dgm:styleLbl name="node0">
+    <dgm:scene3d>
+      <a:camera prst="orthographicFront"/>
+      <a:lightRig rig="threePt" dir="t"/>
+    </dgm:scene3d>
+    <dgm:sp3d/>
+    <dgm:txPr/>
+    <dgm:style>
+      <a:lnRef idx="2">
+        <a:scrgbClr r="0" g="0" b="0"/>
+      </a:lnRef>
+      <a:fillRef idx="1">
+        <a:scrgbClr r="0" g="0" b="0"/>
+      </a:fillRef>
+      <a:effectRef idx="0">
+        <a:scrgbClr r="0" g="0" b="0"/>
+      </a:effectRef>
+      <a:fontRef idx="minor">
+        <a:schemeClr val="lt1"/>
+      </a:fontRef>
+    </dgm:style>
+  </dgm:styleLbl>
+  <dgm:styleLbl name="lnNode1">
+    <dgm:scene3d>
+      <a:camera prst="orthographicFront"/>
+      <a:lightRig rig="threePt" dir="t"/>
+    </dgm:scene3d>
+    <dgm:sp3d/>
+    <dgm:txPr/>
+    <dgm:style>
+      <a:lnRef idx="2">
+        <a:scrgbClr r="0" g="0" b="0"/>
+      </a:lnRef>
+      <a:fillRef idx="1">
+        <a:scrgbClr r="0" g="0" b="0"/>
+      </a:fillRef>
+      <a:effectRef idx="0">
+        <a:scrgbClr r="0" g="0" b="0"/>
+      </a:effectRef>
+      <a:fontRef idx="minor">
+        <a:schemeClr val="lt1"/>
+      </a:fontRef>
+    </dgm:style>
+  </dgm:styleLbl>
+  <dgm:styleLbl name="vennNode1">
+    <dgm:scene3d>
+      <a:camera prst="orthographicFront"/>
+      <a:lightRig rig="threePt" dir="t"/>
+    </dgm:scene3d>
+    <dgm:sp3d/>
+    <dgm:txPr/>
+    <dgm:style>
+      <a:lnRef idx="2">
+        <a:scrgbClr r="0" g="0" b="0"/>
+      </a:lnRef>
+      <a:fillRef idx="1">
+        <a:scrgbClr r="0" g="0" b="0"/>
+      </a:fillRef>
+      <a:effectRef idx="0">
+        <a:scrgbClr r="0" g="0" b="0"/>
+      </a:effectRef>
+      <a:fontRef idx="minor">
+        <a:schemeClr val="tx1"/>
+      </a:fontRef>
+    </dgm:style>
+  </dgm:styleLbl>
+  <dgm:styleLbl name="alignNode1">
+    <dgm:scene3d>
+      <a:camera prst="orthographicFront"/>
+      <a:lightRig rig="threePt" dir="t"/>
+    </dgm:scene3d>
+    <dgm:sp3d/>
+    <dgm:txPr/>
+    <dgm:style>
+      <a:lnRef idx="2">
+        <a:scrgbClr r="0" g="0" b="0"/>
+      </a:lnRef>
+      <a:fillRef idx="1">
+        <a:scrgbClr r="0" g="0" b="0"/>
+      </a:fillRef>
+      <a:effectRef idx="0">
+        <a:scrgbClr r="0" g="0" b="0"/>
+      </a:effectRef>
+      <a:fontRef idx="minor">
+        <a:schemeClr val="lt1"/>
+      </a:fontRef>
+    </dgm:style>
+  </dgm:styleLbl>
+  <dgm:styleLbl name="node1">
+    <dgm:scene3d>
+      <a:camera prst="orthographicFront"/>
+      <a:lightRig rig="threePt" dir="t"/>
+    </dgm:scene3d>
+    <dgm:sp3d/>
+    <dgm:txPr/>
+    <dgm:style>
+      <a:lnRef idx="2">
+        <a:scrgbClr r="0" g="0" b="0"/>
+      </a:lnRef>
+      <a:fillRef idx="1">
+        <a:scrgbClr r="0" g="0" b="0"/>
+      </a:fillRef>
+      <a:effectRef idx="0">
+        <a:scrgbClr r="0" g="0" b="0"/>
+      </a:effectRef>
+      <a:fontRef idx="minor">
+        <a:schemeClr val="lt1"/>
+      </a:fontRef>
+    </dgm:style>
+  </dgm:styleLbl>
+  <dgm:styleLbl name="node2">
+    <dgm:scene3d>
+      <a:camera prst="orthographicFront"/>
+      <a:lightRig rig="threePt" dir="t"/>
+    </dgm:scene3d>
+    <dgm:sp3d/>
+    <dgm:txPr/>
+    <dgm:style>
+      <a:lnRef idx="2">
+        <a:scrgbClr r="0" g="0" b="0"/>
+      </a:lnRef>
+      <a:fillRef idx="1">
+        <a:scrgbClr r="0" g="0" b="0"/>
+      </a:fillRef>
+      <a:effectRef idx="0">
+        <a:scrgbClr r="0" g="0" b="0"/>
+      </a:effectRef>
+      <a:fontRef idx="minor">
+        <a:schemeClr val="lt1"/>
+      </a:fontRef>
+    </dgm:style>
+  </dgm:styleLbl>
+  <dgm:styleLbl name="node3">
+    <dgm:scene3d>
+      <a:camera prst="orthographicFront"/>
+      <a:lightRig rig="threePt" dir="t"/>
+    </dgm:scene3d>
+    <dgm:sp3d/>
+    <dgm:txPr/>
+    <dgm:style>
+      <a:lnRef idx="2">
+        <a:scrgbClr r="0" g="0" b="0"/>
+      </a:lnRef>
+      <a:fillRef idx="1">
+        <a:scrgbClr r="0" g="0" b="0"/>
+      </a:fillRef>
+      <a:effectRef idx="0">
+        <a:scrgbClr r="0" g="0" b="0"/>
+      </a:effectRef>
+      <a:fontRef idx="minor">
+        <a:schemeClr val="lt1"/>
+      </a:fontRef>
+    </dgm:style>
+  </dgm:styleLbl>
+  <dgm:styleLbl name="node4">
+    <dgm:scene3d>
+      <a:camera prst="orthographicFront"/>
+      <a:lightRig rig="threePt" dir="t"/>
+    </dgm:scene3d>
+    <dgm:sp3d/>
+    <dgm:txPr/>
+    <dgm:style>
+      <a:lnRef idx="2">
+        <a:scrgbClr r="0" g="0" b="0"/>
+      </a:lnRef>
+      <a:fillRef idx="1">
+        <a:scrgbClr r="0" g="0" b="0"/>
+      </a:fillRef>
+      <a:effectRef idx="0">
+        <a:scrgbClr r="0" g="0" b="0"/>
+      </a:effectRef>
+      <a:fontRef idx="minor">
+        <a:schemeClr val="lt1"/>
+      </a:fontRef>
+    </dgm:style>
+  </dgm:styleLbl>
+  <dgm:styleLbl name="fgImgPlace1">
+    <dgm:scene3d>
+      <a:camera prst="orthographicFront"/>
+      <a:lightRig rig="threePt" dir="t"/>
+    </dgm:scene3d>
+    <dgm:sp3d/>
+    <dgm:txPr/>
+    <dgm:style>
+      <a:lnRef idx="2">
+        <a:scrgbClr r="0" g="0" b="0"/>
+      </a:lnRef>
+      <a:fillRef idx="1">
+        <a:scrgbClr r="0" g="0" b="0"/>
+      </a:fillRef>
+      <a:effectRef idx="0">
+        <a:scrgbClr r="0" g="0" b="0"/>
+      </a:effectRef>
+      <a:fontRef idx="minor"/>
+    </dgm:style>
+  </dgm:styleLbl>
+  <dgm:styleLbl name="alignImgPlace1">
+    <dgm:scene3d>
+      <a:camera prst="orthographicFront"/>
+      <a:lightRig rig="threePt" dir="t"/>
+    </dgm:scene3d>
+    <dgm:sp3d/>
+    <dgm:txPr/>
+    <dgm:style>
+      <a:lnRef idx="2">
+        <a:scrgbClr r="0" g="0" b="0"/>
+      </a:lnRef>
+      <a:fillRef idx="1">
+        <a:scrgbClr r="0" g="0" b="0"/>
+      </a:fillRef>
+      <a:effectRef idx="0">
+        <a:scrgbClr r="0" g="0" b="0"/>
+      </a:effectRef>
+      <a:fontRef idx="minor"/>
+    </dgm:style>
+  </dgm:styleLbl>
+  <dgm:styleLbl name="bgImgPlace1">
+    <dgm:scene3d>
+      <a:camera prst="orthographicFront"/>
+      <a:lightRig rig="threePt" dir="t"/>
+    </dgm:scene3d>
+    <dgm:sp3d/>
+    <dgm:txPr/>
+    <dgm:style>
+      <a:lnRef idx="2">
+        <a:scrgbClr r="0" g="0" b="0"/>
+      </a:lnRef>
+      <a:fillRef idx="1">
+        <a:scrgbClr r="0" g="0" b="0"/>
+      </a:fillRef>
+      <a:effectRef idx="0">
+        <a:scrgbClr r="0" g="0" b="0"/>
+      </a:effectRef>
+      <a:fontRef idx="minor"/>
+    </dgm:style>
+  </dgm:styleLbl>
+  <dgm:styleLbl name="sibTrans2D1">
+    <dgm:scene3d>
+      <a:camera prst="orthographicFront"/>
+      <a:lightRig rig="threePt" dir="t"/>
+    </dgm:scene3d>
+    <dgm:sp3d/>
+    <dgm:txPr/>
+    <dgm:style>
+      <a:lnRef idx="0">
+        <a:scrgbClr r="0" g="0" b="0"/>
+      </a:lnRef>
+      <a:fillRef idx="1">
+        <a:scrgbClr r="0" g="0" b="0"/>
+      </a:fillRef>
+      <a:effectRef idx="0">
+        <a:scrgbClr r="0" g="0" b="0"/>
+      </a:effectRef>
+      <a:fontRef idx="minor">
+        <a:schemeClr val="lt1"/>
+      </a:fontRef>
+    </dgm:style>
+  </dgm:styleLbl>
+  <dgm:styleLbl name="fgSibTrans2D1">
+    <dgm:scene3d>
+      <a:camera prst="orthographicFront"/>
+      <a:lightRig rig="threePt" dir="t"/>
+    </dgm:scene3d>
+    <dgm:sp3d/>
+    <dgm:txPr/>
+    <dgm:style>
+      <a:lnRef idx="0">
+        <a:scrgbClr r="0" g="0" b="0"/>
+      </a:lnRef>
+      <a:fillRef idx="1">
+        <a:scrgbClr r="0" g="0" b="0"/>
+      </a:fillRef>
+      <a:effectRef idx="0">
+        <a:scrgbClr r="0" g="0" b="0"/>
+      </a:effectRef>
+      <a:fontRef idx="minor">
+        <a:schemeClr val="lt1"/>
+      </a:fontRef>
+    </dgm:style>
+  </dgm:styleLbl>
+  <dgm:styleLbl name="bgSibTrans2D1">
+    <dgm:scene3d>
+      <a:camera prst="orthographicFront"/>
+      <a:lightRig rig="threePt" dir="t"/>
+    </dgm:scene3d>
+    <dgm:sp3d/>
+    <dgm:txPr/>
+    <dgm:style>
+      <a:lnRef idx="0">
+        <a:scrgbClr r="0" g="0" b="0"/>
+      </a:lnRef>
+      <a:fillRef idx="1">
+        <a:scrgbClr r="0" g="0" b="0"/>
+      </a:fillRef>
+      <a:effectRef idx="0">
+        <a:scrgbClr r="0" g="0" b="0"/>
+      </a:effectRef>
+      <a:fontRef idx="minor">
+        <a:schemeClr val="lt1"/>
+      </a:fontRef>
+    </dgm:style>
+  </dgm:styleLbl>
+  <dgm:styleLbl name="sibTrans1D1">
+    <dgm:scene3d>
+      <a:camera prst="orthographicFront"/>
+      <a:lightRig rig="threePt" dir="t"/>
+    </dgm:scene3d>
+    <dgm:sp3d/>
+    <dgm:txPr/>
+    <dgm:style>
+      <a:lnRef idx="1">
+        <a:scrgbClr r="0" g="0" b="0"/>
+      </a:lnRef>
+      <a:fillRef idx="0">
+        <a:scrgbClr r="0" g="0" b="0"/>
+      </a:fillRef>
+      <a:effectRef idx="0">
+        <a:scrgbClr r="0" g="0" b="0"/>
+      </a:effectRef>
+      <a:fontRef idx="minor"/>
+    </dgm:style>
+  </dgm:styleLbl>
+  <dgm:styleLbl name="callout">
+    <dgm:scene3d>
+      <a:camera prst="orthographicFront"/>
+      <a:lightRig rig="threePt" dir="t"/>
+    </dgm:scene3d>
+    <dgm:sp3d/>
+    <dgm:txPr/>
+    <dgm:style>
+      <a:lnRef idx="2">
+        <a:scrgbClr r="0" g="0" b="0"/>
+      </a:lnRef>
+      <a:fillRef idx="1">
+        <a:scrgbClr r="0" g="0" b="0"/>
+      </a:fillRef>
+      <a:effectRef idx="0">
+        <a:scrgbClr r="0" g="0" b="0"/>
+      </a:effectRef>
+      <a:fontRef idx="minor"/>
+    </dgm:style>
+  </dgm:styleLbl>
+  <dgm:styleLbl name="asst0">
+    <dgm:scene3d>
+      <a:camera prst="orthographicFront"/>
+      <a:lightRig rig="threePt" dir="t"/>
+    </dgm:scene3d>
+    <dgm:sp3d/>
+    <dgm:txPr/>
+    <dgm:style>
+      <a:lnRef idx="2">
+        <a:scrgbClr r="0" g="0" b="0"/>
+      </a:lnRef>
+      <a:fillRef idx="1">
+        <a:scrgbClr r="0" g="0" b="0"/>
+      </a:fillRef>
+      <a:effectRef idx="0">
+        <a:scrgbClr r="0" g="0" b="0"/>
+      </a:effectRef>
+      <a:fontRef idx="minor">
+        <a:schemeClr val="lt1"/>
+      </a:fontRef>
+    </dgm:style>
+  </dgm:styleLbl>
+  <dgm:styleLbl name="asst1">
+    <dgm:scene3d>
+      <a:camera prst="orthographicFront"/>
+      <a:lightRig rig="threePt" dir="t"/>
+    </dgm:scene3d>
+    <dgm:sp3d/>
+    <dgm:txPr/>
+    <dgm:style>
+      <a:lnRef idx="2">
+        <a:scrgbClr r="0" g="0" b="0"/>
+      </a:lnRef>
+      <a:fillRef idx="1">
+        <a:scrgbClr r="0" g="0" b="0"/>
+      </a:fillRef>
+      <a:effectRef idx="0">
+        <a:scrgbClr r="0" g="0" b="0"/>
+      </a:effectRef>
+      <a:fontRef idx="minor">
+        <a:schemeClr val="lt1"/>
+      </a:fontRef>
+    </dgm:style>
+  </dgm:styleLbl>
+  <dgm:styleLbl name="asst2">
+    <dgm:scene3d>
+      <a:camera prst="orthographicFront"/>
+      <a:lightRig rig="threePt" dir="t"/>
+    </dgm:scene3d>
+    <dgm:sp3d/>
+    <dgm:txPr/>
+    <dgm:style>
+      <a:lnRef idx="2">
+        <a:scrgbClr r="0" g="0" b="0"/>
+      </a:lnRef>
+      <a:fillRef idx="1">
+        <a:scrgbClr r="0" g="0" b="0"/>
+      </a:fillRef>
+      <a:effectRef idx="0">
+        <a:scrgbClr r="0" g="0" b="0"/>
+      </a:effectRef>
+      <a:fontRef idx="minor">
+        <a:schemeClr val="lt1"/>
+      </a:fontRef>
+    </dgm:style>
+  </dgm:styleLbl>
+  <dgm:styleLbl name="asst3">
+    <dgm:scene3d>
+      <a:camera prst="orthographicFront"/>
+      <a:lightRig rig="threePt" dir="t"/>
+    </dgm:scene3d>
+    <dgm:sp3d/>
+    <dgm:txPr/>
+    <dgm:style>
+      <a:lnRef idx="2">
+        <a:scrgbClr r="0" g="0" b="0"/>
+      </a:lnRef>
+      <a:fillRef idx="1">
+        <a:scrgbClr r="0" g="0" b="0"/>
+      </a:fillRef>
+      <a:effectRef idx="0">
+        <a:scrgbClr r="0" g="0" b="0"/>
+      </a:effectRef>
+      <a:fontRef idx="minor">
+        <a:schemeClr val="lt1"/>
+      </a:fontRef>
+    </dgm:style>
+  </dgm:styleLbl>
+  <dgm:styleLbl name="asst4">
+    <dgm:scene3d>
+      <a:camera prst="orthographicFront"/>
+      <a:lightRig rig="threePt" dir="t"/>
+    </dgm:scene3d>
+    <dgm:sp3d/>
+    <dgm:txPr/>
+    <dgm:style>
+      <a:lnRef idx="2">
+        <a:scrgbClr r="0" g="0" b="0"/>
+      </a:lnRef>
+      <a:fillRef idx="1">
+        <a:scrgbClr r="0" g="0" b="0"/>
+      </a:fillRef>
+      <a:effectRef idx="0">
+        <a:scrgbClr r="0" g="0" b="0"/>
+      </a:effectRef>
+      <a:fontRef idx="minor">
+        <a:schemeClr val="lt1"/>
+      </a:fontRef>
+    </dgm:style>
+  </dgm:styleLbl>
+  <dgm:styleLbl name="parChTrans2D1">
+    <dgm:scene3d>
+      <a:camera prst="orthographicFront"/>
+      <a:lightRig rig="threePt" dir="t"/>
+    </dgm:scene3d>
+    <dgm:sp3d/>
+    <dgm:txPr/>
+    <dgm:style>
+      <a:lnRef idx="2">
+        <a:scrgbClr r="0" g="0" b="0"/>
+      </a:lnRef>
+      <a:fillRef idx="1">
+        <a:scrgbClr r="0" g="0" b="0"/>
+      </a:fillRef>
+      <a:effectRef idx="0">
+        <a:scrgbClr r="0" g="0" b="0"/>
+      </a:effectRef>
+      <a:fontRef idx="minor">
+        <a:schemeClr val="lt1"/>
+      </a:fontRef>
+    </dgm:style>
+  </dgm:styleLbl>
+  <dgm:styleLbl name="parChTrans2D2">
+    <dgm:scene3d>
+      <a:camera prst="orthographicFront"/>
+      <a:lightRig rig="threePt" dir="t"/>
+    </dgm:scene3d>
+    <dgm:sp3d/>
+    <dgm:txPr/>
+    <dgm:style>
+      <a:lnRef idx="2">
+        <a:scrgbClr r="0" g="0" b="0"/>
+      </a:lnRef>
+      <a:fillRef idx="1">
+        <a:scrgbClr r="0" g="0" b="0"/>
+      </a:fillRef>
+      <a:effectRef idx="0">
+        <a:scrgbClr r="0" g="0" b="0"/>
+      </a:effectRef>
+      <a:fontRef idx="minor">
+        <a:schemeClr val="lt1"/>
+      </a:fontRef>
+    </dgm:style>
+  </dgm:styleLbl>
+  <dgm:styleLbl name="parChTrans2D3">
+    <dgm:scene3d>
+      <a:camera prst="orthographicFront"/>
+      <a:lightRig rig="threePt" dir="t"/>
+    </dgm:scene3d>
+    <dgm:sp3d/>
+    <dgm:txPr/>
+    <dgm:style>
+      <a:lnRef idx="2">
+        <a:scrgbClr r="0" g="0" b="0"/>
+      </a:lnRef>
+      <a:fillRef idx="1">
+        <a:scrgbClr r="0" g="0" b="0"/>
+      </a:fillRef>
+      <a:effectRef idx="0">
+        <a:scrgbClr r="0" g="0" b="0"/>
+      </a:effectRef>
+      <a:fontRef idx="minor">
+        <a:schemeClr val="lt1"/>
+      </a:fontRef>
+    </dgm:style>
+  </dgm:styleLbl>
+  <dgm:styleLbl name="parChTrans2D4">
+    <dgm:scene3d>
+      <a:camera prst="orthographicFront"/>
+      <a:lightRig rig="threePt" dir="t"/>
+    </dgm:scene3d>
+    <dgm:sp3d/>
+    <dgm:txPr/>
+    <dgm:style>
+      <a:lnRef idx="2">
+        <a:scrgbClr r="0" g="0" b="0"/>
+      </a:lnRef>
+      <a:fillRef idx="1">
+        <a:scrgbClr r="0" g="0" b="0"/>
+      </a:fillRef>
+      <a:effectRef idx="0">
+        <a:scrgbClr r="0" g="0" b="0"/>
+      </a:effectRef>
+      <a:fontRef idx="minor">
+        <a:schemeClr val="lt1"/>
+      </a:fontRef>
+    </dgm:style>
+  </dgm:styleLbl>
+  <dgm:styleLbl name="parChTrans1D1">
+    <dgm:scene3d>
+      <a:camera prst="orthographicFront"/>
+      <a:lightRig rig="threePt" dir="t"/>
+    </dgm:scene3d>
+    <dgm:sp3d/>
+    <dgm:txPr/>
+    <dgm:style>
+      <a:lnRef idx="2">
+        <a:scrgbClr r="0" g="0" b="0"/>
+      </a:lnRef>
+      <a:fillRef idx="0">
+        <a:scrgbClr r="0" g="0" b="0"/>
+      </a:fillRef>
+      <a:effectRef idx="0">
+        <a:scrgbClr r="0" g="0" b="0"/>
+      </a:effectRef>
+      <a:fontRef idx="minor"/>
+    </dgm:style>
+  </dgm:styleLbl>
+  <dgm:styleLbl name="parChTrans1D2">
+    <dgm:scene3d>
+      <a:camera prst="orthographicFront"/>
+      <a:lightRig rig="threePt" dir="t"/>
+    </dgm:scene3d>
+    <dgm:sp3d/>
+    <dgm:txPr/>
+    <dgm:style>
+      <a:lnRef idx="2">
+        <a:scrgbClr r="0" g="0" b="0"/>
+      </a:lnRef>
+      <a:fillRef idx="0">
+        <a:scrgbClr r="0" g="0" b="0"/>
+      </a:fillRef>
+      <a:effectRef idx="0">
+        <a:scrgbClr r="0" g="0" b="0"/>
+      </a:effectRef>
+      <a:fontRef idx="minor"/>
+    </dgm:style>
+  </dgm:styleLbl>
+  <dgm:styleLbl name="parChTrans1D3">
+    <dgm:scene3d>
+      <a:camera prst="orthographicFront"/>
+      <a:lightRig rig="threePt" dir="t"/>
+    </dgm:scene3d>
+    <dgm:sp3d/>
+    <dgm:txPr/>
+    <dgm:style>
+      <a:lnRef idx="2">
+        <a:scrgbClr r="0" g="0" b="0"/>
+      </a:lnRef>
+      <a:fillRef idx="0">
+        <a:scrgbClr r="0" g="0" b="0"/>
+      </a:fillRef>
+      <a:effectRef idx="0">
+        <a:scrgbClr r="0" g="0" b="0"/>
+      </a:effectRef>
+      <a:fontRef idx="minor"/>
+    </dgm:style>
+  </dgm:styleLbl>
+  <dgm:styleLbl name="parChTrans1D4">
+    <dgm:scene3d>
+      <a:camera prst="orthographicFront"/>
+      <a:lightRig rig="threePt" dir="t"/>
+    </dgm:scene3d>
+    <dgm:sp3d/>
+    <dgm:txPr/>
+    <dgm:style>
+      <a:lnRef idx="2">
+        <a:scrgbClr r="0" g="0" b="0"/>
+      </a:lnRef>
+      <a:fillRef idx="0">
+        <a:scrgbClr r="0" g="0" b="0"/>
+      </a:fillRef>
+      <a:effectRef idx="0">
+        <a:scrgbClr r="0" g="0" b="0"/>
+      </a:effectRef>
+      <a:fontRef idx="minor"/>
+    </dgm:style>
+  </dgm:styleLbl>
+  <dgm:styleLbl name="fgAcc1">
+    <dgm:scene3d>
+      <a:camera prst="orthographicFront"/>
+      <a:lightRig rig="threePt" dir="t"/>
+    </dgm:scene3d>
+    <dgm:sp3d/>
+    <dgm:txPr/>
+    <dgm:style>
+      <a:lnRef idx="2">
+        <a:scrgbClr r="0" g="0" b="0"/>
+      </a:lnRef>
+      <a:fillRef idx="1">
+        <a:scrgbClr r="0" g="0" b="0"/>
+      </a:fillRef>
+      <a:effectRef idx="0">
+        <a:scrgbClr r="0" g="0" b="0"/>
+      </a:effectRef>
+      <a:fontRef idx="minor"/>
+    </dgm:style>
+  </dgm:styleLbl>
+  <dgm:styleLbl name="conFgAcc1">
+    <dgm:scene3d>
+      <a:camera prst="orthographicFront"/>
+      <a:lightRig rig="threePt" dir="t"/>
+    </dgm:scene3d>
+    <dgm:sp3d/>
+    <dgm:txPr/>
+    <dgm:style>
+      <a:lnRef idx="2">
+        <a:scrgbClr r="0" g="0" b="0"/>
+      </a:lnRef>
+      <a:fillRef idx="1">
+        <a:scrgbClr r="0" g="0" b="0"/>
+      </a:fillRef>
+      <a:effectRef idx="0">
+        <a:scrgbClr r="0" g="0" b="0"/>
+      </a:effectRef>
+      <a:fontRef idx="minor"/>
+    </dgm:style>
+  </dgm:styleLbl>
+  <dgm:styleLbl name="alignAcc1">
+    <dgm:scene3d>
+      <a:camera prst="orthographicFront"/>
+      <a:lightRig rig="threePt" dir="t"/>
+    </dgm:scene3d>
+    <dgm:sp3d/>
+    <dgm:txPr/>
+    <dgm:style>
+      <a:lnRef idx="2">
+        <a:scrgbClr r="0" g="0" b="0"/>
+      </a:lnRef>
+      <a:fillRef idx="1">
+        <a:scrgbClr r="0" g="0" b="0"/>
+      </a:fillRef>
+      <a:effectRef idx="0">
+        <a:scrgbClr r="0" g="0" b="0"/>
+      </a:effectRef>
+      <a:fontRef idx="minor"/>
+    </dgm:style>
+  </dgm:styleLbl>
+  <dgm:styleLbl name="trAlignAcc1">
+    <dgm:scene3d>
+      <a:camera prst="orthographicFront"/>
+      <a:lightRig rig="threePt" dir="t"/>
+    </dgm:scene3d>
+    <dgm:sp3d/>
+    <dgm:txPr/>
+    <dgm:style>
+      <a:lnRef idx="1">
+        <a:scrgbClr r="0" g="0" b="0"/>
+      </a:lnRef>
+      <a:fillRef idx="1">
+        <a:scrgbClr r="0" g="0" b="0"/>
+      </a:fillRef>
+      <a:effectRef idx="0">
+        <a:scrgbClr r="0" g="0" b="0"/>
+      </a:effectRef>
+      <a:fontRef idx="minor"/>
+    </dgm:style>
+  </dgm:styleLbl>
+  <dgm:styleLbl name="bgAcc1">
+    <dgm:scene3d>
+      <a:camera prst="orthographicFront"/>
+      <a:lightRig rig="threePt" dir="t"/>
+    </dgm:scene3d>
+    <dgm:sp3d/>
+    <dgm:txPr/>
+    <dgm:style>
+      <a:lnRef idx="2">
+        <a:scrgbClr r="0" g="0" b="0"/>
+      </a:lnRef>
+      <a:fillRef idx="1">
+        <a:scrgbClr r="0" g="0" b="0"/>
+      </a:fillRef>
+      <a:effectRef idx="0">
+        <a:scrgbClr r="0" g="0" b="0"/>
+      </a:effectRef>
+      <a:fontRef idx="minor"/>
+    </dgm:style>
+  </dgm:styleLbl>
+  <dgm:styleLbl name="solidFgAcc1">
+    <dgm:scene3d>
+      <a:camera prst="orthographicFront"/>
+      <a:lightRig rig="threePt" dir="t"/>
+    </dgm:scene3d>
+    <dgm:sp3d/>
+    <dgm:txPr/>
+    <dgm:style>
+      <a:lnRef idx="2">
+        <a:scrgbClr r="0" g="0" b="0"/>
+      </a:lnRef>
+      <a:fillRef idx="1">
+        <a:scrgbClr r="0" g="0" b="0"/>
+      </a:fillRef>
+      <a:effectRef idx="0">
+        <a:scrgbClr r="0" g="0" b="0"/>
+      </a:effectRef>
+      <a:fontRef idx="minor"/>
+    </dgm:style>
+  </dgm:styleLbl>
+  <dgm:styleLbl name="solidAlignAcc1">
+    <dgm:scene3d>
+      <a:camera prst="orthographicFront"/>
+      <a:lightRig rig="threePt" dir="t"/>
+    </dgm:scene3d>
+    <dgm:sp3d/>
+    <dgm:txPr/>
+    <dgm:style>
+      <a:lnRef idx="2">
+        <a:scrgbClr r="0" g="0" b="0"/>
+      </a:lnRef>
+      <a:fillRef idx="1">
+        <a:scrgbClr r="0" g="0" b="0"/>
+      </a:fillRef>
+      <a:effectRef idx="0">
+        <a:scrgbClr r="0" g="0" b="0"/>
+      </a:effectRef>
+      <a:fontRef idx="minor"/>
+    </dgm:style>
+  </dgm:styleLbl>
+  <dgm:styleLbl name="solidBgAcc1">
+    <dgm:scene3d>
+      <a:camera prst="orthographicFront"/>
+      <a:lightRig rig="threePt" dir="t"/>
+    </dgm:scene3d>
+    <dgm:sp3d/>
+    <dgm:txPr/>
+    <dgm:style>
+      <a:lnRef idx="2">
+        <a:scrgbClr r="0" g="0" b="0"/>
+      </a:lnRef>
+      <a:fillRef idx="1">
+        <a:scrgbClr r="0" g="0" b="0"/>
+      </a:fillRef>
+      <a:effectRef idx="0">
+        <a:scrgbClr r="0" g="0" b="0"/>
+      </a:effectRef>
+      <a:fontRef idx="minor"/>
+    </dgm:style>
+  </dgm:styleLbl>
+  <dgm:styleLbl name="fgAccFollowNode1">
+    <dgm:scene3d>
+      <a:camera prst="orthographicFront"/>
+      <a:lightRig rig="threePt" dir="t"/>
+    </dgm:scene3d>
+    <dgm:sp3d/>
+    <dgm:txPr/>
+    <dgm:style>
+      <a:lnRef idx="2">
+        <a:scrgbClr r="0" g="0" b="0"/>
+      </a:lnRef>
+      <a:fillRef idx="1">
+        <a:scrgbClr r="0" g="0" b="0"/>
+      </a:fillRef>
+      <a:effectRef idx="0">
+        <a:scrgbClr r="0" g="0" b="0"/>
+      </a:effectRef>
+      <a:fontRef idx="minor"/>
+    </dgm:style>
+  </dgm:styleLbl>
+  <dgm:styleLbl name="alignAccFollowNode1">
+    <dgm:scene3d>
+      <a:camera prst="orthographicFront"/>
+      <a:lightRig rig="threePt" dir="t"/>
+    </dgm:scene3d>
+    <dgm:sp3d/>
+    <dgm:txPr/>
+    <dgm:style>
+      <a:lnRef idx="2">
+        <a:scrgbClr r="0" g="0" b="0"/>
+      </a:lnRef>
+      <a:fillRef idx="1">
+        <a:scrgbClr r="0" g="0" b="0"/>
+      </a:fillRef>
+      <a:effectRef idx="0">
+        <a:scrgbClr r="0" g="0" b="0"/>
+      </a:effectRef>
+      <a:fontRef idx="minor"/>
+    </dgm:style>
+  </dgm:styleLbl>
+  <dgm:styleLbl name="bgAccFollowNode1">
+    <dgm:scene3d>
+      <a:camera prst="orthographicFront"/>
+      <a:lightRig rig="threePt" dir="t"/>
+    </dgm:scene3d>
+    <dgm:sp3d/>
+    <dgm:txPr/>
+    <dgm:style>
+      <a:lnRef idx="2">
+        <a:scrgbClr r="0" g="0" b="0"/>
+      </a:lnRef>
+      <a:fillRef idx="1">
+        <a:scrgbClr r="0" g="0" b="0"/>
+      </a:fillRef>
+      <a:effectRef idx="0">
+        <a:scrgbClr r="0" g="0" b="0"/>
+      </a:effectRef>
+      <a:fontRef idx="minor"/>
+    </dgm:style>
+  </dgm:styleLbl>
+  <dgm:styleLbl name="fgAcc0">
+    <dgm:scene3d>
+      <a:camera prst="orthographicFront"/>
+      <a:lightRig rig="threePt" dir="t"/>
+    </dgm:scene3d>
+    <dgm:sp3d/>
+    <dgm:txPr/>
+    <dgm:style>
+      <a:lnRef idx="2">
+        <a:scrgbClr r="0" g="0" b="0"/>
+      </a:lnRef>
+      <a:fillRef idx="1">
+        <a:scrgbClr r="0" g="0" b="0"/>
+      </a:fillRef>
+      <a:effectRef idx="0">
+        <a:scrgbClr r="0" g="0" b="0"/>
+      </a:effectRef>
+      <a:fontRef idx="minor"/>
+    </dgm:style>
+  </dgm:styleLbl>
+  <dgm:styleLbl name="fgAcc2">
+    <dgm:scene3d>
+      <a:camera prst="orthographicFront"/>
+      <a:lightRig rig="threePt" dir="t"/>
+    </dgm:scene3d>
+    <dgm:sp3d/>
+    <dgm:txPr/>
+    <dgm:style>
+      <a:lnRef idx="2">
+        <a:scrgbClr r="0" g="0" b="0"/>
+      </a:lnRef>
+      <a:fillRef idx="1">
+        <a:scrgbClr r="0" g="0" b="0"/>
+      </a:fillRef>
+      <a:effectRef idx="0">
+        <a:scrgbClr r="0" g="0" b="0"/>
+      </a:effectRef>
+      <a:fontRef idx="minor"/>
+    </dgm:style>
+  </dgm:styleLbl>
+  <dgm:styleLbl name="fgAcc3">
+    <dgm:scene3d>
+      <a:camera prst="orthographicFront"/>
+      <a:lightRig rig="threePt" dir="t"/>
+    </dgm:scene3d>
+    <dgm:sp3d/>
+    <dgm:txPr/>
+    <dgm:style>
+      <a:lnRef idx="2">
+        <a:scrgbClr r="0" g="0" b="0"/>
+      </a:lnRef>
+      <a:fillRef idx="1">
+        <a:scrgbClr r="0" g="0" b="0"/>
+      </a:fillRef>
+      <a:effectRef idx="0">
+        <a:scrgbClr r="0" g="0" b="0"/>
+      </a:effectRef>
+      <a:fontRef idx="minor"/>
+    </dgm:style>
+  </dgm:styleLbl>
+  <dgm:styleLbl name="fgAcc4">
+    <dgm:scene3d>
+      <a:camera prst="orthographicFront"/>
+      <a:lightRig rig="threePt" dir="t"/>
+    </dgm:scene3d>
+    <dgm:sp3d/>
+    <dgm:txPr/>
+    <dgm:style>
+      <a:lnRef idx="2">
+        <a:scrgbClr r="0" g="0" b="0"/>
+      </a:lnRef>
+      <a:fillRef idx="1">
+        <a:scrgbClr r="0" g="0" b="0"/>
+      </a:fillRef>
+      <a:effectRef idx="0">
+        <a:scrgbClr r="0" g="0" b="0"/>
+      </a:effectRef>
+      <a:fontRef idx="minor"/>
+    </dgm:style>
+  </dgm:styleLbl>
+  <dgm:styleLbl name="bgShp">
+    <dgm:scene3d>
+      <a:camera prst="orthographicFront"/>
+      <a:lightRig rig="threePt" dir="t"/>
+    </dgm:scene3d>
+    <dgm:sp3d/>
+    <dgm:txPr/>
+    <dgm:style>
+      <a:lnRef idx="0">
+        <a:scrgbClr r="0" g="0" b="0"/>
+      </a:lnRef>
+      <a:fillRef idx="1">
+        <a:scrgbClr r="0" g="0" b="0"/>
+      </a:fillRef>
+      <a:effectRef idx="0">
+        <a:scrgbClr r="0" g="0" b="0"/>
+      </a:effectRef>
+      <a:fontRef idx="minor"/>
+    </dgm:style>
+  </dgm:styleLbl>
+  <dgm:styleLbl name="dkBgShp">
+    <dgm:scene3d>
+      <a:camera prst="orthographicFront"/>
+      <a:lightRig rig="threePt" dir="t"/>
+    </dgm:scene3d>
+    <dgm:sp3d/>
+    <dgm:txPr/>
+    <dgm:style>
+      <a:lnRef idx="0">
+        <a:scrgbClr r="0" g="0" b="0"/>
+      </a:lnRef>
+      <a:fillRef idx="1">
+        <a:scrgbClr r="0" g="0" b="0"/>
+      </a:fillRef>
+      <a:effectRef idx="0">
+        <a:scrgbClr r="0" g="0" b="0"/>
+      </a:effectRef>
+      <a:fontRef idx="minor"/>
+    </dgm:style>
+  </dgm:styleLbl>
+  <dgm:styleLbl name="trBgShp">
+    <dgm:scene3d>
+      <a:camera prst="orthographicFront"/>
+      <a:lightRig rig="threePt" dir="t"/>
+    </dgm:scene3d>
+    <dgm:sp3d/>
+    <dgm:txPr/>
+    <dgm:style>
+      <a:lnRef idx="0">
+        <a:scrgbClr r="0" g="0" b="0"/>
+      </a:lnRef>
+      <a:fillRef idx="1">
+        <a:scrgbClr r="0" g="0" b="0"/>
+      </a:fillRef>
+      <a:effectRef idx="0">
+        <a:scrgbClr r="0" g="0" b="0"/>
+      </a:effectRef>
+      <a:fontRef idx="minor"/>
+    </dgm:style>
+  </dgm:styleLbl>
+  <dgm:styleLbl name="fgShp">
+    <dgm:scene3d>
+      <a:camera prst="orthographicFront"/>
+      <a:lightRig rig="threePt" dir="t"/>
+    </dgm:scene3d>
+    <dgm:sp3d/>
+    <dgm:txPr/>
+    <dgm:style>
+      <a:lnRef idx="2">
+        <a:scrgbClr r="0" g="0" b="0"/>
+      </a:lnRef>
+      <a:fillRef idx="1">
+        <a:scrgbClr r="0" g="0" b="0"/>
+      </a:fillRef>
+      <a:effectRef idx="0">
+        <a:scrgbClr r="0" g="0" b="0"/>
+      </a:effectRef>
+      <a:fontRef idx="minor"/>
+    </dgm:style>
+  </dgm:styleLbl>
+  <dgm:styleLbl name="revTx">
+    <dgm:scene3d>
+      <a:camera prst="orthographicFront"/>
+      <a:lightRig rig="threePt" dir="t"/>
+    </dgm:scene3d>
+    <dgm:sp3d/>
+    <dgm:txPr/>
+    <dgm:style>
+      <a:lnRef idx="0">
+        <a:scrgbClr r="0" g="0" b="0"/>
+      </a:lnRef>
+      <a:fillRef idx="0">
+        <a:scrgbClr r="0" g="0" b="0"/>
+      </a:fillRef>
+      <a:effectRef idx="0">
+        <a:scrgbClr r="0" g="0" b="0"/>
+      </a:effectRef>
+      <a:fontRef idx="minor"/>
+    </dgm:style>
+  </dgm:styleLbl>
+</dgm:styleDef>
+</file>
+
 <file path=ppt/notesMasters/notesMaster1.xml><?xml version="1.0" encoding="utf-8"?>
 <p:notesMaster xmlns:a="http://schemas.openxmlformats.org/drawingml/2006/main" xmlns:r="http://schemas.openxmlformats.org/officeDocument/2006/relationships" xmlns:p="http://schemas.openxmlformats.org/presentationml/2006/main">
   <p:cSld>
@@ -5247,7 +8034,7 @@
           <a:p>
             <a:fld id="{D780B8E3-95FE-514D-AE8B-C502CD38E3C9}" type="slidenum">
               <a:rPr lang="en-DE" smtClean="0"/>
-              <a:t>3</a:t>
+              <a:t>4</a:t>
             </a:fld>
             <a:endParaRPr lang="en-DE"/>
           </a:p>
@@ -8524,7 +11311,14 @@
           <a:p>
             <a:pPr algn="l"/>
             <a:r>
-              <a:rPr lang="en-DE" dirty="0"/>
+              <a:rPr lang="en-DE" b="1" dirty="0">
+                <a:solidFill>
+                  <a:schemeClr val="tx1">
+                    <a:lumMod val="50000"/>
+                    <a:lumOff val="50000"/>
+                  </a:schemeClr>
+                </a:solidFill>
+              </a:rPr>
               <a:t>CASE STUDY</a:t>
             </a:r>
           </a:p>
@@ -8554,7 +11348,7 @@
             <a:pPr algn="l"/>
             <a:r>
               <a:rPr lang="en-DE" dirty="0"/>
-              <a:t>ABDULLAHI ADINOYI IBRAHIM</a:t>
+              <a:t>ABDULLAHI A. IBRAHIM</a:t>
             </a:r>
           </a:p>
         </p:txBody>
@@ -8589,6 +11383,107 @@
           <a:chExt cx="0" cy="0"/>
         </a:xfrm>
       </p:grpSpPr>
+      <p:pic>
+        <p:nvPicPr>
+          <p:cNvPr id="5" name="Content Placeholder 4">
+            <a:extLst>
+              <a:ext uri="{FF2B5EF4-FFF2-40B4-BE49-F238E27FC236}">
+                <a16:creationId xmlns:a16="http://schemas.microsoft.com/office/drawing/2014/main" id="{BCDEE8EF-E60D-0A44-F29F-AE31DC5AFE5B}"/>
+              </a:ext>
+            </a:extLst>
+          </p:cNvPr>
+          <p:cNvPicPr>
+            <a:picLocks noGrp="1" noChangeAspect="1"/>
+          </p:cNvPicPr>
+          <p:nvPr>
+            <p:ph idx="1"/>
+          </p:nvPr>
+        </p:nvPicPr>
+        <p:blipFill>
+          <a:blip r:embed="rId2"/>
+          <a:stretch>
+            <a:fillRect/>
+          </a:stretch>
+        </p:blipFill>
+        <p:spPr>
+          <a:xfrm>
+            <a:off x="1378226" y="1073020"/>
+            <a:ext cx="9342783" cy="5798969"/>
+          </a:xfrm>
+        </p:spPr>
+      </p:pic>
+      <p:sp>
+        <p:nvSpPr>
+          <p:cNvPr id="2" name="Title 1">
+            <a:extLst>
+              <a:ext uri="{FF2B5EF4-FFF2-40B4-BE49-F238E27FC236}">
+                <a16:creationId xmlns:a16="http://schemas.microsoft.com/office/drawing/2014/main" id="{08AA82B3-F56F-08CF-12E3-ABD32E5C4B64}"/>
+              </a:ext>
+            </a:extLst>
+          </p:cNvPr>
+          <p:cNvSpPr>
+            <a:spLocks noGrp="1"/>
+          </p:cNvSpPr>
+          <p:nvPr>
+            <p:ph type="title"/>
+          </p:nvPr>
+        </p:nvSpPr>
+        <p:spPr>
+          <a:xfrm>
+            <a:off x="559904" y="245449"/>
+            <a:ext cx="10515600" cy="827571"/>
+          </a:xfrm>
+        </p:spPr>
+        <p:txBody>
+          <a:bodyPr>
+            <a:normAutofit/>
+          </a:bodyPr>
+          <a:lstStyle/>
+          <a:p>
+            <a:r>
+              <a:rPr lang="en-DE" dirty="0">
+                <a:solidFill>
+                  <a:schemeClr val="tx1">
+                    <a:lumMod val="50000"/>
+                    <a:lumOff val="50000"/>
+                  </a:schemeClr>
+                </a:solidFill>
+              </a:rPr>
+              <a:t>Sensitivity of the models</a:t>
+            </a:r>
+          </a:p>
+        </p:txBody>
+      </p:sp>
+    </p:spTree>
+    <p:extLst>
+      <p:ext uri="{BB962C8B-B14F-4D97-AF65-F5344CB8AC3E}">
+        <p14:creationId xmlns:p14="http://schemas.microsoft.com/office/powerpoint/2010/main" val="1856652171"/>
+      </p:ext>
+    </p:extLst>
+  </p:cSld>
+  <p:clrMapOvr>
+    <a:masterClrMapping/>
+  </p:clrMapOvr>
+</p:sld>
+</file>
+
+<file path=ppt/slides/slide11.xml><?xml version="1.0" encoding="utf-8"?>
+<p:sld xmlns:a="http://schemas.openxmlformats.org/drawingml/2006/main" xmlns:r="http://schemas.openxmlformats.org/officeDocument/2006/relationships" xmlns:p="http://schemas.openxmlformats.org/presentationml/2006/main">
+  <p:cSld>
+    <p:spTree>
+      <p:nvGrpSpPr>
+        <p:cNvPr id="1" name=""/>
+        <p:cNvGrpSpPr/>
+        <p:nvPr/>
+      </p:nvGrpSpPr>
+      <p:grpSpPr>
+        <a:xfrm>
+          <a:off x="0" y="0"/>
+          <a:ext cx="0" cy="0"/>
+          <a:chOff x="0" y="0"/>
+          <a:chExt cx="0" cy="0"/>
+        </a:xfrm>
+      </p:grpSpPr>
       <p:sp>
         <p:nvSpPr>
           <p:cNvPr id="2" name="Title 1">
@@ -8605,13 +11500,25 @@
             <p:ph type="title"/>
           </p:nvPr>
         </p:nvSpPr>
-        <p:spPr/>
+        <p:spPr>
+          <a:xfrm>
+            <a:off x="599661" y="325369"/>
+            <a:ext cx="10515600" cy="1325563"/>
+          </a:xfrm>
+        </p:spPr>
         <p:txBody>
           <a:bodyPr/>
           <a:lstStyle/>
           <a:p>
             <a:r>
-              <a:rPr lang="en-DE" dirty="0"/>
+              <a:rPr lang="en-DE" dirty="0">
+                <a:solidFill>
+                  <a:schemeClr val="tx1">
+                    <a:lumMod val="50000"/>
+                    <a:lumOff val="50000"/>
+                  </a:schemeClr>
+                </a:solidFill>
+              </a:rPr>
               <a:t>Summary</a:t>
             </a:r>
           </a:p>
@@ -8633,12 +11540,119 @@
             <p:ph idx="1"/>
           </p:nvPr>
         </p:nvSpPr>
-        <p:spPr/>
+        <p:spPr>
+          <a:xfrm>
+            <a:off x="599661" y="1997904"/>
+            <a:ext cx="10515600" cy="4351338"/>
+          </a:xfrm>
+        </p:spPr>
         <p:txBody>
-          <a:bodyPr/>
+          <a:bodyPr>
+            <a:normAutofit lnSpcReduction="10000"/>
+          </a:bodyPr>
           <a:lstStyle/>
           <a:p>
-            <a:endParaRPr lang="en-DE"/>
+            <a:r>
+              <a:rPr lang="en-US" dirty="0"/>
+              <a:t>Our goal is to predict income and expenses of a user transaction.</a:t>
+            </a:r>
+          </a:p>
+          <a:p>
+            <a:endParaRPr lang="en-US" dirty="0"/>
+          </a:p>
+          <a:p>
+            <a:r>
+              <a:rPr lang="en-DE" dirty="0"/>
+              <a:t>To do this we compare the performace of different model (</a:t>
+            </a:r>
+            <a:r>
+              <a:rPr lang="en-DE" dirty="0">
+                <a:solidFill>
+                  <a:srgbClr val="00B0F0"/>
+                </a:solidFill>
+              </a:rPr>
+              <a:t>baseline and extended versions</a:t>
+            </a:r>
+            <a:r>
+              <a:rPr lang="en-DE" dirty="0"/>
+              <a:t>)</a:t>
+            </a:r>
+          </a:p>
+          <a:p>
+            <a:pPr marL="0" indent="0">
+              <a:buNone/>
+            </a:pPr>
+            <a:endParaRPr lang="en-DE" dirty="0"/>
+          </a:p>
+          <a:p>
+            <a:r>
+              <a:rPr lang="en-US" dirty="0"/>
+              <a:t>Our result shows that by</a:t>
+            </a:r>
+            <a:r>
+              <a:rPr lang="en-DE" dirty="0"/>
+              <a:t> adding penalities/weight the model </a:t>
+            </a:r>
+            <a:r>
+              <a:rPr lang="en-DE" dirty="0">
+                <a:solidFill>
+                  <a:srgbClr val="00B0F0"/>
+                </a:solidFill>
+              </a:rPr>
+              <a:t>performed better</a:t>
+            </a:r>
+            <a:r>
+              <a:rPr lang="en-DE" dirty="0"/>
+              <a:t> than the baseline model.</a:t>
+            </a:r>
+          </a:p>
+          <a:p>
+            <a:pPr marL="0" indent="0">
+              <a:buNone/>
+            </a:pPr>
+            <a:endParaRPr lang="en-DE" dirty="0"/>
+          </a:p>
+          <a:p>
+            <a:r>
+              <a:rPr lang="en-DE" dirty="0"/>
+              <a:t>The best performing model(s) achieved upto 87% </a:t>
+            </a:r>
+            <a:r>
+              <a:rPr lang="en-DE" dirty="0">
+                <a:solidFill>
+                  <a:srgbClr val="00B0F0"/>
+                </a:solidFill>
+              </a:rPr>
+              <a:t>accuracy</a:t>
+            </a:r>
+            <a:r>
+              <a:rPr lang="en-DE" dirty="0"/>
+              <a:t>, 93% </a:t>
+            </a:r>
+            <a:r>
+              <a:rPr lang="en-DE" dirty="0">
+                <a:solidFill>
+                  <a:srgbClr val="00B0F0"/>
+                </a:solidFill>
+              </a:rPr>
+              <a:t>AUC</a:t>
+            </a:r>
+            <a:r>
+              <a:rPr lang="en-DE" dirty="0"/>
+              <a:t> and 92% </a:t>
+            </a:r>
+            <a:r>
+              <a:rPr lang="en-DE" dirty="0">
+                <a:solidFill>
+                  <a:srgbClr val="00B0F0"/>
+                </a:solidFill>
+              </a:rPr>
+              <a:t>f1</a:t>
+            </a:r>
+            <a:r>
+              <a:rPr lang="en-DE" dirty="0"/>
+              <a:t> score with no overfitting.</a:t>
+            </a:r>
           </a:p>
         </p:txBody>
       </p:sp>
@@ -8690,8 +11704,8 @@
         </p:nvSpPr>
         <p:spPr>
           <a:xfrm>
-            <a:off x="614680" y="100965"/>
-            <a:ext cx="10515600" cy="1325563"/>
+            <a:off x="601428" y="750322"/>
+            <a:ext cx="10515600" cy="698584"/>
           </a:xfrm>
         </p:spPr>
         <p:txBody>
@@ -8699,8 +11713,15 @@
           <a:lstStyle/>
           <a:p>
             <a:r>
-              <a:rPr lang="en-DE" dirty="0"/>
-              <a:t>TASK</a:t>
+              <a:rPr lang="en-DE" dirty="0">
+                <a:solidFill>
+                  <a:schemeClr val="tx1">
+                    <a:lumMod val="50000"/>
+                    <a:lumOff val="50000"/>
+                  </a:schemeClr>
+                </a:solidFill>
+              </a:rPr>
+              <a:t>Task</a:t>
             </a:r>
           </a:p>
         </p:txBody>
@@ -8723,14 +11744,21 @@
         </p:nvSpPr>
         <p:spPr>
           <a:xfrm>
-            <a:off x="726440" y="1253331"/>
+            <a:off x="355379" y="1942445"/>
             <a:ext cx="10515600" cy="4351338"/>
           </a:xfrm>
         </p:spPr>
         <p:txBody>
-          <a:bodyPr/>
+          <a:bodyPr>
+            <a:normAutofit/>
+          </a:bodyPr>
           <a:lstStyle/>
           <a:p>
+            <a:pPr>
+              <a:lnSpc>
+                <a:spcPct val="150000"/>
+              </a:lnSpc>
+            </a:pPr>
             <a:r>
               <a:rPr lang="en-US" dirty="0"/>
               <a:t>P</a:t>
@@ -8741,95 +11769,14 @@
             </a:r>
           </a:p>
           <a:p>
-            <a:endParaRPr lang="en-DE" dirty="0"/>
-          </a:p>
-        </p:txBody>
-      </p:sp>
-      <p:pic>
-        <p:nvPicPr>
-          <p:cNvPr id="5" name="Picture 4">
-            <a:extLst>
-              <a:ext uri="{FF2B5EF4-FFF2-40B4-BE49-F238E27FC236}">
-                <a16:creationId xmlns:a16="http://schemas.microsoft.com/office/drawing/2014/main" id="{D147B1B2-ED46-969C-B7CA-D221FE95E893}"/>
-              </a:ext>
-            </a:extLst>
-          </p:cNvPr>
-          <p:cNvPicPr>
-            <a:picLocks noChangeAspect="1"/>
-          </p:cNvPicPr>
-          <p:nvPr/>
-        </p:nvPicPr>
-        <p:blipFill>
-          <a:blip r:embed="rId2"/>
-          <a:stretch>
-            <a:fillRect/>
-          </a:stretch>
-        </p:blipFill>
-        <p:spPr>
-          <a:xfrm>
-            <a:off x="2792894" y="2911319"/>
-            <a:ext cx="9157253" cy="3540916"/>
-          </a:xfrm>
-          <a:prstGeom prst="rect">
-            <a:avLst/>
-          </a:prstGeom>
-        </p:spPr>
-      </p:pic>
-      <p:sp>
-        <p:nvSpPr>
-          <p:cNvPr id="7" name="TextBox 6">
-            <a:extLst>
-              <a:ext uri="{FF2B5EF4-FFF2-40B4-BE49-F238E27FC236}">
-                <a16:creationId xmlns:a16="http://schemas.microsoft.com/office/drawing/2014/main" id="{2C65A767-F14B-E925-CCFB-3FB1B8A95E5F}"/>
-              </a:ext>
-            </a:extLst>
-          </p:cNvPr>
-          <p:cNvSpPr txBox="1"/>
-          <p:nvPr/>
-        </p:nvSpPr>
-        <p:spPr>
-          <a:xfrm>
-            <a:off x="614680" y="3827448"/>
-            <a:ext cx="2302565" cy="1323439"/>
-          </a:xfrm>
-          <a:prstGeom prst="rect">
-            <a:avLst/>
-          </a:prstGeom>
-          <a:noFill/>
-        </p:spPr>
-        <p:txBody>
-          <a:bodyPr wrap="square">
-            <a:spAutoFit/>
-          </a:bodyPr>
-          <a:lstStyle/>
-          <a:p>
+            <a:pPr>
+              <a:lnSpc>
+                <a:spcPct val="150000"/>
+              </a:lnSpc>
+            </a:pPr>
             <a:r>
-              <a:rPr lang="en-DE" sz="2000" dirty="0">
-                <a:solidFill>
-                  <a:srgbClr val="00B0F0"/>
-                </a:solidFill>
-              </a:rPr>
-              <a:t>Aggregate data into </a:t>
-            </a:r>
-          </a:p>
-          <a:p>
-            <a:r>
-              <a:rPr lang="en-DE" sz="2000" dirty="0">
-                <a:solidFill>
-                  <a:srgbClr val="00B0F0"/>
-                </a:solidFill>
-              </a:rPr>
-              <a:t>In (incoming) and </a:t>
-            </a:r>
-          </a:p>
-          <a:p>
-            <a:r>
-              <a:rPr lang="en-DE" sz="2000" dirty="0">
-                <a:solidFill>
-                  <a:srgbClr val="00B0F0"/>
-                </a:solidFill>
-              </a:rPr>
-              <a:t>Out (outgoing) flows.</a:t>
+              <a:rPr lang="en-DE" dirty="0"/>
+              <a:t>Based on your judgement of the usefulness of the results, either aggregate the data into incoming &amp; outgoing flows, or predict base on the transaction type/category level</a:t>
             </a:r>
           </a:p>
         </p:txBody>
@@ -8869,6 +11816,149 @@
           <p:cNvPr id="2" name="Title 1">
             <a:extLst>
               <a:ext uri="{FF2B5EF4-FFF2-40B4-BE49-F238E27FC236}">
+                <a16:creationId xmlns:a16="http://schemas.microsoft.com/office/drawing/2014/main" id="{3AF44C4C-952A-6148-6317-3E35EBAED225}"/>
+              </a:ext>
+            </a:extLst>
+          </p:cNvPr>
+          <p:cNvSpPr>
+            <a:spLocks noGrp="1"/>
+          </p:cNvSpPr>
+          <p:nvPr>
+            <p:ph type="title"/>
+          </p:nvPr>
+        </p:nvSpPr>
+        <p:spPr>
+          <a:xfrm>
+            <a:off x="256871" y="299748"/>
+            <a:ext cx="10515600" cy="698584"/>
+          </a:xfrm>
+        </p:spPr>
+        <p:txBody>
+          <a:bodyPr/>
+          <a:lstStyle/>
+          <a:p>
+            <a:r>
+              <a:rPr lang="en-DE" dirty="0">
+                <a:solidFill>
+                  <a:schemeClr val="tx1">
+                    <a:lumMod val="50000"/>
+                    <a:lumOff val="50000"/>
+                  </a:schemeClr>
+                </a:solidFill>
+              </a:rPr>
+              <a:t>Assumptions</a:t>
+            </a:r>
+          </a:p>
+        </p:txBody>
+      </p:sp>
+      <p:pic>
+        <p:nvPicPr>
+          <p:cNvPr id="5" name="Picture 4">
+            <a:extLst>
+              <a:ext uri="{FF2B5EF4-FFF2-40B4-BE49-F238E27FC236}">
+                <a16:creationId xmlns:a16="http://schemas.microsoft.com/office/drawing/2014/main" id="{D147B1B2-ED46-969C-B7CA-D221FE95E893}"/>
+              </a:ext>
+            </a:extLst>
+          </p:cNvPr>
+          <p:cNvPicPr>
+            <a:picLocks noChangeAspect="1"/>
+          </p:cNvPicPr>
+          <p:nvPr/>
+        </p:nvPicPr>
+        <p:blipFill>
+          <a:blip r:embed="rId2"/>
+          <a:stretch>
+            <a:fillRect/>
+          </a:stretch>
+        </p:blipFill>
+        <p:spPr>
+          <a:xfrm>
+            <a:off x="871588" y="2646275"/>
+            <a:ext cx="10448824" cy="4040339"/>
+          </a:xfrm>
+          <a:prstGeom prst="rect">
+            <a:avLst/>
+          </a:prstGeom>
+        </p:spPr>
+      </p:pic>
+      <p:sp>
+        <p:nvSpPr>
+          <p:cNvPr id="7" name="TextBox 6">
+            <a:extLst>
+              <a:ext uri="{FF2B5EF4-FFF2-40B4-BE49-F238E27FC236}">
+                <a16:creationId xmlns:a16="http://schemas.microsoft.com/office/drawing/2014/main" id="{2C65A767-F14B-E925-CCFB-3FB1B8A95E5F}"/>
+              </a:ext>
+            </a:extLst>
+          </p:cNvPr>
+          <p:cNvSpPr txBox="1"/>
+          <p:nvPr/>
+        </p:nvSpPr>
+        <p:spPr>
+          <a:xfrm>
+            <a:off x="450574" y="1524000"/>
+            <a:ext cx="10681252" cy="584775"/>
+          </a:xfrm>
+          <a:prstGeom prst="rect">
+            <a:avLst/>
+          </a:prstGeom>
+          <a:noFill/>
+        </p:spPr>
+        <p:txBody>
+          <a:bodyPr wrap="square">
+            <a:spAutoFit/>
+          </a:bodyPr>
+          <a:lstStyle/>
+          <a:p>
+            <a:r>
+              <a:rPr lang="en-DE" sz="3200" dirty="0"/>
+              <a:t>1. Aggregate data into  In (incoming) and  Out (outgoing) flows</a:t>
+            </a:r>
+            <a:r>
+              <a:rPr lang="en-DE" sz="2000" dirty="0">
+                <a:solidFill>
+                  <a:srgbClr val="00B0F0"/>
+                </a:solidFill>
+              </a:rPr>
+              <a:t>.</a:t>
+            </a:r>
+          </a:p>
+        </p:txBody>
+      </p:sp>
+    </p:spTree>
+    <p:extLst>
+      <p:ext uri="{BB962C8B-B14F-4D97-AF65-F5344CB8AC3E}">
+        <p14:creationId xmlns:p14="http://schemas.microsoft.com/office/powerpoint/2010/main" val="3975079494"/>
+      </p:ext>
+    </p:extLst>
+  </p:cSld>
+  <p:clrMapOvr>
+    <a:masterClrMapping/>
+  </p:clrMapOvr>
+</p:sld>
+</file>
+
+<file path=ppt/slides/slide4.xml><?xml version="1.0" encoding="utf-8"?>
+<p:sld xmlns:a="http://schemas.openxmlformats.org/drawingml/2006/main" xmlns:r="http://schemas.openxmlformats.org/officeDocument/2006/relationships" xmlns:p="http://schemas.openxmlformats.org/presentationml/2006/main">
+  <p:cSld>
+    <p:spTree>
+      <p:nvGrpSpPr>
+        <p:cNvPr id="1" name=""/>
+        <p:cNvGrpSpPr/>
+        <p:nvPr/>
+      </p:nvGrpSpPr>
+      <p:grpSpPr>
+        <a:xfrm>
+          <a:off x="0" y="0"/>
+          <a:ext cx="0" cy="0"/>
+          <a:chOff x="0" y="0"/>
+          <a:chExt cx="0" cy="0"/>
+        </a:xfrm>
+      </p:grpSpPr>
+      <p:sp>
+        <p:nvSpPr>
+          <p:cNvPr id="2" name="Title 1">
+            <a:extLst>
+              <a:ext uri="{FF2B5EF4-FFF2-40B4-BE49-F238E27FC236}">
                 <a16:creationId xmlns:a16="http://schemas.microsoft.com/office/drawing/2014/main" id="{CD1AA5F6-3195-E41A-ACB9-8D3C9A300B32}"/>
               </a:ext>
             </a:extLst>
@@ -8880,15 +11970,39 @@
             <p:ph type="title"/>
           </p:nvPr>
         </p:nvSpPr>
-        <p:spPr/>
+        <p:spPr>
+          <a:xfrm>
+            <a:off x="282588" y="737869"/>
+            <a:ext cx="10515600" cy="617676"/>
+          </a:xfrm>
+        </p:spPr>
         <p:txBody>
-          <a:bodyPr/>
+          <a:bodyPr>
+            <a:noAutofit/>
+          </a:bodyPr>
           <a:lstStyle/>
           <a:p>
             <a:r>
-              <a:rPr lang="en-DE" dirty="0"/>
-              <a:t>Mcc_group</a:t>
+              <a:rPr lang="en-US" sz="3200" dirty="0">
+                <a:solidFill>
+                  <a:schemeClr val="tx1">
+                    <a:lumMod val="50000"/>
+                    <a:lumOff val="50000"/>
+                  </a:schemeClr>
+                </a:solidFill>
+                <a:latin typeface="+mn-lt"/>
+              </a:rPr>
+              <a:t>Fill missing values in mcc_group</a:t>
             </a:r>
+            <a:endParaRPr lang="en-DE" sz="3200" dirty="0">
+              <a:solidFill>
+                <a:schemeClr val="tx1">
+                  <a:lumMod val="50000"/>
+                  <a:lumOff val="50000"/>
+                </a:schemeClr>
+              </a:solidFill>
+              <a:latin typeface="+mn-lt"/>
+            </a:endParaRPr>
           </a:p>
         </p:txBody>
       </p:sp>
@@ -8935,8 +12049,8 @@
         </p:nvSpPr>
         <p:spPr>
           <a:xfrm>
-            <a:off x="838200" y="4693048"/>
-            <a:ext cx="2302565" cy="1323439"/>
+            <a:off x="135348" y="4741549"/>
+            <a:ext cx="3171219" cy="707886"/>
           </a:xfrm>
           <a:prstGeom prst="rect">
             <a:avLst/>
@@ -8955,27 +12069,7 @@
                   <a:srgbClr val="00B0F0"/>
                 </a:solidFill>
               </a:rPr>
-              <a:t>Aggregate data into </a:t>
-            </a:r>
-          </a:p>
-          <a:p>
-            <a:r>
-              <a:rPr lang="en-DE" sz="2000" dirty="0">
-                <a:solidFill>
-                  <a:srgbClr val="00B0F0"/>
-                </a:solidFill>
-              </a:rPr>
-              <a:t>In (incoming) and </a:t>
-            </a:r>
-          </a:p>
-          <a:p>
-            <a:r>
-              <a:rPr lang="en-DE" sz="2000" dirty="0">
-                <a:solidFill>
-                  <a:srgbClr val="00B0F0"/>
-                </a:solidFill>
-              </a:rPr>
-              <a:t>Out (outgoing) flows.</a:t>
+              <a:t>Currently 37% is missing and we fill it as shown here </a:t>
             </a:r>
           </a:p>
         </p:txBody>
@@ -9057,6 +12151,140 @@
           </a:p>
         </p:txBody>
       </p:sp>
+      <p:sp>
+        <p:nvSpPr>
+          <p:cNvPr id="10" name="TextBox 9">
+            <a:extLst>
+              <a:ext uri="{FF2B5EF4-FFF2-40B4-BE49-F238E27FC236}">
+                <a16:creationId xmlns:a16="http://schemas.microsoft.com/office/drawing/2014/main" id="{191B4F02-4ACB-40FF-5DC1-BE4CE6D22DF0}"/>
+              </a:ext>
+            </a:extLst>
+          </p:cNvPr>
+          <p:cNvSpPr txBox="1"/>
+          <p:nvPr/>
+        </p:nvSpPr>
+        <p:spPr>
+          <a:xfrm>
+            <a:off x="7097326" y="5013843"/>
+            <a:ext cx="740908" cy="369332"/>
+          </a:xfrm>
+          <a:prstGeom prst="rect">
+            <a:avLst/>
+          </a:prstGeom>
+          <a:noFill/>
+          <a:ln>
+            <a:noFill/>
+          </a:ln>
+        </p:spPr>
+        <p:txBody>
+          <a:bodyPr wrap="none" rtlCol="0">
+            <a:spAutoFit/>
+          </a:bodyPr>
+          <a:lstStyle/>
+          <a:p>
+            <a:r>
+              <a:rPr lang="en-DE" dirty="0">
+                <a:solidFill>
+                  <a:schemeClr val="accent3"/>
+                </a:solidFill>
+              </a:rPr>
+              <a:t>Mode</a:t>
+            </a:r>
+          </a:p>
+        </p:txBody>
+      </p:sp>
+      <p:sp>
+        <p:nvSpPr>
+          <p:cNvPr id="11" name="TextBox 10">
+            <a:extLst>
+              <a:ext uri="{FF2B5EF4-FFF2-40B4-BE49-F238E27FC236}">
+                <a16:creationId xmlns:a16="http://schemas.microsoft.com/office/drawing/2014/main" id="{855B57C1-BE4A-6E09-B9F1-9F29F9393326}"/>
+              </a:ext>
+            </a:extLst>
+          </p:cNvPr>
+          <p:cNvSpPr txBox="1"/>
+          <p:nvPr/>
+        </p:nvSpPr>
+        <p:spPr>
+          <a:xfrm>
+            <a:off x="8315741" y="3619835"/>
+            <a:ext cx="679994" cy="369332"/>
+          </a:xfrm>
+          <a:prstGeom prst="rect">
+            <a:avLst/>
+          </a:prstGeom>
+          <a:noFill/>
+        </p:spPr>
+        <p:txBody>
+          <a:bodyPr wrap="none" rtlCol="0">
+            <a:spAutoFit/>
+          </a:bodyPr>
+          <a:lstStyle/>
+          <a:p>
+            <a:r>
+              <a:rPr lang="en-DE" dirty="0">
+                <a:solidFill>
+                  <a:schemeClr val="accent3"/>
+                </a:solidFill>
+              </a:rPr>
+              <a:t>Misc</a:t>
+            </a:r>
+            <a:r>
+              <a:rPr lang="en-DE" dirty="0"/>
+              <a:t>.</a:t>
+            </a:r>
+          </a:p>
+        </p:txBody>
+      </p:sp>
+      <p:sp>
+        <p:nvSpPr>
+          <p:cNvPr id="17" name="Right Arrow 16">
+            <a:extLst>
+              <a:ext uri="{FF2B5EF4-FFF2-40B4-BE49-F238E27FC236}">
+                <a16:creationId xmlns:a16="http://schemas.microsoft.com/office/drawing/2014/main" id="{4BB28DE7-78B0-5B7E-C2CC-AABB9EB20C0A}"/>
+              </a:ext>
+            </a:extLst>
+          </p:cNvPr>
+          <p:cNvSpPr/>
+          <p:nvPr/>
+        </p:nvSpPr>
+        <p:spPr>
+          <a:xfrm>
+            <a:off x="3104546" y="5255991"/>
+            <a:ext cx="404042" cy="254367"/>
+          </a:xfrm>
+          <a:prstGeom prst="rightArrow">
+            <a:avLst/>
+          </a:prstGeom>
+          <a:solidFill>
+            <a:schemeClr val="accent2"/>
+          </a:solidFill>
+        </p:spPr>
+        <p:style>
+          <a:lnRef idx="2">
+            <a:schemeClr val="accent1">
+              <a:shade val="15000"/>
+            </a:schemeClr>
+          </a:lnRef>
+          <a:fillRef idx="1">
+            <a:schemeClr val="accent1"/>
+          </a:fillRef>
+          <a:effectRef idx="0">
+            <a:schemeClr val="accent1"/>
+          </a:effectRef>
+          <a:fontRef idx="minor">
+            <a:schemeClr val="lt1"/>
+          </a:fontRef>
+        </p:style>
+        <p:txBody>
+          <a:bodyPr rtlCol="0" anchor="ctr"/>
+          <a:lstStyle/>
+          <a:p>
+            <a:pPr algn="ctr"/>
+            <a:endParaRPr lang="en-DE"/>
+          </a:p>
+        </p:txBody>
+      </p:sp>
     </p:spTree>
     <p:extLst>
       <p:ext uri="{BB962C8B-B14F-4D97-AF65-F5344CB8AC3E}">
@@ -9070,7 +12298,7 @@
 </p:sld>
 </file>
 
-<file path=ppt/slides/slide4.xml><?xml version="1.0" encoding="utf-8"?>
+<file path=ppt/slides/slide5.xml><?xml version="1.0" encoding="utf-8"?>
 <p:sld xmlns:a="http://schemas.openxmlformats.org/drawingml/2006/main" xmlns:r="http://schemas.openxmlformats.org/officeDocument/2006/relationships" xmlns:p="http://schemas.openxmlformats.org/presentationml/2006/main">
   <p:cSld>
     <p:spTree>
@@ -9135,8 +12363,8 @@
         </p:nvSpPr>
         <p:spPr>
           <a:xfrm>
-            <a:off x="204913" y="122628"/>
-            <a:ext cx="10515600" cy="1325563"/>
+            <a:off x="204913" y="58881"/>
+            <a:ext cx="10515600" cy="1405287"/>
           </a:xfrm>
         </p:spPr>
         <p:txBody>
@@ -9144,15 +12372,36 @@
           <a:lstStyle/>
           <a:p>
             <a:r>
-              <a:rPr lang="en-DE" dirty="0"/>
-              <a:t>Handling missing </a:t>
+              <a:rPr lang="en-DE" dirty="0">
+                <a:solidFill>
+                  <a:schemeClr val="tx1">
+                    <a:lumMod val="50000"/>
+                    <a:lumOff val="50000"/>
+                  </a:schemeClr>
+                </a:solidFill>
+              </a:rPr>
+              <a:t>Impact of </a:t>
             </a:r>
             <a:br>
-              <a:rPr lang="en-DE" dirty="0"/>
+              <a:rPr lang="en-DE" dirty="0">
+                <a:solidFill>
+                  <a:schemeClr val="tx1">
+                    <a:lumMod val="50000"/>
+                    <a:lumOff val="50000"/>
+                  </a:schemeClr>
+                </a:solidFill>
+              </a:rPr>
             </a:br>
             <a:r>
-              <a:rPr lang="en-DE" dirty="0"/>
-              <a:t>values</a:t>
+              <a:rPr lang="en-DE" dirty="0">
+                <a:solidFill>
+                  <a:schemeClr val="tx1">
+                    <a:lumMod val="50000"/>
+                    <a:lumOff val="50000"/>
+                  </a:schemeClr>
+                </a:solidFill>
+              </a:rPr>
+              <a:t>filling NAs</a:t>
             </a:r>
           </a:p>
         </p:txBody>
@@ -9426,7 +12675,7 @@
         </p:nvSpPr>
         <p:spPr>
           <a:xfrm>
-            <a:off x="518805" y="1849077"/>
+            <a:off x="449994" y="2246615"/>
             <a:ext cx="2302565" cy="1631216"/>
           </a:xfrm>
           <a:prstGeom prst="rect">
@@ -9498,7 +12747,108 @@
 </p:sld>
 </file>
 
-<file path=ppt/slides/slide5.xml><?xml version="1.0" encoding="utf-8"?>
+<file path=ppt/slides/slide6.xml><?xml version="1.0" encoding="utf-8"?>
+<p:sld xmlns:a="http://schemas.openxmlformats.org/drawingml/2006/main" xmlns:r="http://schemas.openxmlformats.org/officeDocument/2006/relationships" xmlns:p="http://schemas.openxmlformats.org/presentationml/2006/main">
+  <p:cSld>
+    <p:spTree>
+      <p:nvGrpSpPr>
+        <p:cNvPr id="1" name=""/>
+        <p:cNvGrpSpPr/>
+        <p:nvPr/>
+      </p:nvGrpSpPr>
+      <p:grpSpPr>
+        <a:xfrm>
+          <a:off x="0" y="0"/>
+          <a:ext cx="0" cy="0"/>
+          <a:chOff x="0" y="0"/>
+          <a:chExt cx="0" cy="0"/>
+        </a:xfrm>
+      </p:grpSpPr>
+      <p:sp>
+        <p:nvSpPr>
+          <p:cNvPr id="2" name="Title 1">
+            <a:extLst>
+              <a:ext uri="{FF2B5EF4-FFF2-40B4-BE49-F238E27FC236}">
+                <a16:creationId xmlns:a16="http://schemas.microsoft.com/office/drawing/2014/main" id="{E2B652D4-D69E-C30B-51C5-DECA16CCF011}"/>
+              </a:ext>
+            </a:extLst>
+          </p:cNvPr>
+          <p:cNvSpPr>
+            <a:spLocks noGrp="1"/>
+          </p:cNvSpPr>
+          <p:nvPr>
+            <p:ph type="title"/>
+          </p:nvPr>
+        </p:nvSpPr>
+        <p:spPr>
+          <a:xfrm>
+            <a:off x="718929" y="444638"/>
+            <a:ext cx="10515600" cy="1026354"/>
+          </a:xfrm>
+        </p:spPr>
+        <p:txBody>
+          <a:bodyPr/>
+          <a:lstStyle/>
+          <a:p>
+            <a:r>
+              <a:rPr lang="en-DE" dirty="0">
+                <a:solidFill>
+                  <a:schemeClr val="tx1">
+                    <a:lumMod val="50000"/>
+                    <a:lumOff val="50000"/>
+                  </a:schemeClr>
+                </a:solidFill>
+              </a:rPr>
+              <a:t>Feature engineering</a:t>
+            </a:r>
+          </a:p>
+        </p:txBody>
+      </p:sp>
+      <p:graphicFrame>
+        <p:nvGraphicFramePr>
+          <p:cNvPr id="7" name="Content Placeholder 6">
+            <a:extLst>
+              <a:ext uri="{FF2B5EF4-FFF2-40B4-BE49-F238E27FC236}">
+                <a16:creationId xmlns:a16="http://schemas.microsoft.com/office/drawing/2014/main" id="{EF40459D-2D1B-99EA-7805-A0C990FBBDBA}"/>
+              </a:ext>
+            </a:extLst>
+          </p:cNvPr>
+          <p:cNvGraphicFramePr>
+            <a:graphicFrameLocks noGrp="1"/>
+          </p:cNvGraphicFramePr>
+          <p:nvPr>
+            <p:ph idx="1"/>
+            <p:extLst>
+              <p:ext uri="{D42A27DB-BD31-4B8C-83A1-F6EECF244321}">
+                <p14:modId xmlns:p14="http://schemas.microsoft.com/office/powerpoint/2010/main" val="3835106359"/>
+              </p:ext>
+            </p:extLst>
+          </p:nvPr>
+        </p:nvGraphicFramePr>
+        <p:xfrm>
+          <a:off x="718929" y="1878634"/>
+          <a:ext cx="10515600" cy="4351338"/>
+        </p:xfrm>
+        <a:graphic>
+          <a:graphicData uri="http://schemas.openxmlformats.org/drawingml/2006/diagram">
+            <dgm:relIds xmlns:dgm="http://schemas.openxmlformats.org/drawingml/2006/diagram" xmlns:r="http://schemas.openxmlformats.org/officeDocument/2006/relationships" r:dm="rId2" r:lo="rId3" r:qs="rId4" r:cs="rId5"/>
+          </a:graphicData>
+        </a:graphic>
+      </p:graphicFrame>
+    </p:spTree>
+    <p:extLst>
+      <p:ext uri="{BB962C8B-B14F-4D97-AF65-F5344CB8AC3E}">
+        <p14:creationId xmlns:p14="http://schemas.microsoft.com/office/powerpoint/2010/main" val="46013667"/>
+      </p:ext>
+    </p:extLst>
+  </p:cSld>
+  <p:clrMapOvr>
+    <a:masterClrMapping/>
+  </p:clrMapOvr>
+</p:sld>
+</file>
+
+<file path=ppt/slides/slide7.xml><?xml version="1.0" encoding="utf-8"?>
 <p:sld xmlns:a="http://schemas.openxmlformats.org/drawingml/2006/main" xmlns:r="http://schemas.openxmlformats.org/officeDocument/2006/relationships" xmlns:p="http://schemas.openxmlformats.org/presentationml/2006/main">
   <p:cSld>
     <p:spTree>
@@ -9531,13 +12881,25 @@
             <p:ph type="title"/>
           </p:nvPr>
         </p:nvSpPr>
-        <p:spPr/>
+        <p:spPr>
+          <a:xfrm>
+            <a:off x="367899" y="610024"/>
+            <a:ext cx="10515600" cy="814645"/>
+          </a:xfrm>
+        </p:spPr>
         <p:txBody>
           <a:bodyPr/>
           <a:lstStyle/>
           <a:p>
             <a:r>
-              <a:rPr lang="en-DE" dirty="0"/>
+              <a:rPr lang="en-DE" dirty="0">
+                <a:solidFill>
+                  <a:schemeClr val="tx1">
+                    <a:lumMod val="50000"/>
+                    <a:lumOff val="50000"/>
+                  </a:schemeClr>
+                </a:solidFill>
+              </a:rPr>
               <a:t>Data distribution &amp; split</a:t>
             </a:r>
           </a:p>
@@ -9795,90 +13157,7 @@
 </p:sld>
 </file>
 
-<file path=ppt/slides/slide6.xml><?xml version="1.0" encoding="utf-8"?>
-<p:sld xmlns:a="http://schemas.openxmlformats.org/drawingml/2006/main" xmlns:r="http://schemas.openxmlformats.org/officeDocument/2006/relationships" xmlns:p="http://schemas.openxmlformats.org/presentationml/2006/main">
-  <p:cSld>
-    <p:spTree>
-      <p:nvGrpSpPr>
-        <p:cNvPr id="1" name=""/>
-        <p:cNvGrpSpPr/>
-        <p:nvPr/>
-      </p:nvGrpSpPr>
-      <p:grpSpPr>
-        <a:xfrm>
-          <a:off x="0" y="0"/>
-          <a:ext cx="0" cy="0"/>
-          <a:chOff x="0" y="0"/>
-          <a:chExt cx="0" cy="0"/>
-        </a:xfrm>
-      </p:grpSpPr>
-      <p:sp>
-        <p:nvSpPr>
-          <p:cNvPr id="2" name="Title 1">
-            <a:extLst>
-              <a:ext uri="{FF2B5EF4-FFF2-40B4-BE49-F238E27FC236}">
-                <a16:creationId xmlns:a16="http://schemas.microsoft.com/office/drawing/2014/main" id="{1F770316-4140-183A-EED6-F65032225D69}"/>
-              </a:ext>
-            </a:extLst>
-          </p:cNvPr>
-          <p:cNvSpPr>
-            <a:spLocks noGrp="1"/>
-          </p:cNvSpPr>
-          <p:nvPr>
-            <p:ph type="title"/>
-          </p:nvPr>
-        </p:nvSpPr>
-        <p:spPr/>
-        <p:txBody>
-          <a:bodyPr/>
-          <a:lstStyle/>
-          <a:p>
-            <a:r>
-              <a:rPr lang="en-DE" dirty="0"/>
-              <a:t>Feature engineering</a:t>
-            </a:r>
-          </a:p>
-        </p:txBody>
-      </p:sp>
-      <p:sp>
-        <p:nvSpPr>
-          <p:cNvPr id="3" name="Content Placeholder 2">
-            <a:extLst>
-              <a:ext uri="{FF2B5EF4-FFF2-40B4-BE49-F238E27FC236}">
-                <a16:creationId xmlns:a16="http://schemas.microsoft.com/office/drawing/2014/main" id="{653F4564-DF66-F3D0-4ABE-D2150EB84BF8}"/>
-              </a:ext>
-            </a:extLst>
-          </p:cNvPr>
-          <p:cNvSpPr>
-            <a:spLocks noGrp="1"/>
-          </p:cNvSpPr>
-          <p:nvPr>
-            <p:ph idx="1"/>
-          </p:nvPr>
-        </p:nvSpPr>
-        <p:spPr/>
-        <p:txBody>
-          <a:bodyPr/>
-          <a:lstStyle/>
-          <a:p>
-            <a:endParaRPr lang="en-DE"/>
-          </a:p>
-        </p:txBody>
-      </p:sp>
-    </p:spTree>
-    <p:extLst>
-      <p:ext uri="{BB962C8B-B14F-4D97-AF65-F5344CB8AC3E}">
-        <p14:creationId xmlns:p14="http://schemas.microsoft.com/office/powerpoint/2010/main" val="2023532614"/>
-      </p:ext>
-    </p:extLst>
-  </p:cSld>
-  <p:clrMapOvr>
-    <a:masterClrMapping/>
-  </p:clrMapOvr>
-</p:sld>
-</file>
-
-<file path=ppt/slides/slide7.xml><?xml version="1.0" encoding="utf-8"?>
+<file path=ppt/slides/slide8.xml><?xml version="1.0" encoding="utf-8"?>
 <p:sld xmlns:a="http://schemas.openxmlformats.org/drawingml/2006/main" xmlns:r="http://schemas.openxmlformats.org/officeDocument/2006/relationships" xmlns:p="http://schemas.openxmlformats.org/presentationml/2006/main">
   <p:cSld>
     <p:spTree>
@@ -9939,13 +13218,25 @@
             <p:ph type="title"/>
           </p:nvPr>
         </p:nvSpPr>
-        <p:spPr/>
+        <p:spPr>
+          <a:xfrm>
+            <a:off x="467138" y="237602"/>
+            <a:ext cx="10515600" cy="765914"/>
+          </a:xfrm>
+        </p:spPr>
         <p:txBody>
           <a:bodyPr/>
           <a:lstStyle/>
           <a:p>
             <a:r>
-              <a:rPr lang="en-DE" dirty="0"/>
+              <a:rPr lang="en-DE" dirty="0">
+                <a:solidFill>
+                  <a:schemeClr val="tx1">
+                    <a:lumMod val="50000"/>
+                    <a:lumOff val="50000"/>
+                  </a:schemeClr>
+                </a:solidFill>
+              </a:rPr>
               <a:t>ML methods</a:t>
             </a:r>
           </a:p>
@@ -10167,7 +13458,7 @@
 </p:sld>
 </file>
 
-<file path=ppt/slides/slide8.xml><?xml version="1.0" encoding="utf-8"?>
+<file path=ppt/slides/slide9.xml><?xml version="1.0" encoding="utf-8"?>
 <p:sld xmlns:a="http://schemas.openxmlformats.org/drawingml/2006/main" xmlns:r="http://schemas.openxmlformats.org/officeDocument/2006/relationships" xmlns:p="http://schemas.openxmlformats.org/presentationml/2006/main">
   <p:cSld>
     <p:spTree>
@@ -10202,8 +13493,8 @@
         </p:nvSpPr>
         <p:spPr>
           <a:xfrm>
-            <a:off x="347870" y="-106017"/>
-            <a:ext cx="10515600" cy="1325563"/>
+            <a:off x="347870" y="0"/>
+            <a:ext cx="10515600" cy="861392"/>
           </a:xfrm>
         </p:spPr>
         <p:txBody>
@@ -10211,8 +13502,15 @@
           <a:lstStyle/>
           <a:p>
             <a:r>
-              <a:rPr lang="en-DE" dirty="0"/>
-              <a:t>Accuracy</a:t>
+              <a:rPr lang="en-DE" dirty="0">
+                <a:solidFill>
+                  <a:schemeClr val="tx1">
+                    <a:lumMod val="50000"/>
+                    <a:lumOff val="50000"/>
+                  </a:schemeClr>
+                </a:solidFill>
+              </a:rPr>
+              <a:t>Accuracy of the models</a:t>
             </a:r>
           </a:p>
         </p:txBody>
@@ -10241,7 +13539,7 @@
         </p:blipFill>
         <p:spPr>
           <a:xfrm>
-            <a:off x="728870" y="861391"/>
+            <a:off x="593604" y="861391"/>
             <a:ext cx="11581831" cy="5750419"/>
           </a:xfrm>
         </p:spPr>
@@ -10441,98 +13739,6 @@
     <p:extLst>
       <p:ext uri="{BB962C8B-B14F-4D97-AF65-F5344CB8AC3E}">
         <p14:creationId xmlns:p14="http://schemas.microsoft.com/office/powerpoint/2010/main" val="168623108"/>
-      </p:ext>
-    </p:extLst>
-  </p:cSld>
-  <p:clrMapOvr>
-    <a:masterClrMapping/>
-  </p:clrMapOvr>
-</p:sld>
-</file>
-
-<file path=ppt/slides/slide9.xml><?xml version="1.0" encoding="utf-8"?>
-<p:sld xmlns:a="http://schemas.openxmlformats.org/drawingml/2006/main" xmlns:r="http://schemas.openxmlformats.org/officeDocument/2006/relationships" xmlns:p="http://schemas.openxmlformats.org/presentationml/2006/main">
-  <p:cSld>
-    <p:spTree>
-      <p:nvGrpSpPr>
-        <p:cNvPr id="1" name=""/>
-        <p:cNvGrpSpPr/>
-        <p:nvPr/>
-      </p:nvGrpSpPr>
-      <p:grpSpPr>
-        <a:xfrm>
-          <a:off x="0" y="0"/>
-          <a:ext cx="0" cy="0"/>
-          <a:chOff x="0" y="0"/>
-          <a:chExt cx="0" cy="0"/>
-        </a:xfrm>
-      </p:grpSpPr>
-      <p:pic>
-        <p:nvPicPr>
-          <p:cNvPr id="5" name="Content Placeholder 4">
-            <a:extLst>
-              <a:ext uri="{FF2B5EF4-FFF2-40B4-BE49-F238E27FC236}">
-                <a16:creationId xmlns:a16="http://schemas.microsoft.com/office/drawing/2014/main" id="{BCDEE8EF-E60D-0A44-F29F-AE31DC5AFE5B}"/>
-              </a:ext>
-            </a:extLst>
-          </p:cNvPr>
-          <p:cNvPicPr>
-            <a:picLocks noGrp="1" noChangeAspect="1"/>
-          </p:cNvPicPr>
-          <p:nvPr>
-            <p:ph idx="1"/>
-          </p:nvPr>
-        </p:nvPicPr>
-        <p:blipFill>
-          <a:blip r:embed="rId2"/>
-          <a:stretch>
-            <a:fillRect/>
-          </a:stretch>
-        </p:blipFill>
-        <p:spPr>
-          <a:xfrm>
-            <a:off x="1378226" y="1073020"/>
-            <a:ext cx="9342783" cy="5798969"/>
-          </a:xfrm>
-        </p:spPr>
-      </p:pic>
-      <p:sp>
-        <p:nvSpPr>
-          <p:cNvPr id="2" name="Title 1">
-            <a:extLst>
-              <a:ext uri="{FF2B5EF4-FFF2-40B4-BE49-F238E27FC236}">
-                <a16:creationId xmlns:a16="http://schemas.microsoft.com/office/drawing/2014/main" id="{08AA82B3-F56F-08CF-12E3-ABD32E5C4B64}"/>
-              </a:ext>
-            </a:extLst>
-          </p:cNvPr>
-          <p:cNvSpPr>
-            <a:spLocks noGrp="1"/>
-          </p:cNvSpPr>
-          <p:nvPr>
-            <p:ph type="title"/>
-          </p:nvPr>
-        </p:nvSpPr>
-        <p:spPr>
-          <a:xfrm>
-            <a:off x="639417" y="139838"/>
-            <a:ext cx="10515600" cy="1325563"/>
-          </a:xfrm>
-        </p:spPr>
-        <p:txBody>
-          <a:bodyPr/>
-          <a:lstStyle/>
-          <a:p>
-            <a:r>
-              <a:rPr lang="en-DE" dirty="0"/>
-              <a:t>AUC (Area under curve)</a:t>
-            </a:r>
-          </a:p>
-        </p:txBody>
-      </p:sp>
-    </p:spTree>
-    <p:extLst>
-      <p:ext uri="{BB962C8B-B14F-4D97-AF65-F5344CB8AC3E}">
-        <p14:creationId xmlns:p14="http://schemas.microsoft.com/office/powerpoint/2010/main" val="1856652171"/>
       </p:ext>
     </p:extLst>
   </p:cSld>

</xml_diff>

<commit_message>
big change, pushed new version
</commit_message>
<xml_diff>
--- a/slide/abdul_presentation.pptx
+++ b/slide/abdul_presentation.pptx
@@ -5,7 +5,7 @@
     <p:sldMasterId id="2147483648" r:id="rId1"/>
   </p:sldMasterIdLst>
   <p:notesMasterIdLst>
-    <p:notesMasterId r:id="rId13"/>
+    <p:notesMasterId r:id="rId15"/>
   </p:notesMasterIdLst>
   <p:sldIdLst>
     <p:sldId id="256" r:id="rId2"/>
@@ -16,9 +16,11 @@
     <p:sldId id="268" r:id="rId7"/>
     <p:sldId id="259" r:id="rId8"/>
     <p:sldId id="261" r:id="rId9"/>
-    <p:sldId id="263" r:id="rId10"/>
-    <p:sldId id="265" r:id="rId11"/>
-    <p:sldId id="264" r:id="rId12"/>
+    <p:sldId id="269" r:id="rId10"/>
+    <p:sldId id="263" r:id="rId11"/>
+    <p:sldId id="265" r:id="rId12"/>
+    <p:sldId id="264" r:id="rId13"/>
+    <p:sldId id="270" r:id="rId14"/>
   </p:sldIdLst>
   <p:sldSz cx="12192000" cy="6858000"/>
   <p:notesSz cx="6858000" cy="9144000"/>
@@ -117,6 +119,11 @@
       </a:defRPr>
     </a:lvl9pPr>
   </p:defaultTextStyle>
+  <p:extLst>
+    <p:ext uri="{EFAFB233-063F-42B5-8137-9DF3F51BA10A}">
+      <p15:sldGuideLst xmlns:p15="http://schemas.microsoft.com/office/powerpoint/2012/main"/>
+    </p:ext>
+  </p:extLst>
 </p:presentation>
 </file>
 
@@ -197,6 +204,11 @@
               </a:ln>
               <a:effectLst/>
             </c:spPr>
+            <c:extLst>
+              <c:ext xmlns:c16="http://schemas.microsoft.com/office/drawing/2014/chart" uri="{C3380CC4-5D6E-409C-BE32-E72D297353CC}">
+                <c16:uniqueId val="{00000001-357F-8446-9BE5-066C99BFE82B}"/>
+              </c:ext>
+            </c:extLst>
           </c:dPt>
           <c:dPt>
             <c:idx val="1"/>
@@ -212,6 +224,11 @@
               </a:ln>
               <a:effectLst/>
             </c:spPr>
+            <c:extLst>
+              <c:ext xmlns:c16="http://schemas.microsoft.com/office/drawing/2014/chart" uri="{C3380CC4-5D6E-409C-BE32-E72D297353CC}">
+                <c16:uniqueId val="{00000003-357F-8446-9BE5-066C99BFE82B}"/>
+              </c:ext>
+            </c:extLst>
           </c:dPt>
           <c:dPt>
             <c:idx val="2"/>
@@ -227,6 +244,11 @@
               </a:ln>
               <a:effectLst/>
             </c:spPr>
+            <c:extLst>
+              <c:ext xmlns:c16="http://schemas.microsoft.com/office/drawing/2014/chart" uri="{C3380CC4-5D6E-409C-BE32-E72D297353CC}">
+                <c16:uniqueId val="{00000005-357F-8446-9BE5-066C99BFE82B}"/>
+              </c:ext>
+            </c:extLst>
           </c:dPt>
           <c:dPt>
             <c:idx val="3"/>
@@ -242,6 +264,11 @@
               </a:ln>
               <a:effectLst/>
             </c:spPr>
+            <c:extLst>
+              <c:ext xmlns:c16="http://schemas.microsoft.com/office/drawing/2014/chart" uri="{C3380CC4-5D6E-409C-BE32-E72D297353CC}">
+                <c16:uniqueId val="{00000007-357F-8446-9BE5-066C99BFE82B}"/>
+              </c:ext>
+            </c:extLst>
           </c:dPt>
           <c:cat>
             <c:strRef>
@@ -1670,6 +1697,753 @@
 </file>
 
 <file path=ppt/diagrams/colors2.xml><?xml version="1.0" encoding="utf-8"?>
+<dgm:colorsDef xmlns:dgm="http://schemas.openxmlformats.org/drawingml/2006/diagram" xmlns:a="http://schemas.openxmlformats.org/drawingml/2006/main" uniqueId="urn:microsoft.com/office/officeart/2005/8/colors/accent1_2">
+  <dgm:title val=""/>
+  <dgm:desc val=""/>
+  <dgm:catLst>
+    <dgm:cat type="accent1" pri="11200"/>
+  </dgm:catLst>
+  <dgm:styleLbl name="node0">
+    <dgm:fillClrLst meth="repeat">
+      <a:schemeClr val="accent1"/>
+    </dgm:fillClrLst>
+    <dgm:linClrLst meth="repeat">
+      <a:schemeClr val="lt1"/>
+    </dgm:linClrLst>
+    <dgm:effectClrLst/>
+    <dgm:txLinClrLst/>
+    <dgm:txFillClrLst/>
+    <dgm:txEffectClrLst/>
+  </dgm:styleLbl>
+  <dgm:styleLbl name="alignNode1">
+    <dgm:fillClrLst meth="repeat">
+      <a:schemeClr val="accent1"/>
+    </dgm:fillClrLst>
+    <dgm:linClrLst meth="repeat">
+      <a:schemeClr val="accent1"/>
+    </dgm:linClrLst>
+    <dgm:effectClrLst/>
+    <dgm:txLinClrLst/>
+    <dgm:txFillClrLst/>
+    <dgm:txEffectClrLst/>
+  </dgm:styleLbl>
+  <dgm:styleLbl name="node1">
+    <dgm:fillClrLst meth="repeat">
+      <a:schemeClr val="accent1"/>
+    </dgm:fillClrLst>
+    <dgm:linClrLst meth="repeat">
+      <a:schemeClr val="lt1"/>
+    </dgm:linClrLst>
+    <dgm:effectClrLst/>
+    <dgm:txLinClrLst/>
+    <dgm:txFillClrLst/>
+    <dgm:txEffectClrLst/>
+  </dgm:styleLbl>
+  <dgm:styleLbl name="lnNode1">
+    <dgm:fillClrLst meth="repeat">
+      <a:schemeClr val="accent1"/>
+    </dgm:fillClrLst>
+    <dgm:linClrLst meth="repeat">
+      <a:schemeClr val="lt1"/>
+    </dgm:linClrLst>
+    <dgm:effectClrLst/>
+    <dgm:txLinClrLst/>
+    <dgm:txFillClrLst/>
+    <dgm:txEffectClrLst/>
+  </dgm:styleLbl>
+  <dgm:styleLbl name="vennNode1">
+    <dgm:fillClrLst meth="repeat">
+      <a:schemeClr val="accent1">
+        <a:alpha val="50000"/>
+      </a:schemeClr>
+    </dgm:fillClrLst>
+    <dgm:linClrLst meth="repeat">
+      <a:schemeClr val="lt1"/>
+    </dgm:linClrLst>
+    <dgm:effectClrLst/>
+    <dgm:txLinClrLst/>
+    <dgm:txFillClrLst/>
+    <dgm:txEffectClrLst/>
+  </dgm:styleLbl>
+  <dgm:styleLbl name="node2">
+    <dgm:fillClrLst meth="repeat">
+      <a:schemeClr val="accent1"/>
+    </dgm:fillClrLst>
+    <dgm:linClrLst meth="repeat">
+      <a:schemeClr val="lt1"/>
+    </dgm:linClrLst>
+    <dgm:effectClrLst/>
+    <dgm:txLinClrLst/>
+    <dgm:txFillClrLst/>
+    <dgm:txEffectClrLst/>
+  </dgm:styleLbl>
+  <dgm:styleLbl name="node3">
+    <dgm:fillClrLst meth="repeat">
+      <a:schemeClr val="accent1"/>
+    </dgm:fillClrLst>
+    <dgm:linClrLst meth="repeat">
+      <a:schemeClr val="lt1"/>
+    </dgm:linClrLst>
+    <dgm:effectClrLst/>
+    <dgm:txLinClrLst/>
+    <dgm:txFillClrLst/>
+    <dgm:txEffectClrLst/>
+  </dgm:styleLbl>
+  <dgm:styleLbl name="node4">
+    <dgm:fillClrLst meth="repeat">
+      <a:schemeClr val="accent1"/>
+    </dgm:fillClrLst>
+    <dgm:linClrLst meth="repeat">
+      <a:schemeClr val="lt1"/>
+    </dgm:linClrLst>
+    <dgm:effectClrLst/>
+    <dgm:txLinClrLst/>
+    <dgm:txFillClrLst/>
+    <dgm:txEffectClrLst/>
+  </dgm:styleLbl>
+  <dgm:styleLbl name="fgImgPlace1">
+    <dgm:fillClrLst meth="repeat">
+      <a:schemeClr val="accent1">
+        <a:tint val="50000"/>
+      </a:schemeClr>
+    </dgm:fillClrLst>
+    <dgm:linClrLst meth="repeat">
+      <a:schemeClr val="lt1"/>
+    </dgm:linClrLst>
+    <dgm:effectClrLst/>
+    <dgm:txLinClrLst/>
+    <dgm:txFillClrLst meth="repeat">
+      <a:schemeClr val="lt1"/>
+    </dgm:txFillClrLst>
+    <dgm:txEffectClrLst/>
+  </dgm:styleLbl>
+  <dgm:styleLbl name="alignImgPlace1">
+    <dgm:fillClrLst meth="repeat">
+      <a:schemeClr val="accent1">
+        <a:tint val="50000"/>
+      </a:schemeClr>
+    </dgm:fillClrLst>
+    <dgm:linClrLst meth="repeat">
+      <a:schemeClr val="lt1"/>
+    </dgm:linClrLst>
+    <dgm:effectClrLst/>
+    <dgm:txLinClrLst/>
+    <dgm:txFillClrLst meth="repeat">
+      <a:schemeClr val="lt1"/>
+    </dgm:txFillClrLst>
+    <dgm:txEffectClrLst/>
+  </dgm:styleLbl>
+  <dgm:styleLbl name="bgImgPlace1">
+    <dgm:fillClrLst meth="repeat">
+      <a:schemeClr val="accent1">
+        <a:tint val="50000"/>
+      </a:schemeClr>
+    </dgm:fillClrLst>
+    <dgm:linClrLst meth="repeat">
+      <a:schemeClr val="lt1"/>
+    </dgm:linClrLst>
+    <dgm:effectClrLst/>
+    <dgm:txLinClrLst/>
+    <dgm:txFillClrLst meth="repeat">
+      <a:schemeClr val="lt1"/>
+    </dgm:txFillClrLst>
+    <dgm:txEffectClrLst/>
+  </dgm:styleLbl>
+  <dgm:styleLbl name="sibTrans2D1">
+    <dgm:fillClrLst meth="repeat">
+      <a:schemeClr val="accent1">
+        <a:tint val="60000"/>
+      </a:schemeClr>
+    </dgm:fillClrLst>
+    <dgm:linClrLst meth="repeat">
+      <a:schemeClr val="accent1">
+        <a:tint val="60000"/>
+      </a:schemeClr>
+    </dgm:linClrLst>
+    <dgm:effectClrLst/>
+    <dgm:txLinClrLst/>
+    <dgm:txFillClrLst/>
+    <dgm:txEffectClrLst/>
+  </dgm:styleLbl>
+  <dgm:styleLbl name="fgSibTrans2D1">
+    <dgm:fillClrLst meth="repeat">
+      <a:schemeClr val="accent1">
+        <a:tint val="60000"/>
+      </a:schemeClr>
+    </dgm:fillClrLst>
+    <dgm:linClrLst meth="repeat">
+      <a:schemeClr val="accent1">
+        <a:tint val="60000"/>
+      </a:schemeClr>
+    </dgm:linClrLst>
+    <dgm:effectClrLst/>
+    <dgm:txLinClrLst/>
+    <dgm:txFillClrLst/>
+    <dgm:txEffectClrLst/>
+  </dgm:styleLbl>
+  <dgm:styleLbl name="bgSibTrans2D1">
+    <dgm:fillClrLst meth="repeat">
+      <a:schemeClr val="accent1">
+        <a:tint val="60000"/>
+      </a:schemeClr>
+    </dgm:fillClrLst>
+    <dgm:linClrLst meth="repeat">
+      <a:schemeClr val="accent1">
+        <a:tint val="60000"/>
+      </a:schemeClr>
+    </dgm:linClrLst>
+    <dgm:effectClrLst/>
+    <dgm:txLinClrLst/>
+    <dgm:txFillClrLst/>
+    <dgm:txEffectClrLst/>
+  </dgm:styleLbl>
+  <dgm:styleLbl name="sibTrans1D1">
+    <dgm:fillClrLst meth="repeat">
+      <a:schemeClr val="accent1"/>
+    </dgm:fillClrLst>
+    <dgm:linClrLst meth="repeat">
+      <a:schemeClr val="accent1"/>
+    </dgm:linClrLst>
+    <dgm:effectClrLst/>
+    <dgm:txLinClrLst/>
+    <dgm:txFillClrLst meth="repeat">
+      <a:schemeClr val="tx1"/>
+    </dgm:txFillClrLst>
+    <dgm:txEffectClrLst/>
+  </dgm:styleLbl>
+  <dgm:styleLbl name="callout">
+    <dgm:fillClrLst meth="repeat">
+      <a:schemeClr val="accent1"/>
+    </dgm:fillClrLst>
+    <dgm:linClrLst meth="repeat">
+      <a:schemeClr val="accent1">
+        <a:tint val="50000"/>
+      </a:schemeClr>
+    </dgm:linClrLst>
+    <dgm:effectClrLst/>
+    <dgm:txLinClrLst/>
+    <dgm:txFillClrLst meth="repeat">
+      <a:schemeClr val="tx1"/>
+    </dgm:txFillClrLst>
+    <dgm:txEffectClrLst/>
+  </dgm:styleLbl>
+  <dgm:styleLbl name="asst0">
+    <dgm:fillClrLst meth="repeat">
+      <a:schemeClr val="accent1"/>
+    </dgm:fillClrLst>
+    <dgm:linClrLst meth="repeat">
+      <a:schemeClr val="lt1"/>
+    </dgm:linClrLst>
+    <dgm:effectClrLst/>
+    <dgm:txLinClrLst/>
+    <dgm:txFillClrLst/>
+    <dgm:txEffectClrLst/>
+  </dgm:styleLbl>
+  <dgm:styleLbl name="asst1">
+    <dgm:fillClrLst meth="repeat">
+      <a:schemeClr val="accent1"/>
+    </dgm:fillClrLst>
+    <dgm:linClrLst meth="repeat">
+      <a:schemeClr val="lt1"/>
+    </dgm:linClrLst>
+    <dgm:effectClrLst/>
+    <dgm:txLinClrLst/>
+    <dgm:txFillClrLst/>
+    <dgm:txEffectClrLst/>
+  </dgm:styleLbl>
+  <dgm:styleLbl name="asst2">
+    <dgm:fillClrLst meth="repeat">
+      <a:schemeClr val="accent1"/>
+    </dgm:fillClrLst>
+    <dgm:linClrLst meth="repeat">
+      <a:schemeClr val="lt1"/>
+    </dgm:linClrLst>
+    <dgm:effectClrLst/>
+    <dgm:txLinClrLst/>
+    <dgm:txFillClrLst/>
+    <dgm:txEffectClrLst/>
+  </dgm:styleLbl>
+  <dgm:styleLbl name="asst3">
+    <dgm:fillClrLst meth="repeat">
+      <a:schemeClr val="accent1"/>
+    </dgm:fillClrLst>
+    <dgm:linClrLst meth="repeat">
+      <a:schemeClr val="lt1"/>
+    </dgm:linClrLst>
+    <dgm:effectClrLst/>
+    <dgm:txLinClrLst/>
+    <dgm:txFillClrLst/>
+    <dgm:txEffectClrLst/>
+  </dgm:styleLbl>
+  <dgm:styleLbl name="asst4">
+    <dgm:fillClrLst meth="repeat">
+      <a:schemeClr val="accent1"/>
+    </dgm:fillClrLst>
+    <dgm:linClrLst meth="repeat">
+      <a:schemeClr val="lt1"/>
+    </dgm:linClrLst>
+    <dgm:effectClrLst/>
+    <dgm:txLinClrLst/>
+    <dgm:txFillClrLst/>
+    <dgm:txEffectClrLst/>
+  </dgm:styleLbl>
+  <dgm:styleLbl name="parChTrans2D1">
+    <dgm:fillClrLst meth="repeat">
+      <a:schemeClr val="accent1">
+        <a:tint val="60000"/>
+      </a:schemeClr>
+    </dgm:fillClrLst>
+    <dgm:linClrLst meth="repeat">
+      <a:schemeClr val="accent1">
+        <a:tint val="60000"/>
+      </a:schemeClr>
+    </dgm:linClrLst>
+    <dgm:effectClrLst/>
+    <dgm:txLinClrLst/>
+    <dgm:txFillClrLst meth="repeat">
+      <a:schemeClr val="lt1"/>
+    </dgm:txFillClrLst>
+    <dgm:txEffectClrLst/>
+  </dgm:styleLbl>
+  <dgm:styleLbl name="parChTrans2D2">
+    <dgm:fillClrLst meth="repeat">
+      <a:schemeClr val="accent1"/>
+    </dgm:fillClrLst>
+    <dgm:linClrLst meth="repeat">
+      <a:schemeClr val="accent1"/>
+    </dgm:linClrLst>
+    <dgm:effectClrLst/>
+    <dgm:txLinClrLst/>
+    <dgm:txFillClrLst meth="repeat">
+      <a:schemeClr val="lt1"/>
+    </dgm:txFillClrLst>
+    <dgm:txEffectClrLst/>
+  </dgm:styleLbl>
+  <dgm:styleLbl name="parChTrans2D3">
+    <dgm:fillClrLst meth="repeat">
+      <a:schemeClr val="accent1"/>
+    </dgm:fillClrLst>
+    <dgm:linClrLst meth="repeat">
+      <a:schemeClr val="accent1"/>
+    </dgm:linClrLst>
+    <dgm:effectClrLst/>
+    <dgm:txLinClrLst/>
+    <dgm:txFillClrLst meth="repeat">
+      <a:schemeClr val="lt1"/>
+    </dgm:txFillClrLst>
+    <dgm:txEffectClrLst/>
+  </dgm:styleLbl>
+  <dgm:styleLbl name="parChTrans2D4">
+    <dgm:fillClrLst meth="repeat">
+      <a:schemeClr val="accent1"/>
+    </dgm:fillClrLst>
+    <dgm:linClrLst meth="repeat">
+      <a:schemeClr val="accent1"/>
+    </dgm:linClrLst>
+    <dgm:effectClrLst/>
+    <dgm:txLinClrLst/>
+    <dgm:txFillClrLst meth="repeat">
+      <a:schemeClr val="lt1"/>
+    </dgm:txFillClrLst>
+    <dgm:txEffectClrLst/>
+  </dgm:styleLbl>
+  <dgm:styleLbl name="parChTrans1D1">
+    <dgm:fillClrLst meth="repeat">
+      <a:schemeClr val="accent1"/>
+    </dgm:fillClrLst>
+    <dgm:linClrLst meth="repeat">
+      <a:schemeClr val="accent1">
+        <a:shade val="60000"/>
+      </a:schemeClr>
+    </dgm:linClrLst>
+    <dgm:effectClrLst/>
+    <dgm:txLinClrLst/>
+    <dgm:txFillClrLst meth="repeat">
+      <a:schemeClr val="tx1"/>
+    </dgm:txFillClrLst>
+    <dgm:txEffectClrLst/>
+  </dgm:styleLbl>
+  <dgm:styleLbl name="parChTrans1D2">
+    <dgm:fillClrLst meth="repeat">
+      <a:schemeClr val="accent1"/>
+    </dgm:fillClrLst>
+    <dgm:linClrLst meth="repeat">
+      <a:schemeClr val="accent1">
+        <a:shade val="60000"/>
+      </a:schemeClr>
+    </dgm:linClrLst>
+    <dgm:effectClrLst/>
+    <dgm:txLinClrLst/>
+    <dgm:txFillClrLst meth="repeat">
+      <a:schemeClr val="tx1"/>
+    </dgm:txFillClrLst>
+    <dgm:txEffectClrLst/>
+  </dgm:styleLbl>
+  <dgm:styleLbl name="parChTrans1D3">
+    <dgm:fillClrLst meth="repeat">
+      <a:schemeClr val="accent1"/>
+    </dgm:fillClrLst>
+    <dgm:linClrLst meth="repeat">
+      <a:schemeClr val="accent1">
+        <a:shade val="80000"/>
+      </a:schemeClr>
+    </dgm:linClrLst>
+    <dgm:effectClrLst/>
+    <dgm:txLinClrLst/>
+    <dgm:txFillClrLst meth="repeat">
+      <a:schemeClr val="tx1"/>
+    </dgm:txFillClrLst>
+    <dgm:txEffectClrLst/>
+  </dgm:styleLbl>
+  <dgm:styleLbl name="parChTrans1D4">
+    <dgm:fillClrLst meth="repeat">
+      <a:schemeClr val="accent1"/>
+    </dgm:fillClrLst>
+    <dgm:linClrLst meth="repeat">
+      <a:schemeClr val="accent1">
+        <a:shade val="80000"/>
+      </a:schemeClr>
+    </dgm:linClrLst>
+    <dgm:effectClrLst/>
+    <dgm:txLinClrLst/>
+    <dgm:txFillClrLst meth="repeat">
+      <a:schemeClr val="tx1"/>
+    </dgm:txFillClrLst>
+    <dgm:txEffectClrLst/>
+  </dgm:styleLbl>
+  <dgm:styleLbl name="fgAcc1">
+    <dgm:fillClrLst meth="repeat">
+      <a:schemeClr val="lt1">
+        <a:alpha val="90000"/>
+      </a:schemeClr>
+    </dgm:fillClrLst>
+    <dgm:linClrLst meth="repeat">
+      <a:schemeClr val="accent1"/>
+    </dgm:linClrLst>
+    <dgm:effectClrLst/>
+    <dgm:txLinClrLst/>
+    <dgm:txFillClrLst meth="repeat">
+      <a:schemeClr val="dk1"/>
+    </dgm:txFillClrLst>
+    <dgm:txEffectClrLst/>
+  </dgm:styleLbl>
+  <dgm:styleLbl name="conFgAcc1">
+    <dgm:fillClrLst meth="repeat">
+      <a:schemeClr val="lt1">
+        <a:alpha val="90000"/>
+      </a:schemeClr>
+    </dgm:fillClrLst>
+    <dgm:linClrLst meth="repeat">
+      <a:schemeClr val="accent1"/>
+    </dgm:linClrLst>
+    <dgm:effectClrLst/>
+    <dgm:txLinClrLst/>
+    <dgm:txFillClrLst meth="repeat">
+      <a:schemeClr val="dk1"/>
+    </dgm:txFillClrLst>
+    <dgm:txEffectClrLst/>
+  </dgm:styleLbl>
+  <dgm:styleLbl name="alignAcc1">
+    <dgm:fillClrLst meth="repeat">
+      <a:schemeClr val="lt1">
+        <a:alpha val="90000"/>
+      </a:schemeClr>
+    </dgm:fillClrLst>
+    <dgm:linClrLst meth="repeat">
+      <a:schemeClr val="accent1"/>
+    </dgm:linClrLst>
+    <dgm:effectClrLst/>
+    <dgm:txLinClrLst/>
+    <dgm:txFillClrLst meth="repeat">
+      <a:schemeClr val="dk1"/>
+    </dgm:txFillClrLst>
+    <dgm:txEffectClrLst/>
+  </dgm:styleLbl>
+  <dgm:styleLbl name="trAlignAcc1">
+    <dgm:fillClrLst meth="repeat">
+      <a:schemeClr val="lt1">
+        <a:alpha val="40000"/>
+      </a:schemeClr>
+    </dgm:fillClrLst>
+    <dgm:linClrLst meth="repeat">
+      <a:schemeClr val="accent1"/>
+    </dgm:linClrLst>
+    <dgm:effectClrLst/>
+    <dgm:txLinClrLst/>
+    <dgm:txFillClrLst meth="repeat">
+      <a:schemeClr val="dk1"/>
+    </dgm:txFillClrLst>
+    <dgm:txEffectClrLst/>
+  </dgm:styleLbl>
+  <dgm:styleLbl name="bgAcc1">
+    <dgm:fillClrLst meth="repeat">
+      <a:schemeClr val="lt1">
+        <a:alpha val="90000"/>
+      </a:schemeClr>
+    </dgm:fillClrLst>
+    <dgm:linClrLst meth="repeat">
+      <a:schemeClr val="accent1"/>
+    </dgm:linClrLst>
+    <dgm:effectClrLst/>
+    <dgm:txLinClrLst/>
+    <dgm:txFillClrLst meth="repeat">
+      <a:schemeClr val="dk1"/>
+    </dgm:txFillClrLst>
+    <dgm:txEffectClrLst/>
+  </dgm:styleLbl>
+  <dgm:styleLbl name="solidFgAcc1">
+    <dgm:fillClrLst meth="repeat">
+      <a:schemeClr val="lt1"/>
+    </dgm:fillClrLst>
+    <dgm:linClrLst meth="repeat">
+      <a:schemeClr val="accent1"/>
+    </dgm:linClrLst>
+    <dgm:effectClrLst/>
+    <dgm:txLinClrLst/>
+    <dgm:txFillClrLst meth="repeat">
+      <a:schemeClr val="dk1"/>
+    </dgm:txFillClrLst>
+    <dgm:txEffectClrLst/>
+  </dgm:styleLbl>
+  <dgm:styleLbl name="solidAlignAcc1">
+    <dgm:fillClrLst meth="repeat">
+      <a:schemeClr val="lt1"/>
+    </dgm:fillClrLst>
+    <dgm:linClrLst meth="repeat">
+      <a:schemeClr val="accent1"/>
+    </dgm:linClrLst>
+    <dgm:effectClrLst/>
+    <dgm:txLinClrLst/>
+    <dgm:txFillClrLst meth="repeat">
+      <a:schemeClr val="dk1"/>
+    </dgm:txFillClrLst>
+    <dgm:txEffectClrLst/>
+  </dgm:styleLbl>
+  <dgm:styleLbl name="solidBgAcc1">
+    <dgm:fillClrLst meth="repeat">
+      <a:schemeClr val="lt1"/>
+    </dgm:fillClrLst>
+    <dgm:linClrLst meth="repeat">
+      <a:schemeClr val="accent1"/>
+    </dgm:linClrLst>
+    <dgm:effectClrLst/>
+    <dgm:txLinClrLst/>
+    <dgm:txFillClrLst meth="repeat">
+      <a:schemeClr val="dk1"/>
+    </dgm:txFillClrLst>
+    <dgm:txEffectClrLst/>
+  </dgm:styleLbl>
+  <dgm:styleLbl name="fgAccFollowNode1">
+    <dgm:fillClrLst meth="repeat">
+      <a:schemeClr val="accent1">
+        <a:alpha val="90000"/>
+        <a:tint val="40000"/>
+      </a:schemeClr>
+    </dgm:fillClrLst>
+    <dgm:linClrLst meth="repeat">
+      <a:schemeClr val="accent1">
+        <a:alpha val="90000"/>
+        <a:tint val="40000"/>
+      </a:schemeClr>
+    </dgm:linClrLst>
+    <dgm:effectClrLst/>
+    <dgm:txLinClrLst/>
+    <dgm:txFillClrLst meth="repeat">
+      <a:schemeClr val="dk1"/>
+    </dgm:txFillClrLst>
+    <dgm:txEffectClrLst/>
+  </dgm:styleLbl>
+  <dgm:styleLbl name="alignAccFollowNode1">
+    <dgm:fillClrLst meth="repeat">
+      <a:schemeClr val="accent1">
+        <a:alpha val="90000"/>
+        <a:tint val="40000"/>
+      </a:schemeClr>
+    </dgm:fillClrLst>
+    <dgm:linClrLst meth="repeat">
+      <a:schemeClr val="accent1">
+        <a:alpha val="90000"/>
+        <a:tint val="40000"/>
+      </a:schemeClr>
+    </dgm:linClrLst>
+    <dgm:effectClrLst/>
+    <dgm:txLinClrLst/>
+    <dgm:txFillClrLst meth="repeat">
+      <a:schemeClr val="dk1"/>
+    </dgm:txFillClrLst>
+    <dgm:txEffectClrLst/>
+  </dgm:styleLbl>
+  <dgm:styleLbl name="bgAccFollowNode1">
+    <dgm:fillClrLst meth="repeat">
+      <a:schemeClr val="accent1">
+        <a:alpha val="90000"/>
+        <a:tint val="40000"/>
+      </a:schemeClr>
+    </dgm:fillClrLst>
+    <dgm:linClrLst meth="repeat">
+      <a:schemeClr val="accent1">
+        <a:alpha val="90000"/>
+        <a:tint val="40000"/>
+      </a:schemeClr>
+    </dgm:linClrLst>
+    <dgm:effectClrLst/>
+    <dgm:txLinClrLst/>
+    <dgm:txFillClrLst meth="repeat">
+      <a:schemeClr val="dk1"/>
+    </dgm:txFillClrLst>
+    <dgm:txEffectClrLst/>
+  </dgm:styleLbl>
+  <dgm:styleLbl name="fgAcc0">
+    <dgm:fillClrLst meth="repeat">
+      <a:schemeClr val="lt1">
+        <a:alpha val="90000"/>
+      </a:schemeClr>
+    </dgm:fillClrLst>
+    <dgm:linClrLst meth="repeat">
+      <a:schemeClr val="accent1"/>
+    </dgm:linClrLst>
+    <dgm:effectClrLst/>
+    <dgm:txLinClrLst/>
+    <dgm:txFillClrLst meth="repeat">
+      <a:schemeClr val="dk1"/>
+    </dgm:txFillClrLst>
+    <dgm:txEffectClrLst/>
+  </dgm:styleLbl>
+  <dgm:styleLbl name="fgAcc2">
+    <dgm:fillClrLst meth="repeat">
+      <a:schemeClr val="lt1">
+        <a:alpha val="90000"/>
+      </a:schemeClr>
+    </dgm:fillClrLst>
+    <dgm:linClrLst meth="repeat">
+      <a:schemeClr val="accent1"/>
+    </dgm:linClrLst>
+    <dgm:effectClrLst/>
+    <dgm:txLinClrLst/>
+    <dgm:txFillClrLst meth="repeat">
+      <a:schemeClr val="dk1"/>
+    </dgm:txFillClrLst>
+    <dgm:txEffectClrLst/>
+  </dgm:styleLbl>
+  <dgm:styleLbl name="fgAcc3">
+    <dgm:fillClrLst meth="repeat">
+      <a:schemeClr val="lt1">
+        <a:alpha val="90000"/>
+      </a:schemeClr>
+    </dgm:fillClrLst>
+    <dgm:linClrLst meth="repeat">
+      <a:schemeClr val="accent1"/>
+    </dgm:linClrLst>
+    <dgm:effectClrLst/>
+    <dgm:txLinClrLst/>
+    <dgm:txFillClrLst meth="repeat">
+      <a:schemeClr val="dk1"/>
+    </dgm:txFillClrLst>
+    <dgm:txEffectClrLst/>
+  </dgm:styleLbl>
+  <dgm:styleLbl name="fgAcc4">
+    <dgm:fillClrLst meth="repeat">
+      <a:schemeClr val="lt1">
+        <a:alpha val="90000"/>
+      </a:schemeClr>
+    </dgm:fillClrLst>
+    <dgm:linClrLst meth="repeat">
+      <a:schemeClr val="accent1"/>
+    </dgm:linClrLst>
+    <dgm:effectClrLst/>
+    <dgm:txLinClrLst/>
+    <dgm:txFillClrLst meth="repeat">
+      <a:schemeClr val="dk1"/>
+    </dgm:txFillClrLst>
+    <dgm:txEffectClrLst/>
+  </dgm:styleLbl>
+  <dgm:styleLbl name="bgShp">
+    <dgm:fillClrLst meth="repeat">
+      <a:schemeClr val="accent1">
+        <a:tint val="40000"/>
+      </a:schemeClr>
+    </dgm:fillClrLst>
+    <dgm:linClrLst meth="repeat">
+      <a:schemeClr val="accent1"/>
+    </dgm:linClrLst>
+    <dgm:effectClrLst/>
+    <dgm:txLinClrLst/>
+    <dgm:txFillClrLst meth="repeat">
+      <a:schemeClr val="dk1"/>
+    </dgm:txFillClrLst>
+    <dgm:txEffectClrLst/>
+  </dgm:styleLbl>
+  <dgm:styleLbl name="dkBgShp">
+    <dgm:fillClrLst meth="repeat">
+      <a:schemeClr val="accent1">
+        <a:shade val="80000"/>
+      </a:schemeClr>
+    </dgm:fillClrLst>
+    <dgm:linClrLst meth="repeat">
+      <a:schemeClr val="accent1"/>
+    </dgm:linClrLst>
+    <dgm:effectClrLst/>
+    <dgm:txLinClrLst/>
+    <dgm:txFillClrLst meth="repeat">
+      <a:schemeClr val="lt1"/>
+    </dgm:txFillClrLst>
+    <dgm:txEffectClrLst/>
+  </dgm:styleLbl>
+  <dgm:styleLbl name="trBgShp">
+    <dgm:fillClrLst meth="repeat">
+      <a:schemeClr val="accent1">
+        <a:tint val="50000"/>
+        <a:alpha val="40000"/>
+      </a:schemeClr>
+    </dgm:fillClrLst>
+    <dgm:linClrLst meth="repeat">
+      <a:schemeClr val="accent1"/>
+    </dgm:linClrLst>
+    <dgm:effectClrLst/>
+    <dgm:txLinClrLst/>
+    <dgm:txFillClrLst meth="repeat">
+      <a:schemeClr val="lt1"/>
+    </dgm:txFillClrLst>
+    <dgm:txEffectClrLst/>
+  </dgm:styleLbl>
+  <dgm:styleLbl name="fgShp">
+    <dgm:fillClrLst meth="repeat">
+      <a:schemeClr val="accent1">
+        <a:tint val="60000"/>
+      </a:schemeClr>
+    </dgm:fillClrLst>
+    <dgm:linClrLst meth="repeat">
+      <a:schemeClr val="lt1"/>
+    </dgm:linClrLst>
+    <dgm:effectClrLst/>
+    <dgm:txLinClrLst/>
+    <dgm:txFillClrLst meth="repeat">
+      <a:schemeClr val="dk1"/>
+    </dgm:txFillClrLst>
+    <dgm:txEffectClrLst/>
+  </dgm:styleLbl>
+  <dgm:styleLbl name="revTx">
+    <dgm:fillClrLst meth="repeat">
+      <a:schemeClr val="lt1">
+        <a:alpha val="0"/>
+      </a:schemeClr>
+    </dgm:fillClrLst>
+    <dgm:linClrLst meth="repeat">
+      <a:schemeClr val="dk1">
+        <a:alpha val="0"/>
+      </a:schemeClr>
+    </dgm:linClrLst>
+    <dgm:effectClrLst/>
+    <dgm:txLinClrLst/>
+    <dgm:txFillClrLst meth="repeat">
+      <a:schemeClr val="tx1"/>
+    </dgm:txFillClrLst>
+    <dgm:txEffectClrLst/>
+  </dgm:styleLbl>
+</dgm:colorsDef>
+</file>
+
+<file path=ppt/diagrams/colors3.xml><?xml version="1.0" encoding="utf-8"?>
 <dgm:colorsDef xmlns:dgm="http://schemas.openxmlformats.org/drawingml/2006/diagram" xmlns:a="http://schemas.openxmlformats.org/drawingml/2006/main" uniqueId="urn:microsoft.com/office/officeart/2005/8/colors/accent1_2">
   <dgm:title val=""/>
   <dgm:desc val=""/>
@@ -3415,6 +4189,374 @@
     <dgm:cxn modelId="{A543F226-51E6-FE43-8708-07BE40C4EFF1}" type="presParOf" srcId="{F85BFA62-DC2F-6247-8FBE-EBA34C7CC153}" destId="{5370457B-7516-7641-90F0-121A7AB00A44}" srcOrd="3" destOrd="0" presId="urn:microsoft.com/office/officeart/2005/8/layout/hierarchy2"/>
     <dgm:cxn modelId="{4D1D0AAC-436B-B14F-8FBE-F29240BD8432}" type="presParOf" srcId="{5370457B-7516-7641-90F0-121A7AB00A44}" destId="{3C240EB4-6989-5244-92D3-913CDA8857DF}" srcOrd="0" destOrd="0" presId="urn:microsoft.com/office/officeart/2005/8/layout/hierarchy2"/>
     <dgm:cxn modelId="{8BB7FA06-FD05-3749-9CA8-064F1C7E4817}" type="presParOf" srcId="{5370457B-7516-7641-90F0-121A7AB00A44}" destId="{78F67930-C052-554D-B422-9582BE0AFCEA}" srcOrd="1" destOrd="0" presId="urn:microsoft.com/office/officeart/2005/8/layout/hierarchy2"/>
+  </dgm:cxnLst>
+  <dgm:bg/>
+  <dgm:whole/>
+  <dgm:extLst>
+    <a:ext uri="http://schemas.microsoft.com/office/drawing/2008/diagram">
+      <dsp:dataModelExt xmlns:dsp="http://schemas.microsoft.com/office/drawing/2008/diagram" relId="rId6" minVer="http://schemas.openxmlformats.org/drawingml/2006/diagram"/>
+    </a:ext>
+  </dgm:extLst>
+</dgm:dataModel>
+</file>
+
+<file path=ppt/diagrams/data3.xml><?xml version="1.0" encoding="utf-8"?>
+<dgm:dataModel xmlns:dgm="http://schemas.openxmlformats.org/drawingml/2006/diagram" xmlns:a="http://schemas.openxmlformats.org/drawingml/2006/main">
+  <dgm:ptLst>
+    <dgm:pt modelId="{CF6C7CD2-8AFF-9640-9BC3-67C657E52063}" type="doc">
+      <dgm:prSet loTypeId="urn:microsoft.com/office/officeart/2005/8/layout/StepDownProcess" loCatId="" qsTypeId="urn:microsoft.com/office/officeart/2005/8/quickstyle/simple1" qsCatId="simple" csTypeId="urn:microsoft.com/office/officeart/2005/8/colors/accent1_2" csCatId="accent1" phldr="1"/>
+      <dgm:spPr/>
+      <dgm:t>
+        <a:bodyPr/>
+        <a:lstStyle/>
+        <a:p>
+          <a:endParaRPr lang="en-US"/>
+        </a:p>
+      </dgm:t>
+    </dgm:pt>
+    <dgm:pt modelId="{CD58FF18-F178-F040-9717-D1437A081FAC}">
+      <dgm:prSet phldrT="[Text]"/>
+      <dgm:spPr/>
+      <dgm:t>
+        <a:bodyPr/>
+        <a:lstStyle/>
+        <a:p>
+          <a:r>
+            <a:rPr lang="en-US" dirty="0"/>
+            <a:t>Accuracy</a:t>
+          </a:r>
+        </a:p>
+      </dgm:t>
+    </dgm:pt>
+    <dgm:pt modelId="{FD0A129B-4CF6-B647-8E9B-D1F30C62ABF3}" type="parTrans" cxnId="{EFE91053-EEF7-8B4E-BBEA-B3D48E3F40A8}">
+      <dgm:prSet/>
+      <dgm:spPr/>
+      <dgm:t>
+        <a:bodyPr/>
+        <a:lstStyle/>
+        <a:p>
+          <a:endParaRPr lang="en-US"/>
+        </a:p>
+      </dgm:t>
+    </dgm:pt>
+    <dgm:pt modelId="{5B304AC6-7078-2D47-9A19-25459C593F79}" type="sibTrans" cxnId="{EFE91053-EEF7-8B4E-BBEA-B3D48E3F40A8}">
+      <dgm:prSet/>
+      <dgm:spPr/>
+      <dgm:t>
+        <a:bodyPr/>
+        <a:lstStyle/>
+        <a:p>
+          <a:endParaRPr lang="en-US"/>
+        </a:p>
+      </dgm:t>
+    </dgm:pt>
+    <dgm:pt modelId="{AA05433E-7DC1-1149-ACA1-35F9EA6951A1}">
+      <dgm:prSet phldrT="[Text]"/>
+      <dgm:spPr/>
+      <dgm:t>
+        <a:bodyPr/>
+        <a:lstStyle/>
+        <a:p>
+          <a:r>
+            <a:rPr lang="en-US" dirty="0"/>
+            <a:t>To track the model performance during training and ensure it doesn’t overfit </a:t>
+          </a:r>
+        </a:p>
+      </dgm:t>
+    </dgm:pt>
+    <dgm:pt modelId="{41D279C4-6BC7-8B40-B0CE-EB6B6A091959}" type="parTrans" cxnId="{9C3BCEDD-D262-9043-9315-39EF88CA5977}">
+      <dgm:prSet/>
+      <dgm:spPr/>
+      <dgm:t>
+        <a:bodyPr/>
+        <a:lstStyle/>
+        <a:p>
+          <a:endParaRPr lang="en-US"/>
+        </a:p>
+      </dgm:t>
+    </dgm:pt>
+    <dgm:pt modelId="{E8F88B77-513E-EA4A-8913-3E75FC9D1747}" type="sibTrans" cxnId="{9C3BCEDD-D262-9043-9315-39EF88CA5977}">
+      <dgm:prSet/>
+      <dgm:spPr/>
+      <dgm:t>
+        <a:bodyPr/>
+        <a:lstStyle/>
+        <a:p>
+          <a:endParaRPr lang="en-US"/>
+        </a:p>
+      </dgm:t>
+    </dgm:pt>
+    <dgm:pt modelId="{DCF7006E-1A46-464D-A57C-286DAB25C0A0}">
+      <dgm:prSet phldrT="[Text]"/>
+      <dgm:spPr/>
+      <dgm:t>
+        <a:bodyPr/>
+        <a:lstStyle/>
+        <a:p>
+          <a:r>
+            <a:rPr lang="en-US" dirty="0"/>
+            <a:t>F1 score</a:t>
+          </a:r>
+        </a:p>
+      </dgm:t>
+    </dgm:pt>
+    <dgm:pt modelId="{C7865C6A-86C9-9449-B01E-01D97DA2ECE7}" type="parTrans" cxnId="{A636D1AE-CC36-6643-AE58-2E6B9B1DDFDC}">
+      <dgm:prSet/>
+      <dgm:spPr/>
+      <dgm:t>
+        <a:bodyPr/>
+        <a:lstStyle/>
+        <a:p>
+          <a:endParaRPr lang="en-US"/>
+        </a:p>
+      </dgm:t>
+    </dgm:pt>
+    <dgm:pt modelId="{45FE0161-5D56-8B4D-A888-E3882D4540E4}" type="sibTrans" cxnId="{A636D1AE-CC36-6643-AE58-2E6B9B1DDFDC}">
+      <dgm:prSet/>
+      <dgm:spPr/>
+      <dgm:t>
+        <a:bodyPr/>
+        <a:lstStyle/>
+        <a:p>
+          <a:endParaRPr lang="en-US"/>
+        </a:p>
+      </dgm:t>
+    </dgm:pt>
+    <dgm:pt modelId="{6B476EF1-FEF0-BA40-8A71-8A616EBD12D0}">
+      <dgm:prSet phldrT="[Text]"/>
+      <dgm:spPr/>
+      <dgm:t>
+        <a:bodyPr/>
+        <a:lstStyle/>
+        <a:p>
+          <a:r>
+            <a:rPr lang="en-US" dirty="0"/>
+            <a:t>AUC</a:t>
+          </a:r>
+        </a:p>
+      </dgm:t>
+    </dgm:pt>
+    <dgm:pt modelId="{A20180AE-C3EE-6540-9BB3-117AF5D56596}" type="parTrans" cxnId="{BB0046C0-F1CF-1D46-9F60-73BC669BEB67}">
+      <dgm:prSet/>
+      <dgm:spPr/>
+      <dgm:t>
+        <a:bodyPr/>
+        <a:lstStyle/>
+        <a:p>
+          <a:endParaRPr lang="en-US"/>
+        </a:p>
+      </dgm:t>
+    </dgm:pt>
+    <dgm:pt modelId="{6D797389-6894-094E-B215-E9CF93B7F69C}" type="sibTrans" cxnId="{BB0046C0-F1CF-1D46-9F60-73BC669BEB67}">
+      <dgm:prSet/>
+      <dgm:spPr/>
+      <dgm:t>
+        <a:bodyPr/>
+        <a:lstStyle/>
+        <a:p>
+          <a:endParaRPr lang="en-US"/>
+        </a:p>
+      </dgm:t>
+    </dgm:pt>
+    <dgm:pt modelId="{CF105576-C225-D046-870E-553D3500BB08}">
+      <dgm:prSet phldrT="[Text]"/>
+      <dgm:spPr/>
+      <dgm:t>
+        <a:bodyPr/>
+        <a:lstStyle/>
+        <a:p>
+          <a:r>
+            <a:rPr lang="en-US" dirty="0"/>
+            <a:t>Sensitivity of the models to positive and negative class</a:t>
+          </a:r>
+        </a:p>
+      </dgm:t>
+    </dgm:pt>
+    <dgm:pt modelId="{0C6CF7B6-4D17-C64C-865E-155C95E2E08F}" type="parTrans" cxnId="{7F300125-39A5-5246-AB2C-5240CA03B052}">
+      <dgm:prSet/>
+      <dgm:spPr/>
+      <dgm:t>
+        <a:bodyPr/>
+        <a:lstStyle/>
+        <a:p>
+          <a:endParaRPr lang="en-US"/>
+        </a:p>
+      </dgm:t>
+    </dgm:pt>
+    <dgm:pt modelId="{95161748-2D36-EE44-8869-CB2C747B3F31}" type="sibTrans" cxnId="{7F300125-39A5-5246-AB2C-5240CA03B052}">
+      <dgm:prSet/>
+      <dgm:spPr/>
+      <dgm:t>
+        <a:bodyPr/>
+        <a:lstStyle/>
+        <a:p>
+          <a:endParaRPr lang="en-US"/>
+        </a:p>
+      </dgm:t>
+    </dgm:pt>
+    <dgm:pt modelId="{FC114F6F-5220-4644-B173-06D3B23B27EC}">
+      <dgm:prSet phldrT="[Text]"/>
+      <dgm:spPr/>
+      <dgm:t>
+        <a:bodyPr/>
+        <a:lstStyle/>
+        <a:p>
+          <a:r>
+            <a:rPr lang="en-US" dirty="0"/>
+            <a:t>Measure predictive performance using precision and recall</a:t>
+          </a:r>
+        </a:p>
+      </dgm:t>
+    </dgm:pt>
+    <dgm:pt modelId="{247248FD-370A-5F49-A4F1-CF824DED3D54}" type="sibTrans" cxnId="{BD0A2CFC-DE3C-2C4B-BB69-864F1386C36C}">
+      <dgm:prSet/>
+      <dgm:spPr/>
+      <dgm:t>
+        <a:bodyPr/>
+        <a:lstStyle/>
+        <a:p>
+          <a:endParaRPr lang="en-US"/>
+        </a:p>
+      </dgm:t>
+    </dgm:pt>
+    <dgm:pt modelId="{FF791A33-0BF0-5944-B04A-EF4EC5C49414}" type="parTrans" cxnId="{BD0A2CFC-DE3C-2C4B-BB69-864F1386C36C}">
+      <dgm:prSet/>
+      <dgm:spPr/>
+      <dgm:t>
+        <a:bodyPr/>
+        <a:lstStyle/>
+        <a:p>
+          <a:endParaRPr lang="en-US"/>
+        </a:p>
+      </dgm:t>
+    </dgm:pt>
+    <dgm:pt modelId="{BF687D93-E4AE-C648-B100-826A408C0082}" type="pres">
+      <dgm:prSet presAssocID="{CF6C7CD2-8AFF-9640-9BC3-67C657E52063}" presName="rootnode" presStyleCnt="0">
+        <dgm:presLayoutVars>
+          <dgm:chMax/>
+          <dgm:chPref/>
+          <dgm:dir/>
+          <dgm:animLvl val="lvl"/>
+        </dgm:presLayoutVars>
+      </dgm:prSet>
+      <dgm:spPr/>
+    </dgm:pt>
+    <dgm:pt modelId="{ED335E8D-1F76-934F-9052-2B76F42997FB}" type="pres">
+      <dgm:prSet presAssocID="{CD58FF18-F178-F040-9717-D1437A081FAC}" presName="composite" presStyleCnt="0"/>
+      <dgm:spPr/>
+    </dgm:pt>
+    <dgm:pt modelId="{62965B22-0351-614D-AE5B-926065C0F25C}" type="pres">
+      <dgm:prSet presAssocID="{CD58FF18-F178-F040-9717-D1437A081FAC}" presName="bentUpArrow1" presStyleLbl="alignImgPlace1" presStyleIdx="0" presStyleCnt="2"/>
+      <dgm:spPr/>
+    </dgm:pt>
+    <dgm:pt modelId="{256615CF-003B-6440-8ED6-A29768726260}" type="pres">
+      <dgm:prSet presAssocID="{CD58FF18-F178-F040-9717-D1437A081FAC}" presName="ParentText" presStyleLbl="node1" presStyleIdx="0" presStyleCnt="3">
+        <dgm:presLayoutVars>
+          <dgm:chMax val="1"/>
+          <dgm:chPref val="1"/>
+          <dgm:bulletEnabled val="1"/>
+        </dgm:presLayoutVars>
+      </dgm:prSet>
+      <dgm:spPr/>
+    </dgm:pt>
+    <dgm:pt modelId="{F73F3A15-A373-BC49-938F-5BFC9E8F0751}" type="pres">
+      <dgm:prSet presAssocID="{CD58FF18-F178-F040-9717-D1437A081FAC}" presName="ChildText" presStyleLbl="revTx" presStyleIdx="0" presStyleCnt="3" custScaleX="301670" custScaleY="119785" custLinFactX="4694" custLinFactNeighborX="100000" custLinFactNeighborY="-6671">
+        <dgm:presLayoutVars>
+          <dgm:chMax val="0"/>
+          <dgm:chPref val="0"/>
+          <dgm:bulletEnabled val="1"/>
+        </dgm:presLayoutVars>
+      </dgm:prSet>
+      <dgm:spPr/>
+    </dgm:pt>
+    <dgm:pt modelId="{171B373C-724E-8F48-A323-20C9A50CDCF7}" type="pres">
+      <dgm:prSet presAssocID="{5B304AC6-7078-2D47-9A19-25459C593F79}" presName="sibTrans" presStyleCnt="0"/>
+      <dgm:spPr/>
+    </dgm:pt>
+    <dgm:pt modelId="{B252F81B-363D-EC4B-B4EB-B6DFF927DA6A}" type="pres">
+      <dgm:prSet presAssocID="{DCF7006E-1A46-464D-A57C-286DAB25C0A0}" presName="composite" presStyleCnt="0"/>
+      <dgm:spPr/>
+    </dgm:pt>
+    <dgm:pt modelId="{73F02C81-CDAF-C04F-98A6-A903F4647334}" type="pres">
+      <dgm:prSet presAssocID="{DCF7006E-1A46-464D-A57C-286DAB25C0A0}" presName="bentUpArrow1" presStyleLbl="alignImgPlace1" presStyleIdx="1" presStyleCnt="2"/>
+      <dgm:spPr/>
+    </dgm:pt>
+    <dgm:pt modelId="{78700132-1C9F-5A43-980E-F615294905A9}" type="pres">
+      <dgm:prSet presAssocID="{DCF7006E-1A46-464D-A57C-286DAB25C0A0}" presName="ParentText" presStyleLbl="node1" presStyleIdx="1" presStyleCnt="3">
+        <dgm:presLayoutVars>
+          <dgm:chMax val="1"/>
+          <dgm:chPref val="1"/>
+          <dgm:bulletEnabled val="1"/>
+        </dgm:presLayoutVars>
+      </dgm:prSet>
+      <dgm:spPr/>
+    </dgm:pt>
+    <dgm:pt modelId="{0F980381-2203-D148-9CD7-689B49AB9212}" type="pres">
+      <dgm:prSet presAssocID="{DCF7006E-1A46-464D-A57C-286DAB25C0A0}" presName="ChildText" presStyleLbl="revTx" presStyleIdx="1" presStyleCnt="3" custScaleX="366025" custScaleY="148554" custLinFactX="33461" custLinFactNeighborX="100000" custLinFactNeighborY="-4325">
+        <dgm:presLayoutVars>
+          <dgm:chMax val="0"/>
+          <dgm:chPref val="0"/>
+          <dgm:bulletEnabled val="1"/>
+        </dgm:presLayoutVars>
+      </dgm:prSet>
+      <dgm:spPr/>
+    </dgm:pt>
+    <dgm:pt modelId="{3F1F4502-CB12-8941-9EBB-64819B887A11}" type="pres">
+      <dgm:prSet presAssocID="{45FE0161-5D56-8B4D-A888-E3882D4540E4}" presName="sibTrans" presStyleCnt="0"/>
+      <dgm:spPr/>
+    </dgm:pt>
+    <dgm:pt modelId="{F758494A-6CC7-FE47-B2B8-B791C23510EC}" type="pres">
+      <dgm:prSet presAssocID="{6B476EF1-FEF0-BA40-8A71-8A616EBD12D0}" presName="composite" presStyleCnt="0"/>
+      <dgm:spPr/>
+    </dgm:pt>
+    <dgm:pt modelId="{06D16CDD-F9D4-DB43-905C-67171D53A5ED}" type="pres">
+      <dgm:prSet presAssocID="{6B476EF1-FEF0-BA40-8A71-8A616EBD12D0}" presName="ParentText" presStyleLbl="node1" presStyleIdx="2" presStyleCnt="3">
+        <dgm:presLayoutVars>
+          <dgm:chMax val="1"/>
+          <dgm:chPref val="1"/>
+          <dgm:bulletEnabled val="1"/>
+        </dgm:presLayoutVars>
+      </dgm:prSet>
+      <dgm:spPr/>
+    </dgm:pt>
+    <dgm:pt modelId="{48E0E32F-9D9F-4C47-BA98-06F7149C48AA}" type="pres">
+      <dgm:prSet presAssocID="{6B476EF1-FEF0-BA40-8A71-8A616EBD12D0}" presName="FinalChildText" presStyleLbl="revTx" presStyleIdx="2" presStyleCnt="3" custScaleX="271128" custScaleY="156971" custLinFactNeighborX="77723" custLinFactNeighborY="-2669">
+        <dgm:presLayoutVars>
+          <dgm:chMax val="0"/>
+          <dgm:chPref val="0"/>
+          <dgm:bulletEnabled val="1"/>
+        </dgm:presLayoutVars>
+      </dgm:prSet>
+      <dgm:spPr/>
+    </dgm:pt>
+  </dgm:ptLst>
+  <dgm:cxnLst>
+    <dgm:cxn modelId="{BF027816-2B68-BE47-85DA-6A3E813097CF}" type="presOf" srcId="{DCF7006E-1A46-464D-A57C-286DAB25C0A0}" destId="{78700132-1C9F-5A43-980E-F615294905A9}" srcOrd="0" destOrd="0" presId="urn:microsoft.com/office/officeart/2005/8/layout/StepDownProcess"/>
+    <dgm:cxn modelId="{17CBB123-1978-644F-9BFE-DB210FB020A3}" type="presOf" srcId="{AA05433E-7DC1-1149-ACA1-35F9EA6951A1}" destId="{F73F3A15-A373-BC49-938F-5BFC9E8F0751}" srcOrd="0" destOrd="0" presId="urn:microsoft.com/office/officeart/2005/8/layout/StepDownProcess"/>
+    <dgm:cxn modelId="{7F300125-39A5-5246-AB2C-5240CA03B052}" srcId="{6B476EF1-FEF0-BA40-8A71-8A616EBD12D0}" destId="{CF105576-C225-D046-870E-553D3500BB08}" srcOrd="0" destOrd="0" parTransId="{0C6CF7B6-4D17-C64C-865E-155C95E2E08F}" sibTransId="{95161748-2D36-EE44-8869-CB2C747B3F31}"/>
+    <dgm:cxn modelId="{2FF72A28-6F31-614D-BCE9-529D0BBA3CFB}" type="presOf" srcId="{6B476EF1-FEF0-BA40-8A71-8A616EBD12D0}" destId="{06D16CDD-F9D4-DB43-905C-67171D53A5ED}" srcOrd="0" destOrd="0" presId="urn:microsoft.com/office/officeart/2005/8/layout/StepDownProcess"/>
+    <dgm:cxn modelId="{EFE91053-EEF7-8B4E-BBEA-B3D48E3F40A8}" srcId="{CF6C7CD2-8AFF-9640-9BC3-67C657E52063}" destId="{CD58FF18-F178-F040-9717-D1437A081FAC}" srcOrd="0" destOrd="0" parTransId="{FD0A129B-4CF6-B647-8E9B-D1F30C62ABF3}" sibTransId="{5B304AC6-7078-2D47-9A19-25459C593F79}"/>
+    <dgm:cxn modelId="{6EE9896C-06F3-7945-B4E8-11C26F363F5A}" type="presOf" srcId="{CD58FF18-F178-F040-9717-D1437A081FAC}" destId="{256615CF-003B-6440-8ED6-A29768726260}" srcOrd="0" destOrd="0" presId="urn:microsoft.com/office/officeart/2005/8/layout/StepDownProcess"/>
+    <dgm:cxn modelId="{FC4D91A8-1C95-CD46-8936-D9AA157C170F}" type="presOf" srcId="{CF105576-C225-D046-870E-553D3500BB08}" destId="{48E0E32F-9D9F-4C47-BA98-06F7149C48AA}" srcOrd="0" destOrd="0" presId="urn:microsoft.com/office/officeart/2005/8/layout/StepDownProcess"/>
+    <dgm:cxn modelId="{A636D1AE-CC36-6643-AE58-2E6B9B1DDFDC}" srcId="{CF6C7CD2-8AFF-9640-9BC3-67C657E52063}" destId="{DCF7006E-1A46-464D-A57C-286DAB25C0A0}" srcOrd="1" destOrd="0" parTransId="{C7865C6A-86C9-9449-B01E-01D97DA2ECE7}" sibTransId="{45FE0161-5D56-8B4D-A888-E3882D4540E4}"/>
+    <dgm:cxn modelId="{92D514B9-F77B-D74B-8FF2-A7EBB50399C0}" type="presOf" srcId="{CF6C7CD2-8AFF-9640-9BC3-67C657E52063}" destId="{BF687D93-E4AE-C648-B100-826A408C0082}" srcOrd="0" destOrd="0" presId="urn:microsoft.com/office/officeart/2005/8/layout/StepDownProcess"/>
+    <dgm:cxn modelId="{BB0046C0-F1CF-1D46-9F60-73BC669BEB67}" srcId="{CF6C7CD2-8AFF-9640-9BC3-67C657E52063}" destId="{6B476EF1-FEF0-BA40-8A71-8A616EBD12D0}" srcOrd="2" destOrd="0" parTransId="{A20180AE-C3EE-6540-9BB3-117AF5D56596}" sibTransId="{6D797389-6894-094E-B215-E9CF93B7F69C}"/>
+    <dgm:cxn modelId="{9C3BCEDD-D262-9043-9315-39EF88CA5977}" srcId="{CD58FF18-F178-F040-9717-D1437A081FAC}" destId="{AA05433E-7DC1-1149-ACA1-35F9EA6951A1}" srcOrd="0" destOrd="0" parTransId="{41D279C4-6BC7-8B40-B0CE-EB6B6A091959}" sibTransId="{E8F88B77-513E-EA4A-8913-3E75FC9D1747}"/>
+    <dgm:cxn modelId="{491B92F7-0424-C444-ABE5-1899A8945B8C}" type="presOf" srcId="{FC114F6F-5220-4644-B173-06D3B23B27EC}" destId="{0F980381-2203-D148-9CD7-689B49AB9212}" srcOrd="0" destOrd="0" presId="urn:microsoft.com/office/officeart/2005/8/layout/StepDownProcess"/>
+    <dgm:cxn modelId="{BD0A2CFC-DE3C-2C4B-BB69-864F1386C36C}" srcId="{DCF7006E-1A46-464D-A57C-286DAB25C0A0}" destId="{FC114F6F-5220-4644-B173-06D3B23B27EC}" srcOrd="0" destOrd="0" parTransId="{FF791A33-0BF0-5944-B04A-EF4EC5C49414}" sibTransId="{247248FD-370A-5F49-A4F1-CF824DED3D54}"/>
+    <dgm:cxn modelId="{756C2875-6F40-3346-B570-0DFB1FD495D4}" type="presParOf" srcId="{BF687D93-E4AE-C648-B100-826A408C0082}" destId="{ED335E8D-1F76-934F-9052-2B76F42997FB}" srcOrd="0" destOrd="0" presId="urn:microsoft.com/office/officeart/2005/8/layout/StepDownProcess"/>
+    <dgm:cxn modelId="{94BC0CFD-3FE2-E04C-8729-67FA8DEA9DF5}" type="presParOf" srcId="{ED335E8D-1F76-934F-9052-2B76F42997FB}" destId="{62965B22-0351-614D-AE5B-926065C0F25C}" srcOrd="0" destOrd="0" presId="urn:microsoft.com/office/officeart/2005/8/layout/StepDownProcess"/>
+    <dgm:cxn modelId="{26C05482-1620-BA4D-AA00-C3FB972E52DE}" type="presParOf" srcId="{ED335E8D-1F76-934F-9052-2B76F42997FB}" destId="{256615CF-003B-6440-8ED6-A29768726260}" srcOrd="1" destOrd="0" presId="urn:microsoft.com/office/officeart/2005/8/layout/StepDownProcess"/>
+    <dgm:cxn modelId="{6E8A9DE8-9BE6-024F-9DF4-9FD3322EA9D4}" type="presParOf" srcId="{ED335E8D-1F76-934F-9052-2B76F42997FB}" destId="{F73F3A15-A373-BC49-938F-5BFC9E8F0751}" srcOrd="2" destOrd="0" presId="urn:microsoft.com/office/officeart/2005/8/layout/StepDownProcess"/>
+    <dgm:cxn modelId="{EF0ECF53-2AC2-B14B-AA08-D8FD13C89379}" type="presParOf" srcId="{BF687D93-E4AE-C648-B100-826A408C0082}" destId="{171B373C-724E-8F48-A323-20C9A50CDCF7}" srcOrd="1" destOrd="0" presId="urn:microsoft.com/office/officeart/2005/8/layout/StepDownProcess"/>
+    <dgm:cxn modelId="{BCE074CC-9D5B-C146-9ED8-CCC52B980BD9}" type="presParOf" srcId="{BF687D93-E4AE-C648-B100-826A408C0082}" destId="{B252F81B-363D-EC4B-B4EB-B6DFF927DA6A}" srcOrd="2" destOrd="0" presId="urn:microsoft.com/office/officeart/2005/8/layout/StepDownProcess"/>
+    <dgm:cxn modelId="{C26F3DEE-688B-C746-A30A-136841C8860C}" type="presParOf" srcId="{B252F81B-363D-EC4B-B4EB-B6DFF927DA6A}" destId="{73F02C81-CDAF-C04F-98A6-A903F4647334}" srcOrd="0" destOrd="0" presId="urn:microsoft.com/office/officeart/2005/8/layout/StepDownProcess"/>
+    <dgm:cxn modelId="{A97EC291-1B75-FE4C-A275-000B9C78DC86}" type="presParOf" srcId="{B252F81B-363D-EC4B-B4EB-B6DFF927DA6A}" destId="{78700132-1C9F-5A43-980E-F615294905A9}" srcOrd="1" destOrd="0" presId="urn:microsoft.com/office/officeart/2005/8/layout/StepDownProcess"/>
+    <dgm:cxn modelId="{EA53F78A-C441-3546-885F-E38153D17CE0}" type="presParOf" srcId="{B252F81B-363D-EC4B-B4EB-B6DFF927DA6A}" destId="{0F980381-2203-D148-9CD7-689B49AB9212}" srcOrd="2" destOrd="0" presId="urn:microsoft.com/office/officeart/2005/8/layout/StepDownProcess"/>
+    <dgm:cxn modelId="{C643F803-B493-4449-9500-8D0BC4B80485}" type="presParOf" srcId="{BF687D93-E4AE-C648-B100-826A408C0082}" destId="{3F1F4502-CB12-8941-9EBB-64819B887A11}" srcOrd="3" destOrd="0" presId="urn:microsoft.com/office/officeart/2005/8/layout/StepDownProcess"/>
+    <dgm:cxn modelId="{90F05118-EF9E-2F4B-A6F9-74EFB7621D6E}" type="presParOf" srcId="{BF687D93-E4AE-C648-B100-826A408C0082}" destId="{F758494A-6CC7-FE47-B2B8-B791C23510EC}" srcOrd="4" destOrd="0" presId="urn:microsoft.com/office/officeart/2005/8/layout/StepDownProcess"/>
+    <dgm:cxn modelId="{6C3A7F43-84C4-1F40-8C0D-D370FBF768AC}" type="presParOf" srcId="{F758494A-6CC7-FE47-B2B8-B791C23510EC}" destId="{06D16CDD-F9D4-DB43-905C-67171D53A5ED}" srcOrd="0" destOrd="0" presId="urn:microsoft.com/office/officeart/2005/8/layout/StepDownProcess"/>
+    <dgm:cxn modelId="{CB1FD35E-B447-4F40-9C56-C07B522D19CA}" type="presParOf" srcId="{F758494A-6CC7-FE47-B2B8-B791C23510EC}" destId="{48E0E32F-9D9F-4C47-BA98-06F7149C48AA}" srcOrd="1" destOrd="0" presId="urn:microsoft.com/office/officeart/2005/8/layout/StepDownProcess"/>
   </dgm:cxnLst>
   <dgm:bg/>
   <dgm:whole/>
@@ -5025,6 +6167,544 @@
 </dsp:drawing>
 </file>
 
+<file path=ppt/diagrams/drawing3.xml><?xml version="1.0" encoding="utf-8"?>
+<dsp:drawing xmlns:dgm="http://schemas.openxmlformats.org/drawingml/2006/diagram" xmlns:dsp="http://schemas.microsoft.com/office/drawing/2008/diagram" xmlns:a="http://schemas.openxmlformats.org/drawingml/2006/main">
+  <dsp:spTree>
+    <dsp:nvGrpSpPr>
+      <dsp:cNvPr id="0" name=""/>
+      <dsp:cNvGrpSpPr/>
+    </dsp:nvGrpSpPr>
+    <dsp:grpSpPr/>
+    <dsp:sp modelId="{62965B22-0351-614D-AE5B-926065C0F25C}">
+      <dsp:nvSpPr>
+        <dsp:cNvPr id="0" name=""/>
+        <dsp:cNvSpPr/>
+      </dsp:nvSpPr>
+      <dsp:spPr>
+        <a:xfrm rot="5400000">
+          <a:off x="1512536" y="1141432"/>
+          <a:ext cx="1011941" cy="1152059"/>
+        </a:xfrm>
+        <a:prstGeom prst="bentUpArrow">
+          <a:avLst>
+            <a:gd name="adj1" fmla="val 32840"/>
+            <a:gd name="adj2" fmla="val 25000"/>
+            <a:gd name="adj3" fmla="val 35780"/>
+          </a:avLst>
+        </a:prstGeom>
+        <a:solidFill>
+          <a:schemeClr val="accent1">
+            <a:tint val="50000"/>
+            <a:hueOff val="0"/>
+            <a:satOff val="0"/>
+            <a:lumOff val="0"/>
+            <a:alphaOff val="0"/>
+          </a:schemeClr>
+        </a:solidFill>
+        <a:ln w="12700" cap="flat" cmpd="sng" algn="ctr">
+          <a:solidFill>
+            <a:schemeClr val="lt1">
+              <a:hueOff val="0"/>
+              <a:satOff val="0"/>
+              <a:lumOff val="0"/>
+              <a:alphaOff val="0"/>
+            </a:schemeClr>
+          </a:solidFill>
+          <a:prstDash val="solid"/>
+          <a:miter lim="800000"/>
+        </a:ln>
+        <a:effectLst/>
+      </dsp:spPr>
+      <dsp:style>
+        <a:lnRef idx="2">
+          <a:scrgbClr r="0" g="0" b="0"/>
+        </a:lnRef>
+        <a:fillRef idx="1">
+          <a:scrgbClr r="0" g="0" b="0"/>
+        </a:fillRef>
+        <a:effectRef idx="0">
+          <a:scrgbClr r="0" g="0" b="0"/>
+        </a:effectRef>
+        <a:fontRef idx="minor"/>
+      </dsp:style>
+    </dsp:sp>
+    <dsp:sp modelId="{256615CF-003B-6440-8ED6-A29768726260}">
+      <dsp:nvSpPr>
+        <dsp:cNvPr id="0" name=""/>
+        <dsp:cNvSpPr/>
+      </dsp:nvSpPr>
+      <dsp:spPr>
+        <a:xfrm>
+          <a:off x="1244433" y="19675"/>
+          <a:ext cx="1703513" cy="1192403"/>
+        </a:xfrm>
+        <a:prstGeom prst="roundRect">
+          <a:avLst>
+            <a:gd name="adj" fmla="val 16670"/>
+          </a:avLst>
+        </a:prstGeom>
+        <a:solidFill>
+          <a:schemeClr val="accent1">
+            <a:hueOff val="0"/>
+            <a:satOff val="0"/>
+            <a:lumOff val="0"/>
+            <a:alphaOff val="0"/>
+          </a:schemeClr>
+        </a:solidFill>
+        <a:ln w="12700" cap="flat" cmpd="sng" algn="ctr">
+          <a:solidFill>
+            <a:schemeClr val="lt1">
+              <a:hueOff val="0"/>
+              <a:satOff val="0"/>
+              <a:lumOff val="0"/>
+              <a:alphaOff val="0"/>
+            </a:schemeClr>
+          </a:solidFill>
+          <a:prstDash val="solid"/>
+          <a:miter lim="800000"/>
+        </a:ln>
+        <a:effectLst/>
+      </dsp:spPr>
+      <dsp:style>
+        <a:lnRef idx="2">
+          <a:scrgbClr r="0" g="0" b="0"/>
+        </a:lnRef>
+        <a:fillRef idx="1">
+          <a:scrgbClr r="0" g="0" b="0"/>
+        </a:fillRef>
+        <a:effectRef idx="0">
+          <a:scrgbClr r="0" g="0" b="0"/>
+        </a:effectRef>
+        <a:fontRef idx="minor">
+          <a:schemeClr val="lt1"/>
+        </a:fontRef>
+      </dsp:style>
+      <dsp:txBody>
+        <a:bodyPr spcFirstLastPara="0" vert="horz" wrap="square" lIns="110490" tIns="110490" rIns="110490" bIns="110490" numCol="1" spcCol="1270" anchor="ctr" anchorCtr="0">
+          <a:noAutofit/>
+        </a:bodyPr>
+        <a:lstStyle/>
+        <a:p>
+          <a:pPr marL="0" lvl="0" indent="0" algn="ctr" defTabSz="1289050">
+            <a:lnSpc>
+              <a:spcPct val="90000"/>
+            </a:lnSpc>
+            <a:spcBef>
+              <a:spcPct val="0"/>
+            </a:spcBef>
+            <a:spcAft>
+              <a:spcPct val="35000"/>
+            </a:spcAft>
+            <a:buNone/>
+          </a:pPr>
+          <a:r>
+            <a:rPr lang="en-US" sz="2900" kern="1200" dirty="0"/>
+            <a:t>Accuracy</a:t>
+          </a:r>
+        </a:p>
+      </dsp:txBody>
+      <dsp:txXfrm>
+        <a:off x="1302652" y="77894"/>
+        <a:ext cx="1587075" cy="1075965"/>
+      </dsp:txXfrm>
+    </dsp:sp>
+    <dsp:sp modelId="{F73F3A15-A373-BC49-938F-5BFC9E8F0751}">
+      <dsp:nvSpPr>
+        <dsp:cNvPr id="0" name=""/>
+        <dsp:cNvSpPr/>
+      </dsp:nvSpPr>
+      <dsp:spPr>
+        <a:xfrm>
+          <a:off x="2995758" y="0"/>
+          <a:ext cx="3737610" cy="1154431"/>
+        </a:xfrm>
+        <a:prstGeom prst="rect">
+          <a:avLst/>
+        </a:prstGeom>
+        <a:noFill/>
+        <a:ln>
+          <a:noFill/>
+        </a:ln>
+        <a:effectLst/>
+      </dsp:spPr>
+      <dsp:style>
+        <a:lnRef idx="0">
+          <a:scrgbClr r="0" g="0" b="0"/>
+        </a:lnRef>
+        <a:fillRef idx="0">
+          <a:scrgbClr r="0" g="0" b="0"/>
+        </a:fillRef>
+        <a:effectRef idx="0">
+          <a:scrgbClr r="0" g="0" b="0"/>
+        </a:effectRef>
+        <a:fontRef idx="minor"/>
+      </dsp:style>
+      <dsp:txBody>
+        <a:bodyPr spcFirstLastPara="0" vert="horz" wrap="square" lIns="106680" tIns="106680" rIns="106680" bIns="106680" numCol="1" spcCol="1270" anchor="ctr" anchorCtr="0">
+          <a:noAutofit/>
+        </a:bodyPr>
+        <a:lstStyle/>
+        <a:p>
+          <a:pPr marL="228600" lvl="1" indent="-228600" algn="l" defTabSz="977900">
+            <a:lnSpc>
+              <a:spcPct val="90000"/>
+            </a:lnSpc>
+            <a:spcBef>
+              <a:spcPct val="0"/>
+            </a:spcBef>
+            <a:spcAft>
+              <a:spcPct val="15000"/>
+            </a:spcAft>
+            <a:buChar char="•"/>
+          </a:pPr>
+          <a:r>
+            <a:rPr lang="en-US" sz="2200" kern="1200" dirty="0"/>
+            <a:t>To track the model performance during training and ensure it doesn’t overfit </a:t>
+          </a:r>
+        </a:p>
+      </dsp:txBody>
+      <dsp:txXfrm>
+        <a:off x="2995758" y="0"/>
+        <a:ext cx="3737610" cy="1154431"/>
+      </dsp:txXfrm>
+    </dsp:sp>
+    <dsp:sp modelId="{73F02C81-CDAF-C04F-98A6-A903F4647334}">
+      <dsp:nvSpPr>
+        <dsp:cNvPr id="0" name=""/>
+        <dsp:cNvSpPr/>
+      </dsp:nvSpPr>
+      <dsp:spPr>
+        <a:xfrm rot="5400000">
+          <a:off x="3524602" y="2601143"/>
+          <a:ext cx="1011941" cy="1152059"/>
+        </a:xfrm>
+        <a:prstGeom prst="bentUpArrow">
+          <a:avLst>
+            <a:gd name="adj1" fmla="val 32840"/>
+            <a:gd name="adj2" fmla="val 25000"/>
+            <a:gd name="adj3" fmla="val 35780"/>
+          </a:avLst>
+        </a:prstGeom>
+        <a:solidFill>
+          <a:schemeClr val="accent1">
+            <a:tint val="50000"/>
+            <a:hueOff val="0"/>
+            <a:satOff val="0"/>
+            <a:lumOff val="0"/>
+            <a:alphaOff val="0"/>
+          </a:schemeClr>
+        </a:solidFill>
+        <a:ln w="12700" cap="flat" cmpd="sng" algn="ctr">
+          <a:solidFill>
+            <a:schemeClr val="lt1">
+              <a:hueOff val="0"/>
+              <a:satOff val="0"/>
+              <a:lumOff val="0"/>
+              <a:alphaOff val="0"/>
+            </a:schemeClr>
+          </a:solidFill>
+          <a:prstDash val="solid"/>
+          <a:miter lim="800000"/>
+        </a:ln>
+        <a:effectLst/>
+      </dsp:spPr>
+      <dsp:style>
+        <a:lnRef idx="2">
+          <a:scrgbClr r="0" g="0" b="0"/>
+        </a:lnRef>
+        <a:fillRef idx="1">
+          <a:scrgbClr r="0" g="0" b="0"/>
+        </a:fillRef>
+        <a:effectRef idx="0">
+          <a:scrgbClr r="0" g="0" b="0"/>
+        </a:effectRef>
+        <a:fontRef idx="minor"/>
+      </dsp:style>
+    </dsp:sp>
+    <dsp:sp modelId="{78700132-1C9F-5A43-980E-F615294905A9}">
+      <dsp:nvSpPr>
+        <dsp:cNvPr id="0" name=""/>
+        <dsp:cNvSpPr/>
+      </dsp:nvSpPr>
+      <dsp:spPr>
+        <a:xfrm>
+          <a:off x="3256499" y="1479386"/>
+          <a:ext cx="1703513" cy="1192403"/>
+        </a:xfrm>
+        <a:prstGeom prst="roundRect">
+          <a:avLst>
+            <a:gd name="adj" fmla="val 16670"/>
+          </a:avLst>
+        </a:prstGeom>
+        <a:solidFill>
+          <a:schemeClr val="accent1">
+            <a:hueOff val="0"/>
+            <a:satOff val="0"/>
+            <a:lumOff val="0"/>
+            <a:alphaOff val="0"/>
+          </a:schemeClr>
+        </a:solidFill>
+        <a:ln w="12700" cap="flat" cmpd="sng" algn="ctr">
+          <a:solidFill>
+            <a:schemeClr val="lt1">
+              <a:hueOff val="0"/>
+              <a:satOff val="0"/>
+              <a:lumOff val="0"/>
+              <a:alphaOff val="0"/>
+            </a:schemeClr>
+          </a:solidFill>
+          <a:prstDash val="solid"/>
+          <a:miter lim="800000"/>
+        </a:ln>
+        <a:effectLst/>
+      </dsp:spPr>
+      <dsp:style>
+        <a:lnRef idx="2">
+          <a:scrgbClr r="0" g="0" b="0"/>
+        </a:lnRef>
+        <a:fillRef idx="1">
+          <a:scrgbClr r="0" g="0" b="0"/>
+        </a:fillRef>
+        <a:effectRef idx="0">
+          <a:scrgbClr r="0" g="0" b="0"/>
+        </a:effectRef>
+        <a:fontRef idx="minor">
+          <a:schemeClr val="lt1"/>
+        </a:fontRef>
+      </dsp:style>
+      <dsp:txBody>
+        <a:bodyPr spcFirstLastPara="0" vert="horz" wrap="square" lIns="110490" tIns="110490" rIns="110490" bIns="110490" numCol="1" spcCol="1270" anchor="ctr" anchorCtr="0">
+          <a:noAutofit/>
+        </a:bodyPr>
+        <a:lstStyle/>
+        <a:p>
+          <a:pPr marL="0" lvl="0" indent="0" algn="ctr" defTabSz="1289050">
+            <a:lnSpc>
+              <a:spcPct val="90000"/>
+            </a:lnSpc>
+            <a:spcBef>
+              <a:spcPct val="0"/>
+            </a:spcBef>
+            <a:spcAft>
+              <a:spcPct val="35000"/>
+            </a:spcAft>
+            <a:buNone/>
+          </a:pPr>
+          <a:r>
+            <a:rPr lang="en-US" sz="2900" kern="1200" dirty="0"/>
+            <a:t>F1 score</a:t>
+          </a:r>
+        </a:p>
+      </dsp:txBody>
+      <dsp:txXfrm>
+        <a:off x="3314718" y="1537605"/>
+        <a:ext cx="1587075" cy="1075965"/>
+      </dsp:txXfrm>
+    </dsp:sp>
+    <dsp:sp modelId="{0F980381-2203-D148-9CD7-689B49AB9212}">
+      <dsp:nvSpPr>
+        <dsp:cNvPr id="0" name=""/>
+        <dsp:cNvSpPr/>
+      </dsp:nvSpPr>
+      <dsp:spPr>
+        <a:xfrm>
+          <a:off x="4965569" y="1317456"/>
+          <a:ext cx="4534951" cy="1431694"/>
+        </a:xfrm>
+        <a:prstGeom prst="rect">
+          <a:avLst/>
+        </a:prstGeom>
+        <a:noFill/>
+        <a:ln>
+          <a:noFill/>
+        </a:ln>
+        <a:effectLst/>
+      </dsp:spPr>
+      <dsp:style>
+        <a:lnRef idx="0">
+          <a:scrgbClr r="0" g="0" b="0"/>
+        </a:lnRef>
+        <a:fillRef idx="0">
+          <a:scrgbClr r="0" g="0" b="0"/>
+        </a:fillRef>
+        <a:effectRef idx="0">
+          <a:scrgbClr r="0" g="0" b="0"/>
+        </a:effectRef>
+        <a:fontRef idx="minor"/>
+      </dsp:style>
+      <dsp:txBody>
+        <a:bodyPr spcFirstLastPara="0" vert="horz" wrap="square" lIns="106680" tIns="106680" rIns="106680" bIns="106680" numCol="1" spcCol="1270" anchor="ctr" anchorCtr="0">
+          <a:noAutofit/>
+        </a:bodyPr>
+        <a:lstStyle/>
+        <a:p>
+          <a:pPr marL="228600" lvl="1" indent="-228600" algn="l" defTabSz="977900">
+            <a:lnSpc>
+              <a:spcPct val="90000"/>
+            </a:lnSpc>
+            <a:spcBef>
+              <a:spcPct val="0"/>
+            </a:spcBef>
+            <a:spcAft>
+              <a:spcPct val="15000"/>
+            </a:spcAft>
+            <a:buChar char="•"/>
+          </a:pPr>
+          <a:r>
+            <a:rPr lang="en-US" sz="2200" kern="1200" dirty="0"/>
+            <a:t>Measure predictive performance using precision and recall</a:t>
+          </a:r>
+        </a:p>
+      </dsp:txBody>
+      <dsp:txXfrm>
+        <a:off x="4965569" y="1317456"/>
+        <a:ext cx="4534951" cy="1431694"/>
+      </dsp:txXfrm>
+    </dsp:sp>
+    <dsp:sp modelId="{06D16CDD-F9D4-DB43-905C-67171D53A5ED}">
+      <dsp:nvSpPr>
+        <dsp:cNvPr id="0" name=""/>
+        <dsp:cNvSpPr/>
+      </dsp:nvSpPr>
+      <dsp:spPr>
+        <a:xfrm>
+          <a:off x="5268565" y="2979656"/>
+          <a:ext cx="1703513" cy="1192403"/>
+        </a:xfrm>
+        <a:prstGeom prst="roundRect">
+          <a:avLst>
+            <a:gd name="adj" fmla="val 16670"/>
+          </a:avLst>
+        </a:prstGeom>
+        <a:solidFill>
+          <a:schemeClr val="accent1">
+            <a:hueOff val="0"/>
+            <a:satOff val="0"/>
+            <a:lumOff val="0"/>
+            <a:alphaOff val="0"/>
+          </a:schemeClr>
+        </a:solidFill>
+        <a:ln w="12700" cap="flat" cmpd="sng" algn="ctr">
+          <a:solidFill>
+            <a:schemeClr val="lt1">
+              <a:hueOff val="0"/>
+              <a:satOff val="0"/>
+              <a:lumOff val="0"/>
+              <a:alphaOff val="0"/>
+            </a:schemeClr>
+          </a:solidFill>
+          <a:prstDash val="solid"/>
+          <a:miter lim="800000"/>
+        </a:ln>
+        <a:effectLst/>
+      </dsp:spPr>
+      <dsp:style>
+        <a:lnRef idx="2">
+          <a:scrgbClr r="0" g="0" b="0"/>
+        </a:lnRef>
+        <a:fillRef idx="1">
+          <a:scrgbClr r="0" g="0" b="0"/>
+        </a:fillRef>
+        <a:effectRef idx="0">
+          <a:scrgbClr r="0" g="0" b="0"/>
+        </a:effectRef>
+        <a:fontRef idx="minor">
+          <a:schemeClr val="lt1"/>
+        </a:fontRef>
+      </dsp:style>
+      <dsp:txBody>
+        <a:bodyPr spcFirstLastPara="0" vert="horz" wrap="square" lIns="110490" tIns="110490" rIns="110490" bIns="110490" numCol="1" spcCol="1270" anchor="ctr" anchorCtr="0">
+          <a:noAutofit/>
+        </a:bodyPr>
+        <a:lstStyle/>
+        <a:p>
+          <a:pPr marL="0" lvl="0" indent="0" algn="ctr" defTabSz="1289050">
+            <a:lnSpc>
+              <a:spcPct val="90000"/>
+            </a:lnSpc>
+            <a:spcBef>
+              <a:spcPct val="0"/>
+            </a:spcBef>
+            <a:spcAft>
+              <a:spcPct val="35000"/>
+            </a:spcAft>
+            <a:buNone/>
+          </a:pPr>
+          <a:r>
+            <a:rPr lang="en-US" sz="2900" kern="1200" dirty="0"/>
+            <a:t>AUC</a:t>
+          </a:r>
+        </a:p>
+      </dsp:txBody>
+      <dsp:txXfrm>
+        <a:off x="5326784" y="3037875"/>
+        <a:ext cx="1587075" cy="1075965"/>
+      </dsp:txXfrm>
+    </dsp:sp>
+    <dsp:sp modelId="{48E0E32F-9D9F-4C47-BA98-06F7149C48AA}">
+      <dsp:nvSpPr>
+        <dsp:cNvPr id="0" name=""/>
+        <dsp:cNvSpPr/>
+      </dsp:nvSpPr>
+      <dsp:spPr>
+        <a:xfrm>
+          <a:off x="6874930" y="2793126"/>
+          <a:ext cx="3359202" cy="1512813"/>
+        </a:xfrm>
+        <a:prstGeom prst="rect">
+          <a:avLst/>
+        </a:prstGeom>
+        <a:noFill/>
+        <a:ln>
+          <a:noFill/>
+        </a:ln>
+        <a:effectLst/>
+      </dsp:spPr>
+      <dsp:style>
+        <a:lnRef idx="0">
+          <a:scrgbClr r="0" g="0" b="0"/>
+        </a:lnRef>
+        <a:fillRef idx="0">
+          <a:scrgbClr r="0" g="0" b="0"/>
+        </a:fillRef>
+        <a:effectRef idx="0">
+          <a:scrgbClr r="0" g="0" b="0"/>
+        </a:effectRef>
+        <a:fontRef idx="minor"/>
+      </dsp:style>
+      <dsp:txBody>
+        <a:bodyPr spcFirstLastPara="0" vert="horz" wrap="square" lIns="133350" tIns="133350" rIns="133350" bIns="133350" numCol="1" spcCol="1270" anchor="ctr" anchorCtr="0">
+          <a:noAutofit/>
+        </a:bodyPr>
+        <a:lstStyle/>
+        <a:p>
+          <a:pPr marL="228600" lvl="1" indent="-228600" algn="l" defTabSz="1200150">
+            <a:lnSpc>
+              <a:spcPct val="90000"/>
+            </a:lnSpc>
+            <a:spcBef>
+              <a:spcPct val="0"/>
+            </a:spcBef>
+            <a:spcAft>
+              <a:spcPct val="15000"/>
+            </a:spcAft>
+            <a:buChar char="•"/>
+          </a:pPr>
+          <a:r>
+            <a:rPr lang="en-US" sz="2700" kern="1200" dirty="0"/>
+            <a:t>Sensitivity of the models to positive and negative class</a:t>
+          </a:r>
+        </a:p>
+      </dsp:txBody>
+      <dsp:txXfrm>
+        <a:off x="6874930" y="2793126"/>
+        <a:ext cx="3359202" cy="1512813"/>
+      </dsp:txXfrm>
+    </dsp:sp>
+  </dsp:spTree>
+</dsp:drawing>
+</file>
+
 <file path=ppt/diagrams/layout1.xml><?xml version="1.0" encoding="utf-8"?>
 <dgm:layoutDef xmlns:dgm="http://schemas.openxmlformats.org/drawingml/2006/diagram" xmlns:a="http://schemas.openxmlformats.org/drawingml/2006/main" uniqueId="urn:microsoft.com/office/officeart/2005/8/layout/vList6">
   <dgm:title val=""/>
@@ -5551,6 +7231,324 @@
 </dgm:layoutDef>
 </file>
 
+<file path=ppt/diagrams/layout3.xml><?xml version="1.0" encoding="utf-8"?>
+<dgm:layoutDef xmlns:dgm="http://schemas.openxmlformats.org/drawingml/2006/diagram" xmlns:a="http://schemas.openxmlformats.org/drawingml/2006/main" uniqueId="urn:microsoft.com/office/officeart/2005/8/layout/StepDownProcess">
+  <dgm:title val=""/>
+  <dgm:desc val=""/>
+  <dgm:catLst>
+    <dgm:cat type="process" pri="1600"/>
+  </dgm:catLst>
+  <dgm:sampData>
+    <dgm:dataModel>
+      <dgm:ptLst>
+        <dgm:pt modelId="0" type="doc"/>
+        <dgm:pt modelId="10">
+          <dgm:prSet phldr="1"/>
+        </dgm:pt>
+        <dgm:pt modelId="11">
+          <dgm:prSet phldr="1"/>
+        </dgm:pt>
+        <dgm:pt modelId="20">
+          <dgm:prSet phldr="1"/>
+        </dgm:pt>
+        <dgm:pt modelId="21">
+          <dgm:prSet phldr="1"/>
+        </dgm:pt>
+        <dgm:pt modelId="30">
+          <dgm:prSet phldr="1"/>
+        </dgm:pt>
+        <dgm:pt modelId="31">
+          <dgm:prSet phldr="1"/>
+        </dgm:pt>
+      </dgm:ptLst>
+      <dgm:cxnLst>
+        <dgm:cxn modelId="60" srcId="0" destId="10" srcOrd="0" destOrd="0"/>
+        <dgm:cxn modelId="12" srcId="10" destId="11" srcOrd="0" destOrd="0"/>
+        <dgm:cxn modelId="70" srcId="0" destId="20" srcOrd="1" destOrd="0"/>
+        <dgm:cxn modelId="22" srcId="20" destId="21" srcOrd="0" destOrd="0"/>
+        <dgm:cxn modelId="80" srcId="0" destId="30" srcOrd="2" destOrd="0"/>
+        <dgm:cxn modelId="32" srcId="30" destId="31" srcOrd="0" destOrd="0"/>
+      </dgm:cxnLst>
+      <dgm:bg/>
+      <dgm:whole/>
+    </dgm:dataModel>
+  </dgm:sampData>
+  <dgm:styleData>
+    <dgm:dataModel>
+      <dgm:ptLst>
+        <dgm:pt modelId="0" type="doc"/>
+        <dgm:pt modelId="10">
+          <dgm:prSet phldr="1"/>
+        </dgm:pt>
+        <dgm:pt modelId="20">
+          <dgm:prSet phldr="1"/>
+        </dgm:pt>
+      </dgm:ptLst>
+      <dgm:cxnLst>
+        <dgm:cxn modelId="60" srcId="0" destId="10" srcOrd="0" destOrd="0"/>
+        <dgm:cxn modelId="70" srcId="0" destId="20" srcOrd="1" destOrd="0"/>
+      </dgm:cxnLst>
+      <dgm:bg/>
+      <dgm:whole/>
+    </dgm:dataModel>
+  </dgm:styleData>
+  <dgm:clrData>
+    <dgm:dataModel>
+      <dgm:ptLst>
+        <dgm:pt modelId="0" type="doc"/>
+        <dgm:pt modelId="10">
+          <dgm:prSet phldr="1"/>
+        </dgm:pt>
+        <dgm:pt modelId="20">
+          <dgm:prSet phldr="1"/>
+        </dgm:pt>
+        <dgm:pt modelId="30">
+          <dgm:prSet phldr="1"/>
+        </dgm:pt>
+        <dgm:pt modelId="40">
+          <dgm:prSet phldr="1"/>
+        </dgm:pt>
+      </dgm:ptLst>
+      <dgm:cxnLst>
+        <dgm:cxn modelId="60" srcId="0" destId="10" srcOrd="0" destOrd="0"/>
+        <dgm:cxn modelId="70" srcId="0" destId="20" srcOrd="1" destOrd="0"/>
+        <dgm:cxn modelId="80" srcId="0" destId="30" srcOrd="2" destOrd="0"/>
+        <dgm:cxn modelId="90" srcId="0" destId="40" srcOrd="3" destOrd="0"/>
+      </dgm:cxnLst>
+      <dgm:bg/>
+      <dgm:whole/>
+    </dgm:dataModel>
+  </dgm:clrData>
+  <dgm:layoutNode name="rootnode">
+    <dgm:varLst>
+      <dgm:chMax/>
+      <dgm:chPref/>
+      <dgm:dir/>
+      <dgm:animLvl val="lvl"/>
+    </dgm:varLst>
+    <dgm:choose name="Name0">
+      <dgm:if name="Name1" func="var" arg="dir" op="equ" val="norm">
+        <dgm:alg type="snake">
+          <dgm:param type="grDir" val="tL"/>
+          <dgm:param type="flowDir" val="row"/>
+          <dgm:param type="off" val="off"/>
+          <dgm:param type="bkpt" val="fixed"/>
+          <dgm:param type="bkPtFixedVal" val="1"/>
+        </dgm:alg>
+      </dgm:if>
+      <dgm:else name="Name2">
+        <dgm:alg type="snake">
+          <dgm:param type="grDir" val="tR"/>
+          <dgm:param type="flowDir" val="row"/>
+          <dgm:param type="off" val="off"/>
+          <dgm:param type="bkpt" val="fixed"/>
+          <dgm:param type="bkPtFixedVal" val="1"/>
+        </dgm:alg>
+      </dgm:else>
+    </dgm:choose>
+    <dgm:shape xmlns:r="http://schemas.openxmlformats.org/officeDocument/2006/relationships" r:blip="">
+      <dgm:adjLst/>
+    </dgm:shape>
+    <dgm:choose name="Name3">
+      <dgm:if name="Name4" func="var" arg="dir" op="equ" val="norm">
+        <dgm:constrLst>
+          <dgm:constr type="alignOff" forName="rootnode" val="0.48"/>
+          <dgm:constr type="primFontSz" for="des" forName="ParentText" val="65"/>
+          <dgm:constr type="primFontSz" for="des" forName="ChildText" refType="primFontSz" refFor="des" refForName="ParentText" op="lte"/>
+          <dgm:constr type="w" for="ch" forName="composite" refType="w"/>
+          <dgm:constr type="h" for="ch" forName="composite" refType="h"/>
+          <dgm:constr type="sp" refType="h" refFor="ch" refForName="composite" op="equ" fact="-0.38"/>
+        </dgm:constrLst>
+      </dgm:if>
+      <dgm:else name="Name5">
+        <dgm:constrLst>
+          <dgm:constr type="alignOff" forName="rootnode" val="0.48"/>
+          <dgm:constr type="primFontSz" for="des" forName="ParentText" val="65"/>
+          <dgm:constr type="primFontSz" for="des" forName="ChildText" refType="primFontSz" refFor="des" refForName="ParentText" op="lte"/>
+          <dgm:constr type="w" for="ch" forName="composite" refType="w"/>
+          <dgm:constr type="h" for="ch" forName="composite" refType="h"/>
+          <dgm:constr type="sp" refType="h" refFor="ch" refForName="composite" op="equ" fact="-0.38"/>
+        </dgm:constrLst>
+      </dgm:else>
+    </dgm:choose>
+    <dgm:forEach name="nodesForEach" axis="ch" ptType="node">
+      <dgm:layoutNode name="composite">
+        <dgm:alg type="composite">
+          <dgm:param type="ar" val="1.2439"/>
+        </dgm:alg>
+        <dgm:shape xmlns:r="http://schemas.openxmlformats.org/officeDocument/2006/relationships" r:blip="">
+          <dgm:adjLst/>
+        </dgm:shape>
+        <dgm:choose name="Name6">
+          <dgm:if name="Name7" func="var" arg="dir" op="equ" val="norm">
+            <dgm:constrLst>
+              <dgm:constr type="l" for="ch" forName="bentUpArrow1" refType="w" fact="0.07"/>
+              <dgm:constr type="t" for="ch" forName="bentUpArrow1" refType="h" fact="0.524"/>
+              <dgm:constr type="w" for="ch" forName="bentUpArrow1" refType="w" fact="0.3844"/>
+              <dgm:constr type="h" for="ch" forName="bentUpArrow1" refType="h" fact="0.42"/>
+              <dgm:constr type="l" for="ch" forName="ParentText" refType="w" fact="0"/>
+              <dgm:constr type="t" for="ch" forName="ParentText" refType="h" fact="0"/>
+              <dgm:constr type="w" for="ch" forName="ParentText" refType="w" fact="0.5684"/>
+              <dgm:constr type="h" for="ch" forName="ParentText" refType="h" fact="0.4949"/>
+              <dgm:constr type="l" for="ch" forName="ChildText" refType="w" refFor="ch" refForName="ParentText"/>
+              <dgm:constr type="t" for="ch" forName="ChildText" refType="h" fact="0.05"/>
+              <dgm:constr type="w" for="ch" forName="ChildText" refType="w" fact="0.4134"/>
+              <dgm:constr type="h" for="ch" forName="ChildText" refType="h" fact="0.4"/>
+              <dgm:constr type="l" for="ch" forName="FinalChildText" refType="w" refFor="ch" refForName="ParentText"/>
+              <dgm:constr type="t" for="ch" forName="FinalChildText" refType="h" fact="0.05"/>
+              <dgm:constr type="w" for="ch" forName="FinalChildText" refType="w" fact="0.4134"/>
+              <dgm:constr type="h" for="ch" forName="FinalChildText" refType="h" fact="0.4"/>
+            </dgm:constrLst>
+          </dgm:if>
+          <dgm:else name="Name8">
+            <dgm:constrLst>
+              <dgm:constr type="r" for="ch" forName="bentUpArrow1" refType="w" fact="0.97"/>
+              <dgm:constr type="t" for="ch" forName="bentUpArrow1" refType="h" fact="0.524"/>
+              <dgm:constr type="w" for="ch" forName="bentUpArrow1" refType="w" fact="0.3844"/>
+              <dgm:constr type="h" for="ch" forName="bentUpArrow1" refType="h" fact="0.42"/>
+              <dgm:constr type="l" for="ch" forName="ParentText" refType="w" fact="0.4316"/>
+              <dgm:constr type="t" for="ch" forName="ParentText" refType="h" fact="0"/>
+              <dgm:constr type="w" for="ch" forName="ParentText" refType="w" fact="0.5684"/>
+              <dgm:constr type="h" for="ch" forName="ParentText" refType="h" fact="0.4949"/>
+              <dgm:constr type="l" for="ch" forName="ChildText" refType="w" fact="0"/>
+              <dgm:constr type="t" for="ch" forName="ChildText" refType="h" fact="0.05"/>
+              <dgm:constr type="w" for="ch" forName="ChildText" refType="w" fact="0.4134"/>
+              <dgm:constr type="h" for="ch" forName="ChildText" refType="h" fact="0.4"/>
+              <dgm:constr type="l" for="ch" forName="FinalChildText" refType="w" fact="0"/>
+              <dgm:constr type="t" for="ch" forName="FinalChildText" refType="h" fact="0.05"/>
+              <dgm:constr type="w" for="ch" forName="FinalChildText" refType="w" fact="0.4134"/>
+              <dgm:constr type="h" for="ch" forName="FinalChildText" refType="h" fact="0.4"/>
+            </dgm:constrLst>
+          </dgm:else>
+        </dgm:choose>
+        <dgm:choose name="Name9">
+          <dgm:if name="Name10" axis="followSib" ptType="node" func="cnt" op="gte" val="1">
+            <dgm:layoutNode name="bentUpArrow1" styleLbl="alignImgPlace1">
+              <dgm:alg type="sp"/>
+              <dgm:choose name="Name11">
+                <dgm:if name="Name12" func="var" arg="dir" op="equ" val="norm">
+                  <dgm:shape xmlns:r="http://schemas.openxmlformats.org/officeDocument/2006/relationships" rot="90" type="bentUpArrow" r:blip="">
+                    <dgm:adjLst>
+                      <dgm:adj idx="1" val="0.3284"/>
+                      <dgm:adj idx="2" val="0.25"/>
+                      <dgm:adj idx="3" val="0.3578"/>
+                    </dgm:adjLst>
+                  </dgm:shape>
+                </dgm:if>
+                <dgm:else name="Name13">
+                  <dgm:shape xmlns:r="http://schemas.openxmlformats.org/officeDocument/2006/relationships" rot="180" type="bentArrow" r:blip="">
+                    <dgm:adjLst>
+                      <dgm:adj idx="1" val="0.3284"/>
+                      <dgm:adj idx="2" val="0.25"/>
+                      <dgm:adj idx="3" val="0.3578"/>
+                      <dgm:adj idx="4" val="0"/>
+                    </dgm:adjLst>
+                  </dgm:shape>
+                </dgm:else>
+              </dgm:choose>
+              <dgm:presOf/>
+            </dgm:layoutNode>
+          </dgm:if>
+          <dgm:else name="Name14"/>
+        </dgm:choose>
+        <dgm:layoutNode name="ParentText" styleLbl="node1">
+          <dgm:varLst>
+            <dgm:chMax val="1"/>
+            <dgm:chPref val="1"/>
+            <dgm:bulletEnabled val="1"/>
+          </dgm:varLst>
+          <dgm:alg type="tx"/>
+          <dgm:shape xmlns:r="http://schemas.openxmlformats.org/officeDocument/2006/relationships" type="roundRect" r:blip="">
+            <dgm:adjLst>
+              <dgm:adj idx="1" val="0.1667"/>
+            </dgm:adjLst>
+          </dgm:shape>
+          <dgm:presOf axis="self" ptType="node"/>
+          <dgm:constrLst>
+            <dgm:constr type="lMarg" refType="primFontSz" fact="0.3"/>
+            <dgm:constr type="rMarg" refType="primFontSz" fact="0.3"/>
+            <dgm:constr type="tMarg" refType="primFontSz" fact="0.3"/>
+            <dgm:constr type="bMarg" refType="primFontSz" fact="0.3"/>
+          </dgm:constrLst>
+          <dgm:ruleLst>
+            <dgm:rule type="primFontSz" val="5" fact="NaN" max="NaN"/>
+          </dgm:ruleLst>
+        </dgm:layoutNode>
+        <dgm:choose name="Name15">
+          <dgm:if name="Name16" axis="followSib" ptType="node" func="cnt" op="equ" val="0">
+            <dgm:choose name="Name17">
+              <dgm:if name="Name18" axis="ch" ptType="node" func="cnt" op="gte" val="1">
+                <dgm:layoutNode name="FinalChildText" styleLbl="revTx">
+                  <dgm:varLst>
+                    <dgm:chMax val="0"/>
+                    <dgm:chPref val="0"/>
+                    <dgm:bulletEnabled val="1"/>
+                  </dgm:varLst>
+                  <dgm:alg type="tx">
+                    <dgm:param type="stBulletLvl" val="1"/>
+                    <dgm:param type="txAnchorVertCh" val="mid"/>
+                    <dgm:param type="parTxLTRAlign" val="l"/>
+                  </dgm:alg>
+                  <dgm:shape xmlns:r="http://schemas.openxmlformats.org/officeDocument/2006/relationships" type="rect" r:blip="">
+                    <dgm:adjLst/>
+                  </dgm:shape>
+                  <dgm:presOf axis="des" ptType="node"/>
+                  <dgm:constrLst>
+                    <dgm:constr type="lMarg" refType="primFontSz" fact="0.3"/>
+                    <dgm:constr type="rMarg" refType="primFontSz" fact="0.3"/>
+                    <dgm:constr type="tMarg" refType="primFontSz" fact="0.3"/>
+                    <dgm:constr type="bMarg" refType="primFontSz" fact="0.3"/>
+                  </dgm:constrLst>
+                  <dgm:ruleLst>
+                    <dgm:rule type="primFontSz" val="5" fact="NaN" max="NaN"/>
+                  </dgm:ruleLst>
+                </dgm:layoutNode>
+              </dgm:if>
+              <dgm:else name="Name19"/>
+            </dgm:choose>
+          </dgm:if>
+          <dgm:else name="Name20">
+            <dgm:layoutNode name="ChildText" styleLbl="revTx">
+              <dgm:varLst>
+                <dgm:chMax val="0"/>
+                <dgm:chPref val="0"/>
+                <dgm:bulletEnabled val="1"/>
+              </dgm:varLst>
+              <dgm:alg type="tx">
+                <dgm:param type="stBulletLvl" val="1"/>
+                <dgm:param type="txAnchorVertCh" val="mid"/>
+                <dgm:param type="parTxLTRAlign" val="l"/>
+              </dgm:alg>
+              <dgm:shape xmlns:r="http://schemas.openxmlformats.org/officeDocument/2006/relationships" type="rect" r:blip="">
+                <dgm:adjLst/>
+              </dgm:shape>
+              <dgm:presOf axis="des" ptType="node"/>
+              <dgm:constrLst>
+                <dgm:constr type="lMarg" refType="primFontSz" fact="0.3"/>
+                <dgm:constr type="rMarg" refType="primFontSz" fact="0.3"/>
+                <dgm:constr type="tMarg" refType="primFontSz" fact="0.3"/>
+                <dgm:constr type="bMarg" refType="primFontSz" fact="0.3"/>
+              </dgm:constrLst>
+              <dgm:ruleLst>
+                <dgm:rule type="primFontSz" val="5" fact="NaN" max="NaN"/>
+              </dgm:ruleLst>
+            </dgm:layoutNode>
+          </dgm:else>
+        </dgm:choose>
+      </dgm:layoutNode>
+      <dgm:forEach name="sibTransForEach" axis="followSib" ptType="sibTrans" cnt="1">
+        <dgm:layoutNode name="sibTrans">
+          <dgm:alg type="sp"/>
+          <dgm:shape xmlns:r="http://schemas.openxmlformats.org/officeDocument/2006/relationships" r:blip="">
+            <dgm:adjLst/>
+          </dgm:shape>
+        </dgm:layoutNode>
+      </dgm:forEach>
+    </dgm:forEach>
+  </dgm:layoutNode>
+</dgm:layoutDef>
+</file>
+
 <file path=ppt/diagrams/quickStyle1.xml><?xml version="1.0" encoding="utf-8"?>
 <dgm:styleDef xmlns:dgm="http://schemas.openxmlformats.org/drawingml/2006/diagram" xmlns:a="http://schemas.openxmlformats.org/drawingml/2006/main" uniqueId="urn:microsoft.com/office/officeart/2005/8/quickstyle/simple1">
   <dgm:title val=""/>
@@ -6586,6 +8584,1040 @@
 </file>
 
 <file path=ppt/diagrams/quickStyle2.xml><?xml version="1.0" encoding="utf-8"?>
+<dgm:styleDef xmlns:dgm="http://schemas.openxmlformats.org/drawingml/2006/diagram" xmlns:a="http://schemas.openxmlformats.org/drawingml/2006/main" uniqueId="urn:microsoft.com/office/officeart/2005/8/quickstyle/simple1">
+  <dgm:title val=""/>
+  <dgm:desc val=""/>
+  <dgm:catLst>
+    <dgm:cat type="simple" pri="10100"/>
+  </dgm:catLst>
+  <dgm:scene3d>
+    <a:camera prst="orthographicFront"/>
+    <a:lightRig rig="threePt" dir="t"/>
+  </dgm:scene3d>
+  <dgm:styleLbl name="node0">
+    <dgm:scene3d>
+      <a:camera prst="orthographicFront"/>
+      <a:lightRig rig="threePt" dir="t"/>
+    </dgm:scene3d>
+    <dgm:sp3d/>
+    <dgm:txPr/>
+    <dgm:style>
+      <a:lnRef idx="2">
+        <a:scrgbClr r="0" g="0" b="0"/>
+      </a:lnRef>
+      <a:fillRef idx="1">
+        <a:scrgbClr r="0" g="0" b="0"/>
+      </a:fillRef>
+      <a:effectRef idx="0">
+        <a:scrgbClr r="0" g="0" b="0"/>
+      </a:effectRef>
+      <a:fontRef idx="minor">
+        <a:schemeClr val="lt1"/>
+      </a:fontRef>
+    </dgm:style>
+  </dgm:styleLbl>
+  <dgm:styleLbl name="lnNode1">
+    <dgm:scene3d>
+      <a:camera prst="orthographicFront"/>
+      <a:lightRig rig="threePt" dir="t"/>
+    </dgm:scene3d>
+    <dgm:sp3d/>
+    <dgm:txPr/>
+    <dgm:style>
+      <a:lnRef idx="2">
+        <a:scrgbClr r="0" g="0" b="0"/>
+      </a:lnRef>
+      <a:fillRef idx="1">
+        <a:scrgbClr r="0" g="0" b="0"/>
+      </a:fillRef>
+      <a:effectRef idx="0">
+        <a:scrgbClr r="0" g="0" b="0"/>
+      </a:effectRef>
+      <a:fontRef idx="minor">
+        <a:schemeClr val="lt1"/>
+      </a:fontRef>
+    </dgm:style>
+  </dgm:styleLbl>
+  <dgm:styleLbl name="vennNode1">
+    <dgm:scene3d>
+      <a:camera prst="orthographicFront"/>
+      <a:lightRig rig="threePt" dir="t"/>
+    </dgm:scene3d>
+    <dgm:sp3d/>
+    <dgm:txPr/>
+    <dgm:style>
+      <a:lnRef idx="2">
+        <a:scrgbClr r="0" g="0" b="0"/>
+      </a:lnRef>
+      <a:fillRef idx="1">
+        <a:scrgbClr r="0" g="0" b="0"/>
+      </a:fillRef>
+      <a:effectRef idx="0">
+        <a:scrgbClr r="0" g="0" b="0"/>
+      </a:effectRef>
+      <a:fontRef idx="minor">
+        <a:schemeClr val="tx1"/>
+      </a:fontRef>
+    </dgm:style>
+  </dgm:styleLbl>
+  <dgm:styleLbl name="alignNode1">
+    <dgm:scene3d>
+      <a:camera prst="orthographicFront"/>
+      <a:lightRig rig="threePt" dir="t"/>
+    </dgm:scene3d>
+    <dgm:sp3d/>
+    <dgm:txPr/>
+    <dgm:style>
+      <a:lnRef idx="2">
+        <a:scrgbClr r="0" g="0" b="0"/>
+      </a:lnRef>
+      <a:fillRef idx="1">
+        <a:scrgbClr r="0" g="0" b="0"/>
+      </a:fillRef>
+      <a:effectRef idx="0">
+        <a:scrgbClr r="0" g="0" b="0"/>
+      </a:effectRef>
+      <a:fontRef idx="minor">
+        <a:schemeClr val="lt1"/>
+      </a:fontRef>
+    </dgm:style>
+  </dgm:styleLbl>
+  <dgm:styleLbl name="node1">
+    <dgm:scene3d>
+      <a:camera prst="orthographicFront"/>
+      <a:lightRig rig="threePt" dir="t"/>
+    </dgm:scene3d>
+    <dgm:sp3d/>
+    <dgm:txPr/>
+    <dgm:style>
+      <a:lnRef idx="2">
+        <a:scrgbClr r="0" g="0" b="0"/>
+      </a:lnRef>
+      <a:fillRef idx="1">
+        <a:scrgbClr r="0" g="0" b="0"/>
+      </a:fillRef>
+      <a:effectRef idx="0">
+        <a:scrgbClr r="0" g="0" b="0"/>
+      </a:effectRef>
+      <a:fontRef idx="minor">
+        <a:schemeClr val="lt1"/>
+      </a:fontRef>
+    </dgm:style>
+  </dgm:styleLbl>
+  <dgm:styleLbl name="node2">
+    <dgm:scene3d>
+      <a:camera prst="orthographicFront"/>
+      <a:lightRig rig="threePt" dir="t"/>
+    </dgm:scene3d>
+    <dgm:sp3d/>
+    <dgm:txPr/>
+    <dgm:style>
+      <a:lnRef idx="2">
+        <a:scrgbClr r="0" g="0" b="0"/>
+      </a:lnRef>
+      <a:fillRef idx="1">
+        <a:scrgbClr r="0" g="0" b="0"/>
+      </a:fillRef>
+      <a:effectRef idx="0">
+        <a:scrgbClr r="0" g="0" b="0"/>
+      </a:effectRef>
+      <a:fontRef idx="minor">
+        <a:schemeClr val="lt1"/>
+      </a:fontRef>
+    </dgm:style>
+  </dgm:styleLbl>
+  <dgm:styleLbl name="node3">
+    <dgm:scene3d>
+      <a:camera prst="orthographicFront"/>
+      <a:lightRig rig="threePt" dir="t"/>
+    </dgm:scene3d>
+    <dgm:sp3d/>
+    <dgm:txPr/>
+    <dgm:style>
+      <a:lnRef idx="2">
+        <a:scrgbClr r="0" g="0" b="0"/>
+      </a:lnRef>
+      <a:fillRef idx="1">
+        <a:scrgbClr r="0" g="0" b="0"/>
+      </a:fillRef>
+      <a:effectRef idx="0">
+        <a:scrgbClr r="0" g="0" b="0"/>
+      </a:effectRef>
+      <a:fontRef idx="minor">
+        <a:schemeClr val="lt1"/>
+      </a:fontRef>
+    </dgm:style>
+  </dgm:styleLbl>
+  <dgm:styleLbl name="node4">
+    <dgm:scene3d>
+      <a:camera prst="orthographicFront"/>
+      <a:lightRig rig="threePt" dir="t"/>
+    </dgm:scene3d>
+    <dgm:sp3d/>
+    <dgm:txPr/>
+    <dgm:style>
+      <a:lnRef idx="2">
+        <a:scrgbClr r="0" g="0" b="0"/>
+      </a:lnRef>
+      <a:fillRef idx="1">
+        <a:scrgbClr r="0" g="0" b="0"/>
+      </a:fillRef>
+      <a:effectRef idx="0">
+        <a:scrgbClr r="0" g="0" b="0"/>
+      </a:effectRef>
+      <a:fontRef idx="minor">
+        <a:schemeClr val="lt1"/>
+      </a:fontRef>
+    </dgm:style>
+  </dgm:styleLbl>
+  <dgm:styleLbl name="fgImgPlace1">
+    <dgm:scene3d>
+      <a:camera prst="orthographicFront"/>
+      <a:lightRig rig="threePt" dir="t"/>
+    </dgm:scene3d>
+    <dgm:sp3d/>
+    <dgm:txPr/>
+    <dgm:style>
+      <a:lnRef idx="2">
+        <a:scrgbClr r="0" g="0" b="0"/>
+      </a:lnRef>
+      <a:fillRef idx="1">
+        <a:scrgbClr r="0" g="0" b="0"/>
+      </a:fillRef>
+      <a:effectRef idx="0">
+        <a:scrgbClr r="0" g="0" b="0"/>
+      </a:effectRef>
+      <a:fontRef idx="minor"/>
+    </dgm:style>
+  </dgm:styleLbl>
+  <dgm:styleLbl name="alignImgPlace1">
+    <dgm:scene3d>
+      <a:camera prst="orthographicFront"/>
+      <a:lightRig rig="threePt" dir="t"/>
+    </dgm:scene3d>
+    <dgm:sp3d/>
+    <dgm:txPr/>
+    <dgm:style>
+      <a:lnRef idx="2">
+        <a:scrgbClr r="0" g="0" b="0"/>
+      </a:lnRef>
+      <a:fillRef idx="1">
+        <a:scrgbClr r="0" g="0" b="0"/>
+      </a:fillRef>
+      <a:effectRef idx="0">
+        <a:scrgbClr r="0" g="0" b="0"/>
+      </a:effectRef>
+      <a:fontRef idx="minor"/>
+    </dgm:style>
+  </dgm:styleLbl>
+  <dgm:styleLbl name="bgImgPlace1">
+    <dgm:scene3d>
+      <a:camera prst="orthographicFront"/>
+      <a:lightRig rig="threePt" dir="t"/>
+    </dgm:scene3d>
+    <dgm:sp3d/>
+    <dgm:txPr/>
+    <dgm:style>
+      <a:lnRef idx="2">
+        <a:scrgbClr r="0" g="0" b="0"/>
+      </a:lnRef>
+      <a:fillRef idx="1">
+        <a:scrgbClr r="0" g="0" b="0"/>
+      </a:fillRef>
+      <a:effectRef idx="0">
+        <a:scrgbClr r="0" g="0" b="0"/>
+      </a:effectRef>
+      <a:fontRef idx="minor"/>
+    </dgm:style>
+  </dgm:styleLbl>
+  <dgm:styleLbl name="sibTrans2D1">
+    <dgm:scene3d>
+      <a:camera prst="orthographicFront"/>
+      <a:lightRig rig="threePt" dir="t"/>
+    </dgm:scene3d>
+    <dgm:sp3d/>
+    <dgm:txPr/>
+    <dgm:style>
+      <a:lnRef idx="0">
+        <a:scrgbClr r="0" g="0" b="0"/>
+      </a:lnRef>
+      <a:fillRef idx="1">
+        <a:scrgbClr r="0" g="0" b="0"/>
+      </a:fillRef>
+      <a:effectRef idx="0">
+        <a:scrgbClr r="0" g="0" b="0"/>
+      </a:effectRef>
+      <a:fontRef idx="minor">
+        <a:schemeClr val="lt1"/>
+      </a:fontRef>
+    </dgm:style>
+  </dgm:styleLbl>
+  <dgm:styleLbl name="fgSibTrans2D1">
+    <dgm:scene3d>
+      <a:camera prst="orthographicFront"/>
+      <a:lightRig rig="threePt" dir="t"/>
+    </dgm:scene3d>
+    <dgm:sp3d/>
+    <dgm:txPr/>
+    <dgm:style>
+      <a:lnRef idx="0">
+        <a:scrgbClr r="0" g="0" b="0"/>
+      </a:lnRef>
+      <a:fillRef idx="1">
+        <a:scrgbClr r="0" g="0" b="0"/>
+      </a:fillRef>
+      <a:effectRef idx="0">
+        <a:scrgbClr r="0" g="0" b="0"/>
+      </a:effectRef>
+      <a:fontRef idx="minor">
+        <a:schemeClr val="lt1"/>
+      </a:fontRef>
+    </dgm:style>
+  </dgm:styleLbl>
+  <dgm:styleLbl name="bgSibTrans2D1">
+    <dgm:scene3d>
+      <a:camera prst="orthographicFront"/>
+      <a:lightRig rig="threePt" dir="t"/>
+    </dgm:scene3d>
+    <dgm:sp3d/>
+    <dgm:txPr/>
+    <dgm:style>
+      <a:lnRef idx="0">
+        <a:scrgbClr r="0" g="0" b="0"/>
+      </a:lnRef>
+      <a:fillRef idx="1">
+        <a:scrgbClr r="0" g="0" b="0"/>
+      </a:fillRef>
+      <a:effectRef idx="0">
+        <a:scrgbClr r="0" g="0" b="0"/>
+      </a:effectRef>
+      <a:fontRef idx="minor">
+        <a:schemeClr val="lt1"/>
+      </a:fontRef>
+    </dgm:style>
+  </dgm:styleLbl>
+  <dgm:styleLbl name="sibTrans1D1">
+    <dgm:scene3d>
+      <a:camera prst="orthographicFront"/>
+      <a:lightRig rig="threePt" dir="t"/>
+    </dgm:scene3d>
+    <dgm:sp3d/>
+    <dgm:txPr/>
+    <dgm:style>
+      <a:lnRef idx="1">
+        <a:scrgbClr r="0" g="0" b="0"/>
+      </a:lnRef>
+      <a:fillRef idx="0">
+        <a:scrgbClr r="0" g="0" b="0"/>
+      </a:fillRef>
+      <a:effectRef idx="0">
+        <a:scrgbClr r="0" g="0" b="0"/>
+      </a:effectRef>
+      <a:fontRef idx="minor"/>
+    </dgm:style>
+  </dgm:styleLbl>
+  <dgm:styleLbl name="callout">
+    <dgm:scene3d>
+      <a:camera prst="orthographicFront"/>
+      <a:lightRig rig="threePt" dir="t"/>
+    </dgm:scene3d>
+    <dgm:sp3d/>
+    <dgm:txPr/>
+    <dgm:style>
+      <a:lnRef idx="2">
+        <a:scrgbClr r="0" g="0" b="0"/>
+      </a:lnRef>
+      <a:fillRef idx="1">
+        <a:scrgbClr r="0" g="0" b="0"/>
+      </a:fillRef>
+      <a:effectRef idx="0">
+        <a:scrgbClr r="0" g="0" b="0"/>
+      </a:effectRef>
+      <a:fontRef idx="minor"/>
+    </dgm:style>
+  </dgm:styleLbl>
+  <dgm:styleLbl name="asst0">
+    <dgm:scene3d>
+      <a:camera prst="orthographicFront"/>
+      <a:lightRig rig="threePt" dir="t"/>
+    </dgm:scene3d>
+    <dgm:sp3d/>
+    <dgm:txPr/>
+    <dgm:style>
+      <a:lnRef idx="2">
+        <a:scrgbClr r="0" g="0" b="0"/>
+      </a:lnRef>
+      <a:fillRef idx="1">
+        <a:scrgbClr r="0" g="0" b="0"/>
+      </a:fillRef>
+      <a:effectRef idx="0">
+        <a:scrgbClr r="0" g="0" b="0"/>
+      </a:effectRef>
+      <a:fontRef idx="minor">
+        <a:schemeClr val="lt1"/>
+      </a:fontRef>
+    </dgm:style>
+  </dgm:styleLbl>
+  <dgm:styleLbl name="asst1">
+    <dgm:scene3d>
+      <a:camera prst="orthographicFront"/>
+      <a:lightRig rig="threePt" dir="t"/>
+    </dgm:scene3d>
+    <dgm:sp3d/>
+    <dgm:txPr/>
+    <dgm:style>
+      <a:lnRef idx="2">
+        <a:scrgbClr r="0" g="0" b="0"/>
+      </a:lnRef>
+      <a:fillRef idx="1">
+        <a:scrgbClr r="0" g="0" b="0"/>
+      </a:fillRef>
+      <a:effectRef idx="0">
+        <a:scrgbClr r="0" g="0" b="0"/>
+      </a:effectRef>
+      <a:fontRef idx="minor">
+        <a:schemeClr val="lt1"/>
+      </a:fontRef>
+    </dgm:style>
+  </dgm:styleLbl>
+  <dgm:styleLbl name="asst2">
+    <dgm:scene3d>
+      <a:camera prst="orthographicFront"/>
+      <a:lightRig rig="threePt" dir="t"/>
+    </dgm:scene3d>
+    <dgm:sp3d/>
+    <dgm:txPr/>
+    <dgm:style>
+      <a:lnRef idx="2">
+        <a:scrgbClr r="0" g="0" b="0"/>
+      </a:lnRef>
+      <a:fillRef idx="1">
+        <a:scrgbClr r="0" g="0" b="0"/>
+      </a:fillRef>
+      <a:effectRef idx="0">
+        <a:scrgbClr r="0" g="0" b="0"/>
+      </a:effectRef>
+      <a:fontRef idx="minor">
+        <a:schemeClr val="lt1"/>
+      </a:fontRef>
+    </dgm:style>
+  </dgm:styleLbl>
+  <dgm:styleLbl name="asst3">
+    <dgm:scene3d>
+      <a:camera prst="orthographicFront"/>
+      <a:lightRig rig="threePt" dir="t"/>
+    </dgm:scene3d>
+    <dgm:sp3d/>
+    <dgm:txPr/>
+    <dgm:style>
+      <a:lnRef idx="2">
+        <a:scrgbClr r="0" g="0" b="0"/>
+      </a:lnRef>
+      <a:fillRef idx="1">
+        <a:scrgbClr r="0" g="0" b="0"/>
+      </a:fillRef>
+      <a:effectRef idx="0">
+        <a:scrgbClr r="0" g="0" b="0"/>
+      </a:effectRef>
+      <a:fontRef idx="minor">
+        <a:schemeClr val="lt1"/>
+      </a:fontRef>
+    </dgm:style>
+  </dgm:styleLbl>
+  <dgm:styleLbl name="asst4">
+    <dgm:scene3d>
+      <a:camera prst="orthographicFront"/>
+      <a:lightRig rig="threePt" dir="t"/>
+    </dgm:scene3d>
+    <dgm:sp3d/>
+    <dgm:txPr/>
+    <dgm:style>
+      <a:lnRef idx="2">
+        <a:scrgbClr r="0" g="0" b="0"/>
+      </a:lnRef>
+      <a:fillRef idx="1">
+        <a:scrgbClr r="0" g="0" b="0"/>
+      </a:fillRef>
+      <a:effectRef idx="0">
+        <a:scrgbClr r="0" g="0" b="0"/>
+      </a:effectRef>
+      <a:fontRef idx="minor">
+        <a:schemeClr val="lt1"/>
+      </a:fontRef>
+    </dgm:style>
+  </dgm:styleLbl>
+  <dgm:styleLbl name="parChTrans2D1">
+    <dgm:scene3d>
+      <a:camera prst="orthographicFront"/>
+      <a:lightRig rig="threePt" dir="t"/>
+    </dgm:scene3d>
+    <dgm:sp3d/>
+    <dgm:txPr/>
+    <dgm:style>
+      <a:lnRef idx="2">
+        <a:scrgbClr r="0" g="0" b="0"/>
+      </a:lnRef>
+      <a:fillRef idx="1">
+        <a:scrgbClr r="0" g="0" b="0"/>
+      </a:fillRef>
+      <a:effectRef idx="0">
+        <a:scrgbClr r="0" g="0" b="0"/>
+      </a:effectRef>
+      <a:fontRef idx="minor">
+        <a:schemeClr val="lt1"/>
+      </a:fontRef>
+    </dgm:style>
+  </dgm:styleLbl>
+  <dgm:styleLbl name="parChTrans2D2">
+    <dgm:scene3d>
+      <a:camera prst="orthographicFront"/>
+      <a:lightRig rig="threePt" dir="t"/>
+    </dgm:scene3d>
+    <dgm:sp3d/>
+    <dgm:txPr/>
+    <dgm:style>
+      <a:lnRef idx="2">
+        <a:scrgbClr r="0" g="0" b="0"/>
+      </a:lnRef>
+      <a:fillRef idx="1">
+        <a:scrgbClr r="0" g="0" b="0"/>
+      </a:fillRef>
+      <a:effectRef idx="0">
+        <a:scrgbClr r="0" g="0" b="0"/>
+      </a:effectRef>
+      <a:fontRef idx="minor">
+        <a:schemeClr val="lt1"/>
+      </a:fontRef>
+    </dgm:style>
+  </dgm:styleLbl>
+  <dgm:styleLbl name="parChTrans2D3">
+    <dgm:scene3d>
+      <a:camera prst="orthographicFront"/>
+      <a:lightRig rig="threePt" dir="t"/>
+    </dgm:scene3d>
+    <dgm:sp3d/>
+    <dgm:txPr/>
+    <dgm:style>
+      <a:lnRef idx="2">
+        <a:scrgbClr r="0" g="0" b="0"/>
+      </a:lnRef>
+      <a:fillRef idx="1">
+        <a:scrgbClr r="0" g="0" b="0"/>
+      </a:fillRef>
+      <a:effectRef idx="0">
+        <a:scrgbClr r="0" g="0" b="0"/>
+      </a:effectRef>
+      <a:fontRef idx="minor">
+        <a:schemeClr val="lt1"/>
+      </a:fontRef>
+    </dgm:style>
+  </dgm:styleLbl>
+  <dgm:styleLbl name="parChTrans2D4">
+    <dgm:scene3d>
+      <a:camera prst="orthographicFront"/>
+      <a:lightRig rig="threePt" dir="t"/>
+    </dgm:scene3d>
+    <dgm:sp3d/>
+    <dgm:txPr/>
+    <dgm:style>
+      <a:lnRef idx="2">
+        <a:scrgbClr r="0" g="0" b="0"/>
+      </a:lnRef>
+      <a:fillRef idx="1">
+        <a:scrgbClr r="0" g="0" b="0"/>
+      </a:fillRef>
+      <a:effectRef idx="0">
+        <a:scrgbClr r="0" g="0" b="0"/>
+      </a:effectRef>
+      <a:fontRef idx="minor">
+        <a:schemeClr val="lt1"/>
+      </a:fontRef>
+    </dgm:style>
+  </dgm:styleLbl>
+  <dgm:styleLbl name="parChTrans1D1">
+    <dgm:scene3d>
+      <a:camera prst="orthographicFront"/>
+      <a:lightRig rig="threePt" dir="t"/>
+    </dgm:scene3d>
+    <dgm:sp3d/>
+    <dgm:txPr/>
+    <dgm:style>
+      <a:lnRef idx="2">
+        <a:scrgbClr r="0" g="0" b="0"/>
+      </a:lnRef>
+      <a:fillRef idx="0">
+        <a:scrgbClr r="0" g="0" b="0"/>
+      </a:fillRef>
+      <a:effectRef idx="0">
+        <a:scrgbClr r="0" g="0" b="0"/>
+      </a:effectRef>
+      <a:fontRef idx="minor"/>
+    </dgm:style>
+  </dgm:styleLbl>
+  <dgm:styleLbl name="parChTrans1D2">
+    <dgm:scene3d>
+      <a:camera prst="orthographicFront"/>
+      <a:lightRig rig="threePt" dir="t"/>
+    </dgm:scene3d>
+    <dgm:sp3d/>
+    <dgm:txPr/>
+    <dgm:style>
+      <a:lnRef idx="2">
+        <a:scrgbClr r="0" g="0" b="0"/>
+      </a:lnRef>
+      <a:fillRef idx="0">
+        <a:scrgbClr r="0" g="0" b="0"/>
+      </a:fillRef>
+      <a:effectRef idx="0">
+        <a:scrgbClr r="0" g="0" b="0"/>
+      </a:effectRef>
+      <a:fontRef idx="minor"/>
+    </dgm:style>
+  </dgm:styleLbl>
+  <dgm:styleLbl name="parChTrans1D3">
+    <dgm:scene3d>
+      <a:camera prst="orthographicFront"/>
+      <a:lightRig rig="threePt" dir="t"/>
+    </dgm:scene3d>
+    <dgm:sp3d/>
+    <dgm:txPr/>
+    <dgm:style>
+      <a:lnRef idx="2">
+        <a:scrgbClr r="0" g="0" b="0"/>
+      </a:lnRef>
+      <a:fillRef idx="0">
+        <a:scrgbClr r="0" g="0" b="0"/>
+      </a:fillRef>
+      <a:effectRef idx="0">
+        <a:scrgbClr r="0" g="0" b="0"/>
+      </a:effectRef>
+      <a:fontRef idx="minor"/>
+    </dgm:style>
+  </dgm:styleLbl>
+  <dgm:styleLbl name="parChTrans1D4">
+    <dgm:scene3d>
+      <a:camera prst="orthographicFront"/>
+      <a:lightRig rig="threePt" dir="t"/>
+    </dgm:scene3d>
+    <dgm:sp3d/>
+    <dgm:txPr/>
+    <dgm:style>
+      <a:lnRef idx="2">
+        <a:scrgbClr r="0" g="0" b="0"/>
+      </a:lnRef>
+      <a:fillRef idx="0">
+        <a:scrgbClr r="0" g="0" b="0"/>
+      </a:fillRef>
+      <a:effectRef idx="0">
+        <a:scrgbClr r="0" g="0" b="0"/>
+      </a:effectRef>
+      <a:fontRef idx="minor"/>
+    </dgm:style>
+  </dgm:styleLbl>
+  <dgm:styleLbl name="fgAcc1">
+    <dgm:scene3d>
+      <a:camera prst="orthographicFront"/>
+      <a:lightRig rig="threePt" dir="t"/>
+    </dgm:scene3d>
+    <dgm:sp3d/>
+    <dgm:txPr/>
+    <dgm:style>
+      <a:lnRef idx="2">
+        <a:scrgbClr r="0" g="0" b="0"/>
+      </a:lnRef>
+      <a:fillRef idx="1">
+        <a:scrgbClr r="0" g="0" b="0"/>
+      </a:fillRef>
+      <a:effectRef idx="0">
+        <a:scrgbClr r="0" g="0" b="0"/>
+      </a:effectRef>
+      <a:fontRef idx="minor"/>
+    </dgm:style>
+  </dgm:styleLbl>
+  <dgm:styleLbl name="conFgAcc1">
+    <dgm:scene3d>
+      <a:camera prst="orthographicFront"/>
+      <a:lightRig rig="threePt" dir="t"/>
+    </dgm:scene3d>
+    <dgm:sp3d/>
+    <dgm:txPr/>
+    <dgm:style>
+      <a:lnRef idx="2">
+        <a:scrgbClr r="0" g="0" b="0"/>
+      </a:lnRef>
+      <a:fillRef idx="1">
+        <a:scrgbClr r="0" g="0" b="0"/>
+      </a:fillRef>
+      <a:effectRef idx="0">
+        <a:scrgbClr r="0" g="0" b="0"/>
+      </a:effectRef>
+      <a:fontRef idx="minor"/>
+    </dgm:style>
+  </dgm:styleLbl>
+  <dgm:styleLbl name="alignAcc1">
+    <dgm:scene3d>
+      <a:camera prst="orthographicFront"/>
+      <a:lightRig rig="threePt" dir="t"/>
+    </dgm:scene3d>
+    <dgm:sp3d/>
+    <dgm:txPr/>
+    <dgm:style>
+      <a:lnRef idx="2">
+        <a:scrgbClr r="0" g="0" b="0"/>
+      </a:lnRef>
+      <a:fillRef idx="1">
+        <a:scrgbClr r="0" g="0" b="0"/>
+      </a:fillRef>
+      <a:effectRef idx="0">
+        <a:scrgbClr r="0" g="0" b="0"/>
+      </a:effectRef>
+      <a:fontRef idx="minor"/>
+    </dgm:style>
+  </dgm:styleLbl>
+  <dgm:styleLbl name="trAlignAcc1">
+    <dgm:scene3d>
+      <a:camera prst="orthographicFront"/>
+      <a:lightRig rig="threePt" dir="t"/>
+    </dgm:scene3d>
+    <dgm:sp3d/>
+    <dgm:txPr/>
+    <dgm:style>
+      <a:lnRef idx="1">
+        <a:scrgbClr r="0" g="0" b="0"/>
+      </a:lnRef>
+      <a:fillRef idx="1">
+        <a:scrgbClr r="0" g="0" b="0"/>
+      </a:fillRef>
+      <a:effectRef idx="0">
+        <a:scrgbClr r="0" g="0" b="0"/>
+      </a:effectRef>
+      <a:fontRef idx="minor"/>
+    </dgm:style>
+  </dgm:styleLbl>
+  <dgm:styleLbl name="bgAcc1">
+    <dgm:scene3d>
+      <a:camera prst="orthographicFront"/>
+      <a:lightRig rig="threePt" dir="t"/>
+    </dgm:scene3d>
+    <dgm:sp3d/>
+    <dgm:txPr/>
+    <dgm:style>
+      <a:lnRef idx="2">
+        <a:scrgbClr r="0" g="0" b="0"/>
+      </a:lnRef>
+      <a:fillRef idx="1">
+        <a:scrgbClr r="0" g="0" b="0"/>
+      </a:fillRef>
+      <a:effectRef idx="0">
+        <a:scrgbClr r="0" g="0" b="0"/>
+      </a:effectRef>
+      <a:fontRef idx="minor"/>
+    </dgm:style>
+  </dgm:styleLbl>
+  <dgm:styleLbl name="solidFgAcc1">
+    <dgm:scene3d>
+      <a:camera prst="orthographicFront"/>
+      <a:lightRig rig="threePt" dir="t"/>
+    </dgm:scene3d>
+    <dgm:sp3d/>
+    <dgm:txPr/>
+    <dgm:style>
+      <a:lnRef idx="2">
+        <a:scrgbClr r="0" g="0" b="0"/>
+      </a:lnRef>
+      <a:fillRef idx="1">
+        <a:scrgbClr r="0" g="0" b="0"/>
+      </a:fillRef>
+      <a:effectRef idx="0">
+        <a:scrgbClr r="0" g="0" b="0"/>
+      </a:effectRef>
+      <a:fontRef idx="minor"/>
+    </dgm:style>
+  </dgm:styleLbl>
+  <dgm:styleLbl name="solidAlignAcc1">
+    <dgm:scene3d>
+      <a:camera prst="orthographicFront"/>
+      <a:lightRig rig="threePt" dir="t"/>
+    </dgm:scene3d>
+    <dgm:sp3d/>
+    <dgm:txPr/>
+    <dgm:style>
+      <a:lnRef idx="2">
+        <a:scrgbClr r="0" g="0" b="0"/>
+      </a:lnRef>
+      <a:fillRef idx="1">
+        <a:scrgbClr r="0" g="0" b="0"/>
+      </a:fillRef>
+      <a:effectRef idx="0">
+        <a:scrgbClr r="0" g="0" b="0"/>
+      </a:effectRef>
+      <a:fontRef idx="minor"/>
+    </dgm:style>
+  </dgm:styleLbl>
+  <dgm:styleLbl name="solidBgAcc1">
+    <dgm:scene3d>
+      <a:camera prst="orthographicFront"/>
+      <a:lightRig rig="threePt" dir="t"/>
+    </dgm:scene3d>
+    <dgm:sp3d/>
+    <dgm:txPr/>
+    <dgm:style>
+      <a:lnRef idx="2">
+        <a:scrgbClr r="0" g="0" b="0"/>
+      </a:lnRef>
+      <a:fillRef idx="1">
+        <a:scrgbClr r="0" g="0" b="0"/>
+      </a:fillRef>
+      <a:effectRef idx="0">
+        <a:scrgbClr r="0" g="0" b="0"/>
+      </a:effectRef>
+      <a:fontRef idx="minor"/>
+    </dgm:style>
+  </dgm:styleLbl>
+  <dgm:styleLbl name="fgAccFollowNode1">
+    <dgm:scene3d>
+      <a:camera prst="orthographicFront"/>
+      <a:lightRig rig="threePt" dir="t"/>
+    </dgm:scene3d>
+    <dgm:sp3d/>
+    <dgm:txPr/>
+    <dgm:style>
+      <a:lnRef idx="2">
+        <a:scrgbClr r="0" g="0" b="0"/>
+      </a:lnRef>
+      <a:fillRef idx="1">
+        <a:scrgbClr r="0" g="0" b="0"/>
+      </a:fillRef>
+      <a:effectRef idx="0">
+        <a:scrgbClr r="0" g="0" b="0"/>
+      </a:effectRef>
+      <a:fontRef idx="minor"/>
+    </dgm:style>
+  </dgm:styleLbl>
+  <dgm:styleLbl name="alignAccFollowNode1">
+    <dgm:scene3d>
+      <a:camera prst="orthographicFront"/>
+      <a:lightRig rig="threePt" dir="t"/>
+    </dgm:scene3d>
+    <dgm:sp3d/>
+    <dgm:txPr/>
+    <dgm:style>
+      <a:lnRef idx="2">
+        <a:scrgbClr r="0" g="0" b="0"/>
+      </a:lnRef>
+      <a:fillRef idx="1">
+        <a:scrgbClr r="0" g="0" b="0"/>
+      </a:fillRef>
+      <a:effectRef idx="0">
+        <a:scrgbClr r="0" g="0" b="0"/>
+      </a:effectRef>
+      <a:fontRef idx="minor"/>
+    </dgm:style>
+  </dgm:styleLbl>
+  <dgm:styleLbl name="bgAccFollowNode1">
+    <dgm:scene3d>
+      <a:camera prst="orthographicFront"/>
+      <a:lightRig rig="threePt" dir="t"/>
+    </dgm:scene3d>
+    <dgm:sp3d/>
+    <dgm:txPr/>
+    <dgm:style>
+      <a:lnRef idx="2">
+        <a:scrgbClr r="0" g="0" b="0"/>
+      </a:lnRef>
+      <a:fillRef idx="1">
+        <a:scrgbClr r="0" g="0" b="0"/>
+      </a:fillRef>
+      <a:effectRef idx="0">
+        <a:scrgbClr r="0" g="0" b="0"/>
+      </a:effectRef>
+      <a:fontRef idx="minor"/>
+    </dgm:style>
+  </dgm:styleLbl>
+  <dgm:styleLbl name="fgAcc0">
+    <dgm:scene3d>
+      <a:camera prst="orthographicFront"/>
+      <a:lightRig rig="threePt" dir="t"/>
+    </dgm:scene3d>
+    <dgm:sp3d/>
+    <dgm:txPr/>
+    <dgm:style>
+      <a:lnRef idx="2">
+        <a:scrgbClr r="0" g="0" b="0"/>
+      </a:lnRef>
+      <a:fillRef idx="1">
+        <a:scrgbClr r="0" g="0" b="0"/>
+      </a:fillRef>
+      <a:effectRef idx="0">
+        <a:scrgbClr r="0" g="0" b="0"/>
+      </a:effectRef>
+      <a:fontRef idx="minor"/>
+    </dgm:style>
+  </dgm:styleLbl>
+  <dgm:styleLbl name="fgAcc2">
+    <dgm:scene3d>
+      <a:camera prst="orthographicFront"/>
+      <a:lightRig rig="threePt" dir="t"/>
+    </dgm:scene3d>
+    <dgm:sp3d/>
+    <dgm:txPr/>
+    <dgm:style>
+      <a:lnRef idx="2">
+        <a:scrgbClr r="0" g="0" b="0"/>
+      </a:lnRef>
+      <a:fillRef idx="1">
+        <a:scrgbClr r="0" g="0" b="0"/>
+      </a:fillRef>
+      <a:effectRef idx="0">
+        <a:scrgbClr r="0" g="0" b="0"/>
+      </a:effectRef>
+      <a:fontRef idx="minor"/>
+    </dgm:style>
+  </dgm:styleLbl>
+  <dgm:styleLbl name="fgAcc3">
+    <dgm:scene3d>
+      <a:camera prst="orthographicFront"/>
+      <a:lightRig rig="threePt" dir="t"/>
+    </dgm:scene3d>
+    <dgm:sp3d/>
+    <dgm:txPr/>
+    <dgm:style>
+      <a:lnRef idx="2">
+        <a:scrgbClr r="0" g="0" b="0"/>
+      </a:lnRef>
+      <a:fillRef idx="1">
+        <a:scrgbClr r="0" g="0" b="0"/>
+      </a:fillRef>
+      <a:effectRef idx="0">
+        <a:scrgbClr r="0" g="0" b="0"/>
+      </a:effectRef>
+      <a:fontRef idx="minor"/>
+    </dgm:style>
+  </dgm:styleLbl>
+  <dgm:styleLbl name="fgAcc4">
+    <dgm:scene3d>
+      <a:camera prst="orthographicFront"/>
+      <a:lightRig rig="threePt" dir="t"/>
+    </dgm:scene3d>
+    <dgm:sp3d/>
+    <dgm:txPr/>
+    <dgm:style>
+      <a:lnRef idx="2">
+        <a:scrgbClr r="0" g="0" b="0"/>
+      </a:lnRef>
+      <a:fillRef idx="1">
+        <a:scrgbClr r="0" g="0" b="0"/>
+      </a:fillRef>
+      <a:effectRef idx="0">
+        <a:scrgbClr r="0" g="0" b="0"/>
+      </a:effectRef>
+      <a:fontRef idx="minor"/>
+    </dgm:style>
+  </dgm:styleLbl>
+  <dgm:styleLbl name="bgShp">
+    <dgm:scene3d>
+      <a:camera prst="orthographicFront"/>
+      <a:lightRig rig="threePt" dir="t"/>
+    </dgm:scene3d>
+    <dgm:sp3d/>
+    <dgm:txPr/>
+    <dgm:style>
+      <a:lnRef idx="0">
+        <a:scrgbClr r="0" g="0" b="0"/>
+      </a:lnRef>
+      <a:fillRef idx="1">
+        <a:scrgbClr r="0" g="0" b="0"/>
+      </a:fillRef>
+      <a:effectRef idx="0">
+        <a:scrgbClr r="0" g="0" b="0"/>
+      </a:effectRef>
+      <a:fontRef idx="minor"/>
+    </dgm:style>
+  </dgm:styleLbl>
+  <dgm:styleLbl name="dkBgShp">
+    <dgm:scene3d>
+      <a:camera prst="orthographicFront"/>
+      <a:lightRig rig="threePt" dir="t"/>
+    </dgm:scene3d>
+    <dgm:sp3d/>
+    <dgm:txPr/>
+    <dgm:style>
+      <a:lnRef idx="0">
+        <a:scrgbClr r="0" g="0" b="0"/>
+      </a:lnRef>
+      <a:fillRef idx="1">
+        <a:scrgbClr r="0" g="0" b="0"/>
+      </a:fillRef>
+      <a:effectRef idx="0">
+        <a:scrgbClr r="0" g="0" b="0"/>
+      </a:effectRef>
+      <a:fontRef idx="minor"/>
+    </dgm:style>
+  </dgm:styleLbl>
+  <dgm:styleLbl name="trBgShp">
+    <dgm:scene3d>
+      <a:camera prst="orthographicFront"/>
+      <a:lightRig rig="threePt" dir="t"/>
+    </dgm:scene3d>
+    <dgm:sp3d/>
+    <dgm:txPr/>
+    <dgm:style>
+      <a:lnRef idx="0">
+        <a:scrgbClr r="0" g="0" b="0"/>
+      </a:lnRef>
+      <a:fillRef idx="1">
+        <a:scrgbClr r="0" g="0" b="0"/>
+      </a:fillRef>
+      <a:effectRef idx="0">
+        <a:scrgbClr r="0" g="0" b="0"/>
+      </a:effectRef>
+      <a:fontRef idx="minor"/>
+    </dgm:style>
+  </dgm:styleLbl>
+  <dgm:styleLbl name="fgShp">
+    <dgm:scene3d>
+      <a:camera prst="orthographicFront"/>
+      <a:lightRig rig="threePt" dir="t"/>
+    </dgm:scene3d>
+    <dgm:sp3d/>
+    <dgm:txPr/>
+    <dgm:style>
+      <a:lnRef idx="2">
+        <a:scrgbClr r="0" g="0" b="0"/>
+      </a:lnRef>
+      <a:fillRef idx="1">
+        <a:scrgbClr r="0" g="0" b="0"/>
+      </a:fillRef>
+      <a:effectRef idx="0">
+        <a:scrgbClr r="0" g="0" b="0"/>
+      </a:effectRef>
+      <a:fontRef idx="minor"/>
+    </dgm:style>
+  </dgm:styleLbl>
+  <dgm:styleLbl name="revTx">
+    <dgm:scene3d>
+      <a:camera prst="orthographicFront"/>
+      <a:lightRig rig="threePt" dir="t"/>
+    </dgm:scene3d>
+    <dgm:sp3d/>
+    <dgm:txPr/>
+    <dgm:style>
+      <a:lnRef idx="0">
+        <a:scrgbClr r="0" g="0" b="0"/>
+      </a:lnRef>
+      <a:fillRef idx="0">
+        <a:scrgbClr r="0" g="0" b="0"/>
+      </a:fillRef>
+      <a:effectRef idx="0">
+        <a:scrgbClr r="0" g="0" b="0"/>
+      </a:effectRef>
+      <a:fontRef idx="minor"/>
+    </dgm:style>
+  </dgm:styleLbl>
+</dgm:styleDef>
+</file>
+
+<file path=ppt/diagrams/quickStyle3.xml><?xml version="1.0" encoding="utf-8"?>
 <dgm:styleDef xmlns:dgm="http://schemas.openxmlformats.org/drawingml/2006/diagram" xmlns:a="http://schemas.openxmlformats.org/drawingml/2006/main" uniqueId="urn:microsoft.com/office/officeart/2005/8/quickstyle/simple1">
   <dgm:title val=""/>
   <dgm:desc val=""/>
@@ -11383,6 +14415,296 @@
           <a:chExt cx="0" cy="0"/>
         </a:xfrm>
       </p:grpSpPr>
+      <p:sp>
+        <p:nvSpPr>
+          <p:cNvPr id="2" name="Title 1">
+            <a:extLst>
+              <a:ext uri="{FF2B5EF4-FFF2-40B4-BE49-F238E27FC236}">
+                <a16:creationId xmlns:a16="http://schemas.microsoft.com/office/drawing/2014/main" id="{1F8F34C5-3E67-44AA-EEF7-49136D815564}"/>
+              </a:ext>
+            </a:extLst>
+          </p:cNvPr>
+          <p:cNvSpPr>
+            <a:spLocks noGrp="1"/>
+          </p:cNvSpPr>
+          <p:nvPr>
+            <p:ph type="title"/>
+          </p:nvPr>
+        </p:nvSpPr>
+        <p:spPr>
+          <a:xfrm>
+            <a:off x="347870" y="0"/>
+            <a:ext cx="10515600" cy="861392"/>
+          </a:xfrm>
+        </p:spPr>
+        <p:txBody>
+          <a:bodyPr/>
+          <a:lstStyle/>
+          <a:p>
+            <a:r>
+              <a:rPr lang="en-DE" dirty="0">
+                <a:solidFill>
+                  <a:schemeClr val="tx1">
+                    <a:lumMod val="50000"/>
+                    <a:lumOff val="50000"/>
+                  </a:schemeClr>
+                </a:solidFill>
+              </a:rPr>
+              <a:t>Accuracy of the models</a:t>
+            </a:r>
+          </a:p>
+        </p:txBody>
+      </p:sp>
+      <p:pic>
+        <p:nvPicPr>
+          <p:cNvPr id="5" name="Content Placeholder 4">
+            <a:extLst>
+              <a:ext uri="{FF2B5EF4-FFF2-40B4-BE49-F238E27FC236}">
+                <a16:creationId xmlns:a16="http://schemas.microsoft.com/office/drawing/2014/main" id="{FDD42136-66C3-95E8-48EE-34F11E0B39D9}"/>
+              </a:ext>
+            </a:extLst>
+          </p:cNvPr>
+          <p:cNvPicPr>
+            <a:picLocks noGrp="1" noChangeAspect="1"/>
+          </p:cNvPicPr>
+          <p:nvPr>
+            <p:ph idx="1"/>
+          </p:nvPr>
+        </p:nvPicPr>
+        <p:blipFill>
+          <a:blip r:embed="rId2"/>
+          <a:stretch>
+            <a:fillRect/>
+          </a:stretch>
+        </p:blipFill>
+        <p:spPr>
+          <a:xfrm>
+            <a:off x="593604" y="861391"/>
+            <a:ext cx="11581831" cy="5750419"/>
+          </a:xfrm>
+        </p:spPr>
+      </p:pic>
+      <p:sp>
+        <p:nvSpPr>
+          <p:cNvPr id="6" name="TextBox 5">
+            <a:extLst>
+              <a:ext uri="{FF2B5EF4-FFF2-40B4-BE49-F238E27FC236}">
+                <a16:creationId xmlns:a16="http://schemas.microsoft.com/office/drawing/2014/main" id="{D3671076-C62E-865F-6A91-64CC386773D8}"/>
+              </a:ext>
+            </a:extLst>
+          </p:cNvPr>
+          <p:cNvSpPr txBox="1"/>
+          <p:nvPr/>
+        </p:nvSpPr>
+        <p:spPr>
+          <a:xfrm>
+            <a:off x="1748174" y="6211700"/>
+            <a:ext cx="1551618" cy="400110"/>
+          </a:xfrm>
+          <a:prstGeom prst="rect">
+            <a:avLst/>
+          </a:prstGeom>
+          <a:solidFill>
+            <a:schemeClr val="bg1"/>
+          </a:solidFill>
+        </p:spPr>
+        <p:txBody>
+          <a:bodyPr wrap="square">
+            <a:spAutoFit/>
+          </a:bodyPr>
+          <a:lstStyle/>
+          <a:p>
+            <a:r>
+              <a:rPr lang="en-DE" sz="2000" dirty="0"/>
+              <a:t>Baseline RF</a:t>
+            </a:r>
+          </a:p>
+        </p:txBody>
+      </p:sp>
+      <p:sp>
+        <p:nvSpPr>
+          <p:cNvPr id="7" name="TextBox 6">
+            <a:extLst>
+              <a:ext uri="{FF2B5EF4-FFF2-40B4-BE49-F238E27FC236}">
+                <a16:creationId xmlns:a16="http://schemas.microsoft.com/office/drawing/2014/main" id="{23561FCD-D0BA-1DE8-95D5-7D64DE460006}"/>
+              </a:ext>
+            </a:extLst>
+          </p:cNvPr>
+          <p:cNvSpPr txBox="1"/>
+          <p:nvPr/>
+        </p:nvSpPr>
+        <p:spPr>
+          <a:xfrm>
+            <a:off x="3808330" y="6211700"/>
+            <a:ext cx="1551618" cy="400110"/>
+          </a:xfrm>
+          <a:prstGeom prst="rect">
+            <a:avLst/>
+          </a:prstGeom>
+          <a:solidFill>
+            <a:schemeClr val="bg1"/>
+          </a:solidFill>
+        </p:spPr>
+        <p:txBody>
+          <a:bodyPr wrap="square">
+            <a:spAutoFit/>
+          </a:bodyPr>
+          <a:lstStyle/>
+          <a:p>
+            <a:r>
+              <a:rPr lang="en-DE" sz="2000" dirty="0"/>
+              <a:t>Weighted RF</a:t>
+            </a:r>
+          </a:p>
+        </p:txBody>
+      </p:sp>
+      <p:sp>
+        <p:nvSpPr>
+          <p:cNvPr id="8" name="TextBox 7">
+            <a:extLst>
+              <a:ext uri="{FF2B5EF4-FFF2-40B4-BE49-F238E27FC236}">
+                <a16:creationId xmlns:a16="http://schemas.microsoft.com/office/drawing/2014/main" id="{00DA6890-BF2C-107A-6932-C9101F44A370}"/>
+              </a:ext>
+            </a:extLst>
+          </p:cNvPr>
+          <p:cNvSpPr txBox="1"/>
+          <p:nvPr/>
+        </p:nvSpPr>
+        <p:spPr>
+          <a:xfrm>
+            <a:off x="5999359" y="6211700"/>
+            <a:ext cx="1551618" cy="400110"/>
+          </a:xfrm>
+          <a:prstGeom prst="rect">
+            <a:avLst/>
+          </a:prstGeom>
+          <a:solidFill>
+            <a:schemeClr val="bg1"/>
+          </a:solidFill>
+        </p:spPr>
+        <p:txBody>
+          <a:bodyPr wrap="square">
+            <a:spAutoFit/>
+          </a:bodyPr>
+          <a:lstStyle/>
+          <a:p>
+            <a:r>
+              <a:rPr lang="en-DE" sz="2000" dirty="0"/>
+              <a:t>Baseline LR</a:t>
+            </a:r>
+          </a:p>
+        </p:txBody>
+      </p:sp>
+      <p:sp>
+        <p:nvSpPr>
+          <p:cNvPr id="9" name="TextBox 8">
+            <a:extLst>
+              <a:ext uri="{FF2B5EF4-FFF2-40B4-BE49-F238E27FC236}">
+                <a16:creationId xmlns:a16="http://schemas.microsoft.com/office/drawing/2014/main" id="{3184A6B6-7DBA-0C78-753D-CDA4210C071A}"/>
+              </a:ext>
+            </a:extLst>
+          </p:cNvPr>
+          <p:cNvSpPr txBox="1"/>
+          <p:nvPr/>
+        </p:nvSpPr>
+        <p:spPr>
+          <a:xfrm>
+            <a:off x="8177135" y="6198448"/>
+            <a:ext cx="1775247" cy="707886"/>
+          </a:xfrm>
+          <a:prstGeom prst="rect">
+            <a:avLst/>
+          </a:prstGeom>
+          <a:solidFill>
+            <a:schemeClr val="bg1"/>
+          </a:solidFill>
+        </p:spPr>
+        <p:txBody>
+          <a:bodyPr wrap="square">
+            <a:spAutoFit/>
+          </a:bodyPr>
+          <a:lstStyle/>
+          <a:p>
+            <a:r>
+              <a:rPr lang="en-DE" sz="2000" dirty="0"/>
+              <a:t>Cost-sensitive</a:t>
+            </a:r>
+          </a:p>
+          <a:p>
+            <a:r>
+              <a:rPr lang="en-DE" sz="2000" dirty="0"/>
+              <a:t> LR</a:t>
+            </a:r>
+          </a:p>
+        </p:txBody>
+      </p:sp>
+      <p:sp>
+        <p:nvSpPr>
+          <p:cNvPr id="10" name="TextBox 9">
+            <a:extLst>
+              <a:ext uri="{FF2B5EF4-FFF2-40B4-BE49-F238E27FC236}">
+                <a16:creationId xmlns:a16="http://schemas.microsoft.com/office/drawing/2014/main" id="{AD14A3F2-D135-FF3B-DDC8-EDA812F11983}"/>
+              </a:ext>
+            </a:extLst>
+          </p:cNvPr>
+          <p:cNvSpPr txBox="1"/>
+          <p:nvPr/>
+        </p:nvSpPr>
+        <p:spPr>
+          <a:xfrm>
+            <a:off x="10759083" y="6211700"/>
+            <a:ext cx="1551618" cy="400110"/>
+          </a:xfrm>
+          <a:prstGeom prst="rect">
+            <a:avLst/>
+          </a:prstGeom>
+          <a:solidFill>
+            <a:schemeClr val="bg1"/>
+          </a:solidFill>
+        </p:spPr>
+        <p:txBody>
+          <a:bodyPr wrap="square">
+            <a:spAutoFit/>
+          </a:bodyPr>
+          <a:lstStyle/>
+          <a:p>
+            <a:r>
+              <a:rPr lang="en-DE" sz="2000" dirty="0"/>
+              <a:t>MLP</a:t>
+            </a:r>
+          </a:p>
+        </p:txBody>
+      </p:sp>
+    </p:spTree>
+    <p:extLst>
+      <p:ext uri="{BB962C8B-B14F-4D97-AF65-F5344CB8AC3E}">
+        <p14:creationId xmlns:p14="http://schemas.microsoft.com/office/powerpoint/2010/main" val="168623108"/>
+      </p:ext>
+    </p:extLst>
+  </p:cSld>
+  <p:clrMapOvr>
+    <a:masterClrMapping/>
+  </p:clrMapOvr>
+</p:sld>
+</file>
+
+<file path=ppt/slides/slide11.xml><?xml version="1.0" encoding="utf-8"?>
+<p:sld xmlns:a="http://schemas.openxmlformats.org/drawingml/2006/main" xmlns:r="http://schemas.openxmlformats.org/officeDocument/2006/relationships" xmlns:p="http://schemas.openxmlformats.org/presentationml/2006/main">
+  <p:cSld>
+    <p:spTree>
+      <p:nvGrpSpPr>
+        <p:cNvPr id="1" name=""/>
+        <p:cNvGrpSpPr/>
+        <p:nvPr/>
+      </p:nvGrpSpPr>
+      <p:grpSpPr>
+        <a:xfrm>
+          <a:off x="0" y="0"/>
+          <a:ext cx="0" cy="0"/>
+          <a:chOff x="0" y="0"/>
+          <a:chExt cx="0" cy="0"/>
+        </a:xfrm>
+      </p:grpSpPr>
       <p:pic>
         <p:nvPicPr>
           <p:cNvPr id="5" name="Content Placeholder 4">
@@ -11467,7 +14789,7 @@
 </p:sld>
 </file>
 
-<file path=ppt/slides/slide11.xml><?xml version="1.0" encoding="utf-8"?>
+<file path=ppt/slides/slide12.xml><?xml version="1.0" encoding="utf-8"?>
 <p:sld xmlns:a="http://schemas.openxmlformats.org/drawingml/2006/main" xmlns:r="http://schemas.openxmlformats.org/officeDocument/2006/relationships" xmlns:p="http://schemas.openxmlformats.org/presentationml/2006/main">
   <p:cSld>
     <p:spTree>
@@ -11660,6 +14982,71 @@
     <p:extLst>
       <p:ext uri="{BB962C8B-B14F-4D97-AF65-F5344CB8AC3E}">
         <p14:creationId xmlns:p14="http://schemas.microsoft.com/office/powerpoint/2010/main" val="157030695"/>
+      </p:ext>
+    </p:extLst>
+  </p:cSld>
+  <p:clrMapOvr>
+    <a:masterClrMapping/>
+  </p:clrMapOvr>
+</p:sld>
+</file>
+
+<file path=ppt/slides/slide13.xml><?xml version="1.0" encoding="utf-8"?>
+<p:sld xmlns:a="http://schemas.openxmlformats.org/drawingml/2006/main" xmlns:r="http://schemas.openxmlformats.org/officeDocument/2006/relationships" xmlns:p="http://schemas.openxmlformats.org/presentationml/2006/main">
+  <p:cSld>
+    <p:spTree>
+      <p:nvGrpSpPr>
+        <p:cNvPr id="1" name=""/>
+        <p:cNvGrpSpPr/>
+        <p:nvPr/>
+      </p:nvGrpSpPr>
+      <p:grpSpPr>
+        <a:xfrm>
+          <a:off x="0" y="0"/>
+          <a:ext cx="0" cy="0"/>
+          <a:chOff x="0" y="0"/>
+          <a:chExt cx="0" cy="0"/>
+        </a:xfrm>
+      </p:grpSpPr>
+      <p:sp>
+        <p:nvSpPr>
+          <p:cNvPr id="4" name="Title 1">
+            <a:extLst>
+              <a:ext uri="{FF2B5EF4-FFF2-40B4-BE49-F238E27FC236}">
+                <a16:creationId xmlns:a16="http://schemas.microsoft.com/office/drawing/2014/main" id="{B94FB8FB-8A61-EC44-90B1-F2881BB175DE}"/>
+              </a:ext>
+            </a:extLst>
+          </p:cNvPr>
+          <p:cNvSpPr>
+            <a:spLocks noGrp="1"/>
+          </p:cNvSpPr>
+          <p:nvPr>
+            <p:ph type="title"/>
+          </p:nvPr>
+        </p:nvSpPr>
+        <p:spPr>
+          <a:xfrm>
+            <a:off x="4424775" y="2823639"/>
+            <a:ext cx="3676237" cy="765914"/>
+          </a:xfrm>
+        </p:spPr>
+        <p:txBody>
+          <a:bodyPr>
+            <a:noAutofit/>
+          </a:bodyPr>
+          <a:lstStyle/>
+          <a:p>
+            <a:r>
+              <a:rPr lang="en-DE" sz="6000" dirty="0"/>
+              <a:t>Thank you</a:t>
+            </a:r>
+          </a:p>
+        </p:txBody>
+      </p:sp>
+    </p:spTree>
+    <p:extLst>
+      <p:ext uri="{BB962C8B-B14F-4D97-AF65-F5344CB8AC3E}">
+        <p14:creationId xmlns:p14="http://schemas.microsoft.com/office/powerpoint/2010/main" val="2235215589"/>
       </p:ext>
     </p:extLst>
   </p:cSld>
@@ -13475,12 +16862,43 @@
           <a:chExt cx="0" cy="0"/>
         </a:xfrm>
       </p:grpSpPr>
+      <p:graphicFrame>
+        <p:nvGraphicFramePr>
+          <p:cNvPr id="4" name="Content Placeholder 3">
+            <a:extLst>
+              <a:ext uri="{FF2B5EF4-FFF2-40B4-BE49-F238E27FC236}">
+                <a16:creationId xmlns:a16="http://schemas.microsoft.com/office/drawing/2014/main" id="{FBA7DAAD-4125-94C9-E298-416302E30E2C}"/>
+              </a:ext>
+            </a:extLst>
+          </p:cNvPr>
+          <p:cNvGraphicFramePr>
+            <a:graphicFrameLocks noGrp="1"/>
+          </p:cNvGraphicFramePr>
+          <p:nvPr>
+            <p:ph idx="1"/>
+            <p:extLst>
+              <p:ext uri="{D42A27DB-BD31-4B8C-83A1-F6EECF244321}">
+                <p14:modId xmlns:p14="http://schemas.microsoft.com/office/powerpoint/2010/main" val="1637988857"/>
+              </p:ext>
+            </p:extLst>
+          </p:nvPr>
+        </p:nvGraphicFramePr>
+        <p:xfrm>
+          <a:off x="838200" y="1825625"/>
+          <a:ext cx="10515600" cy="4351338"/>
+        </p:xfrm>
+        <a:graphic>
+          <a:graphicData uri="http://schemas.openxmlformats.org/drawingml/2006/diagram">
+            <dgm:relIds xmlns:dgm="http://schemas.openxmlformats.org/drawingml/2006/diagram" xmlns:r="http://schemas.openxmlformats.org/officeDocument/2006/relationships" r:dm="rId2" r:lo="rId3" r:qs="rId4" r:cs="rId5"/>
+          </a:graphicData>
+        </a:graphic>
+      </p:graphicFrame>
       <p:sp>
         <p:nvSpPr>
-          <p:cNvPr id="2" name="Title 1">
+          <p:cNvPr id="13" name="Title 1">
             <a:extLst>
               <a:ext uri="{FF2B5EF4-FFF2-40B4-BE49-F238E27FC236}">
-                <a16:creationId xmlns:a16="http://schemas.microsoft.com/office/drawing/2014/main" id="{1F8F34C5-3E67-44AA-EEF7-49136D815564}"/>
+                <a16:creationId xmlns:a16="http://schemas.microsoft.com/office/drawing/2014/main" id="{3C834C23-1066-75EF-5D1D-7DC1C44819EF}"/>
               </a:ext>
             </a:extLst>
           </p:cNvPr>
@@ -13493,8 +16911,8 @@
         </p:nvSpPr>
         <p:spPr>
           <a:xfrm>
-            <a:off x="347870" y="0"/>
-            <a:ext cx="10515600" cy="861392"/>
+            <a:off x="438563" y="451915"/>
+            <a:ext cx="10515600" cy="765914"/>
           </a:xfrm>
         </p:spPr>
         <p:txBody>
@@ -13510,227 +16928,7 @@
                   </a:schemeClr>
                 </a:solidFill>
               </a:rPr>
-              <a:t>Accuracy of the models</a:t>
-            </a:r>
-          </a:p>
-        </p:txBody>
-      </p:sp>
-      <p:pic>
-        <p:nvPicPr>
-          <p:cNvPr id="5" name="Content Placeholder 4">
-            <a:extLst>
-              <a:ext uri="{FF2B5EF4-FFF2-40B4-BE49-F238E27FC236}">
-                <a16:creationId xmlns:a16="http://schemas.microsoft.com/office/drawing/2014/main" id="{FDD42136-66C3-95E8-48EE-34F11E0B39D9}"/>
-              </a:ext>
-            </a:extLst>
-          </p:cNvPr>
-          <p:cNvPicPr>
-            <a:picLocks noGrp="1" noChangeAspect="1"/>
-          </p:cNvPicPr>
-          <p:nvPr>
-            <p:ph idx="1"/>
-          </p:nvPr>
-        </p:nvPicPr>
-        <p:blipFill>
-          <a:blip r:embed="rId2"/>
-          <a:stretch>
-            <a:fillRect/>
-          </a:stretch>
-        </p:blipFill>
-        <p:spPr>
-          <a:xfrm>
-            <a:off x="593604" y="861391"/>
-            <a:ext cx="11581831" cy="5750419"/>
-          </a:xfrm>
-        </p:spPr>
-      </p:pic>
-      <p:sp>
-        <p:nvSpPr>
-          <p:cNvPr id="6" name="TextBox 5">
-            <a:extLst>
-              <a:ext uri="{FF2B5EF4-FFF2-40B4-BE49-F238E27FC236}">
-                <a16:creationId xmlns:a16="http://schemas.microsoft.com/office/drawing/2014/main" id="{D3671076-C62E-865F-6A91-64CC386773D8}"/>
-              </a:ext>
-            </a:extLst>
-          </p:cNvPr>
-          <p:cNvSpPr txBox="1"/>
-          <p:nvPr/>
-        </p:nvSpPr>
-        <p:spPr>
-          <a:xfrm>
-            <a:off x="1748174" y="6211700"/>
-            <a:ext cx="1551618" cy="400110"/>
-          </a:xfrm>
-          <a:prstGeom prst="rect">
-            <a:avLst/>
-          </a:prstGeom>
-          <a:solidFill>
-            <a:schemeClr val="bg1"/>
-          </a:solidFill>
-        </p:spPr>
-        <p:txBody>
-          <a:bodyPr wrap="square">
-            <a:spAutoFit/>
-          </a:bodyPr>
-          <a:lstStyle/>
-          <a:p>
-            <a:r>
-              <a:rPr lang="en-DE" sz="2000" dirty="0"/>
-              <a:t>Baseline RF</a:t>
-            </a:r>
-          </a:p>
-        </p:txBody>
-      </p:sp>
-      <p:sp>
-        <p:nvSpPr>
-          <p:cNvPr id="7" name="TextBox 6">
-            <a:extLst>
-              <a:ext uri="{FF2B5EF4-FFF2-40B4-BE49-F238E27FC236}">
-                <a16:creationId xmlns:a16="http://schemas.microsoft.com/office/drawing/2014/main" id="{23561FCD-D0BA-1DE8-95D5-7D64DE460006}"/>
-              </a:ext>
-            </a:extLst>
-          </p:cNvPr>
-          <p:cNvSpPr txBox="1"/>
-          <p:nvPr/>
-        </p:nvSpPr>
-        <p:spPr>
-          <a:xfrm>
-            <a:off x="3808330" y="6211700"/>
-            <a:ext cx="1551618" cy="400110"/>
-          </a:xfrm>
-          <a:prstGeom prst="rect">
-            <a:avLst/>
-          </a:prstGeom>
-          <a:solidFill>
-            <a:schemeClr val="bg1"/>
-          </a:solidFill>
-        </p:spPr>
-        <p:txBody>
-          <a:bodyPr wrap="square">
-            <a:spAutoFit/>
-          </a:bodyPr>
-          <a:lstStyle/>
-          <a:p>
-            <a:r>
-              <a:rPr lang="en-DE" sz="2000" dirty="0"/>
-              <a:t>Weighted RF</a:t>
-            </a:r>
-          </a:p>
-        </p:txBody>
-      </p:sp>
-      <p:sp>
-        <p:nvSpPr>
-          <p:cNvPr id="8" name="TextBox 7">
-            <a:extLst>
-              <a:ext uri="{FF2B5EF4-FFF2-40B4-BE49-F238E27FC236}">
-                <a16:creationId xmlns:a16="http://schemas.microsoft.com/office/drawing/2014/main" id="{00DA6890-BF2C-107A-6932-C9101F44A370}"/>
-              </a:ext>
-            </a:extLst>
-          </p:cNvPr>
-          <p:cNvSpPr txBox="1"/>
-          <p:nvPr/>
-        </p:nvSpPr>
-        <p:spPr>
-          <a:xfrm>
-            <a:off x="5999359" y="6211700"/>
-            <a:ext cx="1551618" cy="400110"/>
-          </a:xfrm>
-          <a:prstGeom prst="rect">
-            <a:avLst/>
-          </a:prstGeom>
-          <a:solidFill>
-            <a:schemeClr val="bg1"/>
-          </a:solidFill>
-        </p:spPr>
-        <p:txBody>
-          <a:bodyPr wrap="square">
-            <a:spAutoFit/>
-          </a:bodyPr>
-          <a:lstStyle/>
-          <a:p>
-            <a:r>
-              <a:rPr lang="en-DE" sz="2000" dirty="0"/>
-              <a:t>Baseline LR</a:t>
-            </a:r>
-          </a:p>
-        </p:txBody>
-      </p:sp>
-      <p:sp>
-        <p:nvSpPr>
-          <p:cNvPr id="9" name="TextBox 8">
-            <a:extLst>
-              <a:ext uri="{FF2B5EF4-FFF2-40B4-BE49-F238E27FC236}">
-                <a16:creationId xmlns:a16="http://schemas.microsoft.com/office/drawing/2014/main" id="{3184A6B6-7DBA-0C78-753D-CDA4210C071A}"/>
-              </a:ext>
-            </a:extLst>
-          </p:cNvPr>
-          <p:cNvSpPr txBox="1"/>
-          <p:nvPr/>
-        </p:nvSpPr>
-        <p:spPr>
-          <a:xfrm>
-            <a:off x="8177135" y="6198448"/>
-            <a:ext cx="1775247" cy="707886"/>
-          </a:xfrm>
-          <a:prstGeom prst="rect">
-            <a:avLst/>
-          </a:prstGeom>
-          <a:solidFill>
-            <a:schemeClr val="bg1"/>
-          </a:solidFill>
-        </p:spPr>
-        <p:txBody>
-          <a:bodyPr wrap="square">
-            <a:spAutoFit/>
-          </a:bodyPr>
-          <a:lstStyle/>
-          <a:p>
-            <a:r>
-              <a:rPr lang="en-DE" sz="2000" dirty="0"/>
-              <a:t>Cost-sensitive</a:t>
-            </a:r>
-          </a:p>
-          <a:p>
-            <a:r>
-              <a:rPr lang="en-DE" sz="2000" dirty="0"/>
-              <a:t> LR</a:t>
-            </a:r>
-          </a:p>
-        </p:txBody>
-      </p:sp>
-      <p:sp>
-        <p:nvSpPr>
-          <p:cNvPr id="10" name="TextBox 9">
-            <a:extLst>
-              <a:ext uri="{FF2B5EF4-FFF2-40B4-BE49-F238E27FC236}">
-                <a16:creationId xmlns:a16="http://schemas.microsoft.com/office/drawing/2014/main" id="{AD14A3F2-D135-FF3B-DDC8-EDA812F11983}"/>
-              </a:ext>
-            </a:extLst>
-          </p:cNvPr>
-          <p:cNvSpPr txBox="1"/>
-          <p:nvPr/>
-        </p:nvSpPr>
-        <p:spPr>
-          <a:xfrm>
-            <a:off x="10759083" y="6211700"/>
-            <a:ext cx="1551618" cy="400110"/>
-          </a:xfrm>
-          <a:prstGeom prst="rect">
-            <a:avLst/>
-          </a:prstGeom>
-          <a:solidFill>
-            <a:schemeClr val="bg1"/>
-          </a:solidFill>
-        </p:spPr>
-        <p:txBody>
-          <a:bodyPr wrap="square">
-            <a:spAutoFit/>
-          </a:bodyPr>
-          <a:lstStyle/>
-          <a:p>
-            <a:r>
-              <a:rPr lang="en-DE" sz="2000" dirty="0"/>
-              <a:t>MLP</a:t>
+              <a:t>Metrics</a:t>
             </a:r>
           </a:p>
         </p:txBody>
@@ -13738,7 +16936,7 @@
     </p:spTree>
     <p:extLst>
       <p:ext uri="{BB962C8B-B14F-4D97-AF65-F5344CB8AC3E}">
-        <p14:creationId xmlns:p14="http://schemas.microsoft.com/office/powerpoint/2010/main" val="168623108"/>
+        <p14:creationId xmlns:p14="http://schemas.microsoft.com/office/powerpoint/2010/main" val="1906845279"/>
       </p:ext>
     </p:extLst>
   </p:cSld>

</xml_diff>